<commit_message>
add modification to presentation
</commit_message>
<xml_diff>
--- a/presentation.pptx
+++ b/presentation.pptx
@@ -5,7 +5,7 @@
     <p:sldMasterId id="2147483648" r:id="rId1"/>
   </p:sldMasterIdLst>
   <p:notesMasterIdLst>
-    <p:notesMasterId r:id="rId28"/>
+    <p:notesMasterId r:id="rId26"/>
   </p:notesMasterIdLst>
   <p:sldIdLst>
     <p:sldId id="256" r:id="rId2"/>
@@ -28,12 +28,10 @@
     <p:sldId id="291" r:id="rId19"/>
     <p:sldId id="281" r:id="rId20"/>
     <p:sldId id="275" r:id="rId21"/>
-    <p:sldId id="282" r:id="rId22"/>
-    <p:sldId id="283" r:id="rId23"/>
-    <p:sldId id="284" r:id="rId24"/>
-    <p:sldId id="257" r:id="rId25"/>
-    <p:sldId id="270" r:id="rId26"/>
-    <p:sldId id="271" r:id="rId27"/>
+    <p:sldId id="292" r:id="rId22"/>
+    <p:sldId id="257" r:id="rId23"/>
+    <p:sldId id="270" r:id="rId24"/>
+    <p:sldId id="271" r:id="rId25"/>
   </p:sldIdLst>
   <p:sldSz cx="12192000" cy="6858000"/>
   <p:notesSz cx="6858000" cy="9144000"/>
@@ -9813,7 +9811,7 @@
                 <a:latin typeface="Arial" panose="020B0604020202020204" pitchFamily="34" charset="0"/>
                 <a:cs typeface="Arial" panose="020B0604020202020204" pitchFamily="34" charset="0"/>
               </a:rPr>
-              <a:t>3.1.	Mise en réseau – Réseaux de régulation de gène</a:t>
+              <a:t>3.1.	Mise en réseau</a:t>
             </a:r>
             <a:endParaRPr lang="fr-FR" sz="3200" b="1" baseline="30000" dirty="0">
               <a:latin typeface="Arial" panose="020B0604020202020204" pitchFamily="34" charset="0"/>
@@ -9873,7 +9871,7 @@
         </p:nvSpPr>
         <p:spPr>
           <a:xfrm>
-            <a:off x="3810000" y="6492876"/>
+            <a:off x="3810000" y="6528387"/>
             <a:ext cx="4800600" cy="365124"/>
           </a:xfrm>
         </p:spPr>
@@ -10032,290 +10030,306 @@
           </a:fontRef>
         </p:style>
       </p:cxnSp>
-      <p:sp>
-        <p:nvSpPr>
-          <p:cNvPr id="25" name="Espace réservé du contenu 2">
-            <a:extLst>
-              <a:ext uri="{FF2B5EF4-FFF2-40B4-BE49-F238E27FC236}">
-                <a16:creationId xmlns:a16="http://schemas.microsoft.com/office/drawing/2014/main" id="{57CB1EB0-7288-3F4E-B1CC-99784B654109}"/>
-              </a:ext>
-            </a:extLst>
-          </p:cNvPr>
-          <p:cNvSpPr txBox="1">
-            <a:spLocks/>
-          </p:cNvSpPr>
+      <p:pic>
+        <p:nvPicPr>
+          <p:cNvPr id="3074" name="Picture 2">
+            <a:extLst>
+              <a:ext uri="{FF2B5EF4-FFF2-40B4-BE49-F238E27FC236}">
+                <a16:creationId xmlns:a16="http://schemas.microsoft.com/office/drawing/2014/main" id="{9088C8A7-85A9-E04C-3B41-14115F199DF7}"/>
+              </a:ext>
+            </a:extLst>
+          </p:cNvPr>
+          <p:cNvPicPr>
+            <a:picLocks noChangeAspect="1" noChangeArrowheads="1"/>
+          </p:cNvPicPr>
           <p:nvPr/>
-        </p:nvSpPr>
-        <p:spPr>
-          <a:xfrm>
-            <a:off x="231320" y="1006054"/>
-            <a:ext cx="11824556" cy="5300591"/>
+        </p:nvPicPr>
+        <p:blipFill>
+          <a:blip r:embed="rId3">
+            <a:extLst>
+              <a:ext uri="{28A0092B-C50C-407E-A947-70E740481C1C}">
+                <a14:useLocalDpi xmlns:a14="http://schemas.microsoft.com/office/drawing/2010/main" val="0"/>
+              </a:ext>
+            </a:extLst>
+          </a:blip>
+          <a:srcRect/>
+          <a:stretch>
+            <a:fillRect/>
+          </a:stretch>
+        </p:blipFill>
+        <p:spPr bwMode="auto">
+          <a:xfrm>
+            <a:off x="7981950" y="1592440"/>
+            <a:ext cx="4000500" cy="4000500"/>
           </a:xfrm>
           <a:prstGeom prst="rect">
             <a:avLst/>
           </a:prstGeom>
-        </p:spPr>
-        <p:txBody>
-          <a:bodyPr vert="horz" lIns="91440" tIns="45720" rIns="91440" bIns="45720" rtlCol="0">
-            <a:normAutofit/>
+          <a:noFill/>
+          <a:extLst>
+            <a:ext uri="{909E8E84-426E-40DD-AFC4-6F175D3DCCD1}">
+              <a14:hiddenFill xmlns:a14="http://schemas.microsoft.com/office/drawing/2010/main">
+                <a:solidFill>
+                  <a:srgbClr val="FFFFFF"/>
+                </a:solidFill>
+              </a14:hiddenFill>
+            </a:ext>
+          </a:extLst>
+        </p:spPr>
+      </p:pic>
+      <p:grpSp>
+        <p:nvGrpSpPr>
+          <p:cNvPr id="13" name="Groupe 12">
+            <a:extLst>
+              <a:ext uri="{FF2B5EF4-FFF2-40B4-BE49-F238E27FC236}">
+                <a16:creationId xmlns:a16="http://schemas.microsoft.com/office/drawing/2014/main" id="{1DEC40E4-78A2-BF4B-F281-8847D73B83A0}"/>
+              </a:ext>
+            </a:extLst>
+          </p:cNvPr>
+          <p:cNvGrpSpPr/>
+          <p:nvPr/>
+        </p:nvGrpSpPr>
+        <p:grpSpPr>
+          <a:xfrm>
+            <a:off x="0" y="1509612"/>
+            <a:ext cx="7981950" cy="4446557"/>
+            <a:chOff x="0" y="1509612"/>
+            <a:chExt cx="7981950" cy="4446557"/>
+          </a:xfrm>
+        </p:grpSpPr>
+        <p:pic>
+          <p:nvPicPr>
+            <p:cNvPr id="3" name="Picture 1">
+              <a:extLst>
+                <a:ext uri="{FF2B5EF4-FFF2-40B4-BE49-F238E27FC236}">
+                  <a16:creationId xmlns:a16="http://schemas.microsoft.com/office/drawing/2014/main" id="{3CF99E63-0A2E-1F9C-CCB3-874617EEA35E}"/>
+                </a:ext>
+              </a:extLst>
+            </p:cNvPr>
+            <p:cNvPicPr>
+              <a:picLocks noChangeAspect="1" noChangeArrowheads="1"/>
+            </p:cNvPicPr>
+            <p:nvPr/>
+          </p:nvPicPr>
+          <p:blipFill>
+            <a:blip r:embed="rId4">
+              <a:extLst>
+                <a:ext uri="{28A0092B-C50C-407E-A947-70E740481C1C}">
+                  <a14:useLocalDpi xmlns:a14="http://schemas.microsoft.com/office/drawing/2010/main" val="0"/>
+                </a:ext>
+              </a:extLst>
+            </a:blip>
+            <a:srcRect/>
+            <a:stretch>
+              <a:fillRect/>
+            </a:stretch>
+          </p:blipFill>
+          <p:spPr bwMode="auto">
+            <a:xfrm>
+              <a:off x="0" y="1509612"/>
+              <a:ext cx="4000500" cy="4000500"/>
+            </a:xfrm>
+            <a:prstGeom prst="rect">
+              <a:avLst/>
+            </a:prstGeom>
+            <a:noFill/>
+            <a:extLst>
+              <a:ext uri="{909E8E84-426E-40DD-AFC4-6F175D3DCCD1}">
+                <a14:hiddenFill xmlns:a14="http://schemas.microsoft.com/office/drawing/2010/main">
+                  <a:solidFill>
+                    <a:srgbClr val="FFFFFF"/>
+                  </a:solidFill>
+                </a14:hiddenFill>
+              </a:ext>
+            </a:extLst>
+          </p:spPr>
+        </p:pic>
+        <p:pic>
+          <p:nvPicPr>
+            <p:cNvPr id="3073" name="Picture 1">
+              <a:extLst>
+                <a:ext uri="{FF2B5EF4-FFF2-40B4-BE49-F238E27FC236}">
+                  <a16:creationId xmlns:a16="http://schemas.microsoft.com/office/drawing/2014/main" id="{8F122668-C63F-7067-123B-D6C6DA329F99}"/>
+                </a:ext>
+              </a:extLst>
+            </p:cNvPr>
+            <p:cNvPicPr>
+              <a:picLocks noChangeAspect="1" noChangeArrowheads="1"/>
+            </p:cNvPicPr>
+            <p:nvPr/>
+          </p:nvPicPr>
+          <p:blipFill>
+            <a:blip r:embed="rId5">
+              <a:extLst>
+                <a:ext uri="{28A0092B-C50C-407E-A947-70E740481C1C}">
+                  <a14:useLocalDpi xmlns:a14="http://schemas.microsoft.com/office/drawing/2010/main" val="0"/>
+                </a:ext>
+              </a:extLst>
+            </a:blip>
+            <a:srcRect/>
+            <a:stretch>
+              <a:fillRect/>
+            </a:stretch>
+          </p:blipFill>
+          <p:spPr bwMode="auto">
+            <a:xfrm>
+              <a:off x="3981450" y="1553573"/>
+              <a:ext cx="4000500" cy="4000500"/>
+            </a:xfrm>
+            <a:prstGeom prst="rect">
+              <a:avLst/>
+            </a:prstGeom>
+            <a:noFill/>
+            <a:extLst>
+              <a:ext uri="{909E8E84-426E-40DD-AFC4-6F175D3DCCD1}">
+                <a14:hiddenFill xmlns:a14="http://schemas.microsoft.com/office/drawing/2010/main">
+                  <a:solidFill>
+                    <a:srgbClr val="FFFFFF"/>
+                  </a:solidFill>
+                </a14:hiddenFill>
+              </a:ext>
+            </a:extLst>
+          </p:spPr>
+        </p:pic>
+        <p:sp>
+          <p:nvSpPr>
+            <p:cNvPr id="10" name="ZoneTexte 9">
+              <a:extLst>
+                <a:ext uri="{FF2B5EF4-FFF2-40B4-BE49-F238E27FC236}">
+                  <a16:creationId xmlns:a16="http://schemas.microsoft.com/office/drawing/2014/main" id="{F0F7ACD2-A34D-F5B7-2BC3-1372A29A0C8A}"/>
+                </a:ext>
+              </a:extLst>
+            </p:cNvPr>
+            <p:cNvSpPr txBox="1"/>
+            <p:nvPr/>
+          </p:nvSpPr>
+          <p:spPr>
+            <a:xfrm>
+              <a:off x="772356" y="5032839"/>
+              <a:ext cx="3037643" cy="923330"/>
+            </a:xfrm>
+            <a:prstGeom prst="rect">
+              <a:avLst/>
+            </a:prstGeom>
+            <a:noFill/>
+          </p:spPr>
+          <p:txBody>
+            <a:bodyPr wrap="square" rtlCol="0">
+              <a:spAutoFit/>
+            </a:bodyPr>
+            <a:lstStyle/>
+            <a:p>
+              <a:r>
+                <a:rPr lang="fr-FR" dirty="0">
+                  <a:latin typeface="Arial" panose="020B0604020202020204" pitchFamily="34" charset="0"/>
+                  <a:cs typeface="Arial" panose="020B0604020202020204" pitchFamily="34" charset="0"/>
+                </a:rPr>
+                <a:t>Nœuds : 88</a:t>
+              </a:r>
+            </a:p>
+            <a:p>
+              <a:r>
+                <a:rPr lang="fr-FR" dirty="0">
+                  <a:latin typeface="Arial" panose="020B0604020202020204" pitchFamily="34" charset="0"/>
+                  <a:cs typeface="Arial" panose="020B0604020202020204" pitchFamily="34" charset="0"/>
+                </a:rPr>
+                <a:t>Nœuds déconnectés : 62</a:t>
+              </a:r>
+            </a:p>
+            <a:p>
+              <a:r>
+                <a:rPr lang="fr-FR" dirty="0">
+                  <a:latin typeface="Arial" panose="020B0604020202020204" pitchFamily="34" charset="0"/>
+                  <a:cs typeface="Arial" panose="020B0604020202020204" pitchFamily="34" charset="0"/>
+                </a:rPr>
+                <a:t>Arrête : 167</a:t>
+              </a:r>
+            </a:p>
+          </p:txBody>
+        </p:sp>
+      </p:grpSp>
+      <p:sp>
+        <p:nvSpPr>
+          <p:cNvPr id="15" name="ZoneTexte 14">
+            <a:extLst>
+              <a:ext uri="{FF2B5EF4-FFF2-40B4-BE49-F238E27FC236}">
+                <a16:creationId xmlns:a16="http://schemas.microsoft.com/office/drawing/2014/main" id="{D27A0FF1-F67E-4EAF-5814-A6EF43A0ADBE}"/>
+              </a:ext>
+            </a:extLst>
+          </p:cNvPr>
+          <p:cNvSpPr txBox="1"/>
+          <p:nvPr/>
+        </p:nvSpPr>
+        <p:spPr>
+          <a:xfrm>
+            <a:off x="2058961" y="1145135"/>
+            <a:ext cx="3533276" cy="368969"/>
+          </a:xfrm>
+          <a:prstGeom prst="rect">
+            <a:avLst/>
+          </a:prstGeom>
+          <a:noFill/>
+        </p:spPr>
+        <p:txBody>
+          <a:bodyPr wrap="square">
+            <a:spAutoFit/>
           </a:bodyPr>
-          <a:lstStyle>
-            <a:lvl1pPr marL="228600" indent="-228600" algn="l" defTabSz="914400" rtl="0" eaLnBrk="1" latinLnBrk="0" hangingPunct="1">
-              <a:lnSpc>
-                <a:spcPct val="90000"/>
-              </a:lnSpc>
-              <a:spcBef>
-                <a:spcPts val="1000"/>
-              </a:spcBef>
-              <a:buFont typeface="Arial" panose="020B0604020202020204" pitchFamily="34" charset="0"/>
-              <a:buChar char="•"/>
-              <a:defRPr sz="2800" kern="1200">
-                <a:solidFill>
-                  <a:schemeClr val="tx1"/>
-                </a:solidFill>
-                <a:latin typeface="+mn-lt"/>
-                <a:ea typeface="+mn-ea"/>
-                <a:cs typeface="+mn-cs"/>
-              </a:defRPr>
-            </a:lvl1pPr>
-            <a:lvl2pPr marL="685800" indent="-228600" algn="l" defTabSz="914400" rtl="0" eaLnBrk="1" latinLnBrk="0" hangingPunct="1">
-              <a:lnSpc>
-                <a:spcPct val="90000"/>
-              </a:lnSpc>
-              <a:spcBef>
-                <a:spcPts val="500"/>
-              </a:spcBef>
-              <a:buFont typeface="Arial" panose="020B0604020202020204" pitchFamily="34" charset="0"/>
-              <a:buChar char="•"/>
-              <a:defRPr sz="2400" kern="1200">
-                <a:solidFill>
-                  <a:schemeClr val="tx1"/>
-                </a:solidFill>
-                <a:latin typeface="+mn-lt"/>
-                <a:ea typeface="+mn-ea"/>
-                <a:cs typeface="+mn-cs"/>
-              </a:defRPr>
-            </a:lvl2pPr>
-            <a:lvl3pPr marL="1143000" indent="-228600" algn="l" defTabSz="914400" rtl="0" eaLnBrk="1" latinLnBrk="0" hangingPunct="1">
-              <a:lnSpc>
-                <a:spcPct val="90000"/>
-              </a:lnSpc>
-              <a:spcBef>
-                <a:spcPts val="500"/>
-              </a:spcBef>
-              <a:buFont typeface="Arial" panose="020B0604020202020204" pitchFamily="34" charset="0"/>
-              <a:buChar char="•"/>
-              <a:defRPr sz="2000" kern="1200">
-                <a:solidFill>
-                  <a:schemeClr val="tx1"/>
-                </a:solidFill>
-                <a:latin typeface="+mn-lt"/>
-                <a:ea typeface="+mn-ea"/>
-                <a:cs typeface="+mn-cs"/>
-              </a:defRPr>
-            </a:lvl3pPr>
-            <a:lvl4pPr marL="1600200" indent="-228600" algn="l" defTabSz="914400" rtl="0" eaLnBrk="1" latinLnBrk="0" hangingPunct="1">
-              <a:lnSpc>
-                <a:spcPct val="90000"/>
-              </a:lnSpc>
-              <a:spcBef>
-                <a:spcPts val="500"/>
-              </a:spcBef>
-              <a:buFont typeface="Arial" panose="020B0604020202020204" pitchFamily="34" charset="0"/>
-              <a:buChar char="•"/>
-              <a:defRPr sz="1800" kern="1200">
-                <a:solidFill>
-                  <a:schemeClr val="tx1"/>
-                </a:solidFill>
-                <a:latin typeface="+mn-lt"/>
-                <a:ea typeface="+mn-ea"/>
-                <a:cs typeface="+mn-cs"/>
-              </a:defRPr>
-            </a:lvl4pPr>
-            <a:lvl5pPr marL="2057400" indent="-228600" algn="l" defTabSz="914400" rtl="0" eaLnBrk="1" latinLnBrk="0" hangingPunct="1">
-              <a:lnSpc>
-                <a:spcPct val="90000"/>
-              </a:lnSpc>
-              <a:spcBef>
-                <a:spcPts val="500"/>
-              </a:spcBef>
-              <a:buFont typeface="Arial" panose="020B0604020202020204" pitchFamily="34" charset="0"/>
-              <a:buChar char="•"/>
-              <a:defRPr sz="1800" kern="1200">
-                <a:solidFill>
-                  <a:schemeClr val="tx1"/>
-                </a:solidFill>
-                <a:latin typeface="+mn-lt"/>
-                <a:ea typeface="+mn-ea"/>
-                <a:cs typeface="+mn-cs"/>
-              </a:defRPr>
-            </a:lvl5pPr>
-            <a:lvl6pPr marL="2514600" indent="-228600" algn="l" defTabSz="914400" rtl="0" eaLnBrk="1" latinLnBrk="0" hangingPunct="1">
-              <a:lnSpc>
-                <a:spcPct val="90000"/>
-              </a:lnSpc>
-              <a:spcBef>
-                <a:spcPts val="500"/>
-              </a:spcBef>
-              <a:buFont typeface="Arial" panose="020B0604020202020204" pitchFamily="34" charset="0"/>
-              <a:buChar char="•"/>
-              <a:defRPr sz="1800" kern="1200">
-                <a:solidFill>
-                  <a:schemeClr val="tx1"/>
-                </a:solidFill>
-                <a:latin typeface="+mn-lt"/>
-                <a:ea typeface="+mn-ea"/>
-                <a:cs typeface="+mn-cs"/>
-              </a:defRPr>
-            </a:lvl6pPr>
-            <a:lvl7pPr marL="2971800" indent="-228600" algn="l" defTabSz="914400" rtl="0" eaLnBrk="1" latinLnBrk="0" hangingPunct="1">
-              <a:lnSpc>
-                <a:spcPct val="90000"/>
-              </a:lnSpc>
-              <a:spcBef>
-                <a:spcPts val="500"/>
-              </a:spcBef>
-              <a:buFont typeface="Arial" panose="020B0604020202020204" pitchFamily="34" charset="0"/>
-              <a:buChar char="•"/>
-              <a:defRPr sz="1800" kern="1200">
-                <a:solidFill>
-                  <a:schemeClr val="tx1"/>
-                </a:solidFill>
-                <a:latin typeface="+mn-lt"/>
-                <a:ea typeface="+mn-ea"/>
-                <a:cs typeface="+mn-cs"/>
-              </a:defRPr>
-            </a:lvl7pPr>
-            <a:lvl8pPr marL="3429000" indent="-228600" algn="l" defTabSz="914400" rtl="0" eaLnBrk="1" latinLnBrk="0" hangingPunct="1">
-              <a:lnSpc>
-                <a:spcPct val="90000"/>
-              </a:lnSpc>
-              <a:spcBef>
-                <a:spcPts val="500"/>
-              </a:spcBef>
-              <a:buFont typeface="Arial" panose="020B0604020202020204" pitchFamily="34" charset="0"/>
-              <a:buChar char="•"/>
-              <a:defRPr sz="1800" kern="1200">
-                <a:solidFill>
-                  <a:schemeClr val="tx1"/>
-                </a:solidFill>
-                <a:latin typeface="+mn-lt"/>
-                <a:ea typeface="+mn-ea"/>
-                <a:cs typeface="+mn-cs"/>
-              </a:defRPr>
-            </a:lvl8pPr>
-            <a:lvl9pPr marL="3886200" indent="-228600" algn="l" defTabSz="914400" rtl="0" eaLnBrk="1" latinLnBrk="0" hangingPunct="1">
-              <a:lnSpc>
-                <a:spcPct val="90000"/>
-              </a:lnSpc>
-              <a:spcBef>
-                <a:spcPts val="500"/>
-              </a:spcBef>
-              <a:buFont typeface="Arial" panose="020B0604020202020204" pitchFamily="34" charset="0"/>
-              <a:buChar char="•"/>
-              <a:defRPr sz="1800" kern="1200">
-                <a:solidFill>
-                  <a:schemeClr val="tx1"/>
-                </a:solidFill>
-                <a:latin typeface="+mn-lt"/>
-                <a:ea typeface="+mn-ea"/>
-                <a:cs typeface="+mn-cs"/>
-              </a:defRPr>
-            </a:lvl9pPr>
-          </a:lstStyle>
-          <a:p>
-            <a:pPr marL="0" indent="0">
-              <a:buNone/>
-            </a:pPr>
+          <a:lstStyle/>
+          <a:p>
             <a:r>
               <a:rPr lang="fr-FR" dirty="0">
+                <a:effectLst/>
                 <a:latin typeface="Arial" panose="020B0604020202020204" pitchFamily="34" charset="0"/>
-                <a:cs typeface="Arial" panose="020B0604020202020204" pitchFamily="34" charset="0"/>
-              </a:rPr>
-              <a:t>- A partir des gènes filtrés, construisez un GRN avec </a:t>
-            </a:r>
-            <a:r>
-              <a:rPr lang="fr-FR" dirty="0" err="1">
+              </a:rPr>
+              <a:t>Réseaux de régulation de gènes</a:t>
+            </a:r>
+            <a:endParaRPr lang="fr-FR" dirty="0"/>
+          </a:p>
+        </p:txBody>
+      </p:sp>
+      <p:sp>
+        <p:nvSpPr>
+          <p:cNvPr id="16" name="ZoneTexte 15">
+            <a:extLst>
+              <a:ext uri="{FF2B5EF4-FFF2-40B4-BE49-F238E27FC236}">
+                <a16:creationId xmlns:a16="http://schemas.microsoft.com/office/drawing/2014/main" id="{2D7A404A-DB55-C2BC-0431-7A7F392629AF}"/>
+              </a:ext>
+            </a:extLst>
+          </p:cNvPr>
+          <p:cNvSpPr txBox="1"/>
+          <p:nvPr/>
+        </p:nvSpPr>
+        <p:spPr>
+          <a:xfrm>
+            <a:off x="8296275" y="1145135"/>
+            <a:ext cx="3533276" cy="368969"/>
+          </a:xfrm>
+          <a:prstGeom prst="rect">
+            <a:avLst/>
+          </a:prstGeom>
+          <a:noFill/>
+        </p:spPr>
+        <p:txBody>
+          <a:bodyPr wrap="square">
+            <a:spAutoFit/>
+          </a:bodyPr>
+          <a:lstStyle/>
+          <a:p>
+            <a:r>
+              <a:rPr lang="fr-FR" dirty="0">
+                <a:effectLst/>
                 <a:latin typeface="Arial" panose="020B0604020202020204" pitchFamily="34" charset="0"/>
-                <a:cs typeface="Arial" panose="020B0604020202020204" pitchFamily="34" charset="0"/>
-              </a:rPr>
-              <a:t>netOmics</a:t>
-            </a:r>
-            <a:endParaRPr lang="fr-FR" dirty="0">
-              <a:latin typeface="Arial" panose="020B0604020202020204" pitchFamily="34" charset="0"/>
-              <a:cs typeface="Arial" panose="020B0604020202020204" pitchFamily="34" charset="0"/>
-            </a:endParaRPr>
-          </a:p>
-          <a:p>
-            <a:pPr marL="0" indent="0">
-              <a:buNone/>
-            </a:pPr>
-            <a:r>
-              <a:rPr lang="fr-FR" dirty="0">
-                <a:latin typeface="Arial" panose="020B0604020202020204" pitchFamily="34" charset="0"/>
-                <a:cs typeface="Arial" panose="020B0604020202020204" pitchFamily="34" charset="0"/>
-              </a:rPr>
-              <a:t>- Combien y a-t-il de </a:t>
-            </a:r>
-            <a:r>
-              <a:rPr lang="fr-FR" dirty="0" err="1">
-                <a:latin typeface="Arial" panose="020B0604020202020204" pitchFamily="34" charset="0"/>
-                <a:cs typeface="Arial" panose="020B0604020202020204" pitchFamily="34" charset="0"/>
-              </a:rPr>
-              <a:t>noeuds</a:t>
-            </a:r>
-            <a:r>
-              <a:rPr lang="fr-FR" dirty="0">
-                <a:latin typeface="Arial" panose="020B0604020202020204" pitchFamily="34" charset="0"/>
-                <a:cs typeface="Arial" panose="020B0604020202020204" pitchFamily="34" charset="0"/>
-              </a:rPr>
-              <a:t>, arête, </a:t>
-            </a:r>
-            <a:r>
-              <a:rPr lang="fr-FR" dirty="0" err="1">
-                <a:latin typeface="Arial" panose="020B0604020202020204" pitchFamily="34" charset="0"/>
-                <a:cs typeface="Arial" panose="020B0604020202020204" pitchFamily="34" charset="0"/>
-              </a:rPr>
-              <a:t>noeuds</a:t>
-            </a:r>
-            <a:r>
-              <a:rPr lang="fr-FR" dirty="0">
-                <a:latin typeface="Arial" panose="020B0604020202020204" pitchFamily="34" charset="0"/>
-                <a:cs typeface="Arial" panose="020B0604020202020204" pitchFamily="34" charset="0"/>
-              </a:rPr>
-              <a:t> déconnectés</a:t>
-            </a:r>
-          </a:p>
-          <a:p>
-            <a:pPr marL="0" indent="0">
-              <a:buNone/>
-            </a:pPr>
-            <a:r>
-              <a:rPr lang="fr-FR" dirty="0">
-                <a:latin typeface="Arial" panose="020B0604020202020204" pitchFamily="34" charset="0"/>
-                <a:cs typeface="Arial" panose="020B0604020202020204" pitchFamily="34" charset="0"/>
-              </a:rPr>
-              <a:t>- Affichez distribution des degrés</a:t>
-            </a:r>
-          </a:p>
-          <a:p>
-            <a:pPr marL="0" indent="0">
-              <a:buNone/>
-            </a:pPr>
-            <a:r>
-              <a:rPr lang="fr-FR" dirty="0">
-                <a:latin typeface="Arial" panose="020B0604020202020204" pitchFamily="34" charset="0"/>
-                <a:cs typeface="Arial" panose="020B0604020202020204" pitchFamily="34" charset="0"/>
-              </a:rPr>
-              <a:t>- Quel gène est le plus connecté ?</a:t>
-            </a:r>
+              </a:rPr>
+              <a:t>Réseaux de régulation PPI</a:t>
+            </a:r>
+            <a:endParaRPr lang="fr-FR" dirty="0"/>
           </a:p>
         </p:txBody>
       </p:sp>
     </p:spTree>
     <p:extLst>
       <p:ext uri="{BB962C8B-B14F-4D97-AF65-F5344CB8AC3E}">
-        <p14:creationId xmlns:p14="http://schemas.microsoft.com/office/powerpoint/2010/main" val="2203163960"/>
+        <p14:creationId xmlns:p14="http://schemas.microsoft.com/office/powerpoint/2010/main" val="1511801781"/>
       </p:ext>
     </p:extLst>
   </p:cSld>
@@ -10371,104 +10385,12 @@
           <a:lstStyle/>
           <a:p>
             <a:r>
-              <a:rPr lang="fr-FR" sz="3200" b="1" dirty="0">
+              <a:rPr lang="en-US" sz="3200" b="1" dirty="0">
                 <a:latin typeface="Arial" panose="020B0604020202020204" pitchFamily="34" charset="0"/>
                 <a:cs typeface="Arial" panose="020B0604020202020204" pitchFamily="34" charset="0"/>
               </a:rPr>
-              <a:t>3.2.	Mise en réseau – Réseaux PPI</a:t>
-            </a:r>
-            <a:endParaRPr lang="fr-FR" sz="3200" b="1" baseline="30000" dirty="0">
-              <a:latin typeface="Arial" panose="020B0604020202020204" pitchFamily="34" charset="0"/>
-              <a:cs typeface="Arial" panose="020B0604020202020204" pitchFamily="34" charset="0"/>
-            </a:endParaRPr>
-          </a:p>
-        </p:txBody>
-      </p:sp>
-      <p:sp>
-        <p:nvSpPr>
-          <p:cNvPr id="4" name="Espace réservé de la date 3">
-            <a:extLst>
-              <a:ext uri="{FF2B5EF4-FFF2-40B4-BE49-F238E27FC236}">
-                <a16:creationId xmlns:a16="http://schemas.microsoft.com/office/drawing/2014/main" id="{F181D9E9-DC4C-4780-75B9-9F6317E5BD1A}"/>
-              </a:ext>
-            </a:extLst>
-          </p:cNvPr>
-          <p:cNvSpPr>
-            <a:spLocks noGrp="1"/>
-          </p:cNvSpPr>
-          <p:nvPr>
-            <p:ph type="dt" sz="half" idx="10"/>
-          </p:nvPr>
-        </p:nvSpPr>
-        <p:spPr>
-          <a:xfrm>
-            <a:off x="838200" y="6489520"/>
-            <a:ext cx="2743200" cy="365125"/>
-          </a:xfrm>
-        </p:spPr>
-        <p:txBody>
-          <a:bodyPr/>
-          <a:lstStyle/>
-          <a:p>
-            <a:r>
-              <a:rPr lang="fr-FR" dirty="0"/>
-              <a:t>12/10/2022</a:t>
-            </a:r>
-          </a:p>
-        </p:txBody>
-      </p:sp>
-      <p:sp>
-        <p:nvSpPr>
-          <p:cNvPr id="5" name="Espace réservé du pied de page 4">
-            <a:extLst>
-              <a:ext uri="{FF2B5EF4-FFF2-40B4-BE49-F238E27FC236}">
-                <a16:creationId xmlns:a16="http://schemas.microsoft.com/office/drawing/2014/main" id="{E75C31F4-0182-ED79-928B-0DE07ADECB80}"/>
-              </a:ext>
-            </a:extLst>
-          </p:cNvPr>
-          <p:cNvSpPr>
-            <a:spLocks noGrp="1"/>
-          </p:cNvSpPr>
-          <p:nvPr>
-            <p:ph type="ftr" sz="quarter" idx="11"/>
-          </p:nvPr>
-        </p:nvSpPr>
-        <p:spPr>
-          <a:xfrm>
-            <a:off x="3810000" y="6492876"/>
-            <a:ext cx="4800600" cy="365124"/>
-          </a:xfrm>
-        </p:spPr>
-        <p:txBody>
-          <a:bodyPr/>
-          <a:lstStyle/>
-          <a:p>
-            <a:pPr algn="l"/>
-            <a:r>
-              <a:rPr lang="en-US" dirty="0"/>
-              <a:t>Delhomme Jean, </a:t>
-            </a:r>
-            <a:r>
-              <a:rPr lang="en-US" dirty="0" err="1"/>
-              <a:t>Lecourieux</a:t>
-            </a:r>
-            <a:r>
-              <a:rPr lang="en-US" dirty="0"/>
-              <a:t> Adriana, Rousseau Baptiste, </a:t>
-            </a:r>
-            <a:r>
-              <a:rPr lang="en-US" dirty="0" err="1"/>
-              <a:t>Graa</a:t>
-            </a:r>
-            <a:r>
-              <a:rPr lang="en-US" dirty="0"/>
-              <a:t> </a:t>
-            </a:r>
-            <a:r>
-              <a:rPr lang="en-US" dirty="0" err="1"/>
-              <a:t>Maha</a:t>
-            </a:r>
-            <a:endParaRPr lang="en-US" dirty="0"/>
+              <a:t>Conclusion</a:t>
+            </a:r>
           </a:p>
         </p:txBody>
       </p:sp>
@@ -10596,10 +10518,98 @@
       </p:cxnSp>
       <p:sp>
         <p:nvSpPr>
-          <p:cNvPr id="25" name="Espace réservé du contenu 2">
-            <a:extLst>
-              <a:ext uri="{FF2B5EF4-FFF2-40B4-BE49-F238E27FC236}">
-                <a16:creationId xmlns:a16="http://schemas.microsoft.com/office/drawing/2014/main" id="{57CB1EB0-7288-3F4E-B1CC-99784B654109}"/>
+          <p:cNvPr id="3" name="Espace réservé de la date 3">
+            <a:extLst>
+              <a:ext uri="{FF2B5EF4-FFF2-40B4-BE49-F238E27FC236}">
+                <a16:creationId xmlns:a16="http://schemas.microsoft.com/office/drawing/2014/main" id="{00CC99EF-F5C1-BD43-1DFF-BCBA359F5E21}"/>
+              </a:ext>
+            </a:extLst>
+          </p:cNvPr>
+          <p:cNvSpPr>
+            <a:spLocks noGrp="1"/>
+          </p:cNvSpPr>
+          <p:nvPr>
+            <p:ph type="dt" sz="half" idx="10"/>
+          </p:nvPr>
+        </p:nvSpPr>
+        <p:spPr>
+          <a:xfrm>
+            <a:off x="838200" y="6489520"/>
+            <a:ext cx="2743200" cy="365125"/>
+          </a:xfrm>
+        </p:spPr>
+        <p:txBody>
+          <a:bodyPr/>
+          <a:lstStyle/>
+          <a:p>
+            <a:r>
+              <a:rPr lang="fr-FR" dirty="0"/>
+              <a:t>12/10/2022</a:t>
+            </a:r>
+          </a:p>
+        </p:txBody>
+      </p:sp>
+      <p:sp>
+        <p:nvSpPr>
+          <p:cNvPr id="7" name="Espace réservé du pied de page 4">
+            <a:extLst>
+              <a:ext uri="{FF2B5EF4-FFF2-40B4-BE49-F238E27FC236}">
+                <a16:creationId xmlns:a16="http://schemas.microsoft.com/office/drawing/2014/main" id="{69D56551-2494-9A74-75F6-47857596E832}"/>
+              </a:ext>
+            </a:extLst>
+          </p:cNvPr>
+          <p:cNvSpPr>
+            <a:spLocks noGrp="1"/>
+          </p:cNvSpPr>
+          <p:nvPr>
+            <p:ph type="ftr" sz="quarter" idx="11"/>
+          </p:nvPr>
+        </p:nvSpPr>
+        <p:spPr>
+          <a:xfrm>
+            <a:off x="3810000" y="6492876"/>
+            <a:ext cx="4800600" cy="365124"/>
+          </a:xfrm>
+        </p:spPr>
+        <p:txBody>
+          <a:bodyPr/>
+          <a:lstStyle/>
+          <a:p>
+            <a:pPr algn="l"/>
+            <a:r>
+              <a:rPr lang="en-US" dirty="0"/>
+              <a:t>Delhomme Jean, </a:t>
+            </a:r>
+            <a:r>
+              <a:rPr lang="en-US" dirty="0" err="1"/>
+              <a:t>Lecourieux</a:t>
+            </a:r>
+            <a:r>
+              <a:rPr lang="en-US" dirty="0"/>
+              <a:t> Adriana, Rousseau Baptiste, </a:t>
+            </a:r>
+            <a:r>
+              <a:rPr lang="en-US" dirty="0" err="1"/>
+              <a:t>Graa</a:t>
+            </a:r>
+            <a:r>
+              <a:rPr lang="en-US" dirty="0"/>
+              <a:t> </a:t>
+            </a:r>
+            <a:r>
+              <a:rPr lang="en-US" dirty="0" err="1"/>
+              <a:t>Maha</a:t>
+            </a:r>
+            <a:endParaRPr lang="en-US" dirty="0"/>
+          </a:p>
+        </p:txBody>
+      </p:sp>
+      <p:sp>
+        <p:nvSpPr>
+          <p:cNvPr id="9" name="Espace réservé du contenu 2">
+            <a:extLst>
+              <a:ext uri="{FF2B5EF4-FFF2-40B4-BE49-F238E27FC236}">
+                <a16:creationId xmlns:a16="http://schemas.microsoft.com/office/drawing/2014/main" id="{24661F3C-BD68-1889-C53B-A4CD91554EA7}"/>
               </a:ext>
             </a:extLst>
           </p:cNvPr>
@@ -10610,7 +10620,7 @@
         </p:nvSpPr>
         <p:spPr>
           <a:xfrm>
-            <a:off x="231320" y="1006054"/>
+            <a:off x="231320" y="1078238"/>
             <a:ext cx="11824556" cy="5300591"/>
           </a:xfrm>
           <a:prstGeom prst="rect">
@@ -10786,29 +10796,54 @@
             </a:lvl9pPr>
           </a:lstStyle>
           <a:p>
+            <a:pPr>
+              <a:buFontTx/>
+              <a:buChar char="-"/>
+            </a:pPr>
+            <a:r>
+              <a:rPr lang="fr-FR" dirty="0">
+                <a:latin typeface="Arial" panose="020B0604020202020204" pitchFamily="34" charset="0"/>
+                <a:cs typeface="Arial" panose="020B0604020202020204" pitchFamily="34" charset="0"/>
+              </a:rPr>
+              <a:t>Points forts et points faibles des outils</a:t>
+            </a:r>
+          </a:p>
+          <a:p>
             <a:pPr marL="0" indent="0">
               <a:buNone/>
             </a:pPr>
             <a:r>
+              <a:rPr lang="fr-FR" dirty="0" err="1">
+                <a:latin typeface="Arial" panose="020B0604020202020204" pitchFamily="34" charset="0"/>
+                <a:cs typeface="Arial" panose="020B0604020202020204" pitchFamily="34" charset="0"/>
+              </a:rPr>
+              <a:t>Diffiile</a:t>
+            </a:r>
+            <a:r>
               <a:rPr lang="fr-FR" dirty="0">
                 <a:latin typeface="Arial" panose="020B0604020202020204" pitchFamily="34" charset="0"/>
                 <a:cs typeface="Arial" panose="020B0604020202020204" pitchFamily="34" charset="0"/>
               </a:rPr>
-              <a:t>- A l’aide de l’objet R contenant des informations PPI issues de </a:t>
-            </a:r>
+              <a:t> d’installer les packages</a:t>
+            </a:r>
+          </a:p>
+          <a:p>
+            <a:pPr marL="0" indent="0">
+              <a:buNone/>
+            </a:pPr>
             <a:r>
               <a:rPr lang="fr-FR" dirty="0" err="1">
                 <a:latin typeface="Arial" panose="020B0604020202020204" pitchFamily="34" charset="0"/>
                 <a:cs typeface="Arial" panose="020B0604020202020204" pitchFamily="34" charset="0"/>
               </a:rPr>
-              <a:t>BioGRID</a:t>
+              <a:t>mixOmics</a:t>
             </a:r>
             <a:r>
               <a:rPr lang="fr-FR" dirty="0">
                 <a:latin typeface="Arial" panose="020B0604020202020204" pitchFamily="34" charset="0"/>
                 <a:cs typeface="Arial" panose="020B0604020202020204" pitchFamily="34" charset="0"/>
               </a:rPr>
-              <a:t> créer un réseau PPI avec</a:t>
+              <a:t> c’est top</a:t>
             </a:r>
           </a:p>
           <a:p>
@@ -10816,89 +10851,92 @@
               <a:buNone/>
             </a:pPr>
             <a:r>
+              <a:rPr lang="fr-FR" dirty="0" err="1">
+                <a:latin typeface="Arial" panose="020B0604020202020204" pitchFamily="34" charset="0"/>
+                <a:cs typeface="Arial" panose="020B0604020202020204" pitchFamily="34" charset="0"/>
+              </a:rPr>
+              <a:t>Mirtarbase</a:t>
+            </a:r>
+            <a:r>
               <a:rPr lang="fr-FR" dirty="0">
                 <a:latin typeface="Arial" panose="020B0604020202020204" pitchFamily="34" charset="0"/>
                 <a:cs typeface="Arial" panose="020B0604020202020204" pitchFamily="34" charset="0"/>
               </a:rPr>
-              <a:t>seulement les protéines issues de votre </a:t>
-            </a:r>
+              <a:t> est nul et mal documenté (le site est mort)</a:t>
+            </a:r>
+          </a:p>
+          <a:p>
+            <a:pPr marL="0" indent="0">
+              <a:buNone/>
+            </a:pPr>
             <a:r>
               <a:rPr lang="fr-FR" dirty="0" err="1">
                 <a:latin typeface="Arial" panose="020B0604020202020204" pitchFamily="34" charset="0"/>
                 <a:cs typeface="Arial" panose="020B0604020202020204" pitchFamily="34" charset="0"/>
               </a:rPr>
-              <a:t>dataset</a:t>
-            </a:r>
+              <a:t>MirdB</a:t>
+            </a:r>
+            <a:endParaRPr lang="fr-FR" dirty="0">
+              <a:latin typeface="Arial" panose="020B0604020202020204" pitchFamily="34" charset="0"/>
+              <a:cs typeface="Arial" panose="020B0604020202020204" pitchFamily="34" charset="0"/>
+            </a:endParaRPr>
+          </a:p>
+          <a:p>
+            <a:pPr marL="0" indent="0">
+              <a:buNone/>
+            </a:pPr>
+            <a:r>
+              <a:rPr lang="fr-FR" dirty="0" err="1">
+                <a:latin typeface="Arial" panose="020B0604020202020204" pitchFamily="34" charset="0"/>
+                <a:cs typeface="Arial" panose="020B0604020202020204" pitchFamily="34" charset="0"/>
+              </a:rPr>
+              <a:t>MirBase</a:t>
+            </a:r>
+            <a:endParaRPr lang="fr-FR" dirty="0">
+              <a:latin typeface="Arial" panose="020B0604020202020204" pitchFamily="34" charset="0"/>
+              <a:cs typeface="Arial" panose="020B0604020202020204" pitchFamily="34" charset="0"/>
+            </a:endParaRPr>
+          </a:p>
+          <a:p>
+            <a:pPr marL="0" indent="0">
+              <a:buNone/>
+            </a:pPr>
+            <a:r>
+              <a:rPr lang="fr-FR" dirty="0" err="1">
+                <a:latin typeface="Arial" panose="020B0604020202020204" pitchFamily="34" charset="0"/>
+                <a:cs typeface="Arial" panose="020B0604020202020204" pitchFamily="34" charset="0"/>
+              </a:rPr>
+              <a:t>Tarbase</a:t>
+            </a:r>
+            <a:endParaRPr lang="fr-FR" dirty="0">
+              <a:latin typeface="Arial" panose="020B0604020202020204" pitchFamily="34" charset="0"/>
+              <a:cs typeface="Arial" panose="020B0604020202020204" pitchFamily="34" charset="0"/>
+            </a:endParaRPr>
+          </a:p>
+          <a:p>
+            <a:pPr>
+              <a:buFontTx/>
+              <a:buChar char="-"/>
+            </a:pPr>
             <a:r>
               <a:rPr lang="fr-FR" dirty="0">
                 <a:latin typeface="Arial" panose="020B0604020202020204" pitchFamily="34" charset="0"/>
                 <a:cs typeface="Arial" panose="020B0604020202020204" pitchFamily="34" charset="0"/>
               </a:rPr>
-              <a:t>.</a:t>
-            </a:r>
-          </a:p>
-          <a:p>
-            <a:pPr marL="0" indent="0">
-              <a:buNone/>
+              <a:t>Difficultés rencontrées</a:t>
+            </a:r>
+          </a:p>
+          <a:p>
+            <a:pPr>
+              <a:buFontTx/>
+              <a:buChar char="-"/>
             </a:pPr>
             <a:r>
               <a:rPr lang="fr-FR" dirty="0">
                 <a:latin typeface="Arial" panose="020B0604020202020204" pitchFamily="34" charset="0"/>
                 <a:cs typeface="Arial" panose="020B0604020202020204" pitchFamily="34" charset="0"/>
               </a:rPr>
-              <a:t>- Combien y a-t-il de </a:t>
-            </a:r>
-            <a:r>
-              <a:rPr lang="fr-FR" dirty="0" err="1">
-                <a:latin typeface="Arial" panose="020B0604020202020204" pitchFamily="34" charset="0"/>
-                <a:cs typeface="Arial" panose="020B0604020202020204" pitchFamily="34" charset="0"/>
-              </a:rPr>
-              <a:t>noeuds</a:t>
-            </a:r>
-            <a:r>
-              <a:rPr lang="fr-FR" dirty="0">
-                <a:latin typeface="Arial" panose="020B0604020202020204" pitchFamily="34" charset="0"/>
-                <a:cs typeface="Arial" panose="020B0604020202020204" pitchFamily="34" charset="0"/>
-              </a:rPr>
-              <a:t>, arête, </a:t>
-            </a:r>
-            <a:r>
-              <a:rPr lang="fr-FR" dirty="0" err="1">
-                <a:latin typeface="Arial" panose="020B0604020202020204" pitchFamily="34" charset="0"/>
-                <a:cs typeface="Arial" panose="020B0604020202020204" pitchFamily="34" charset="0"/>
-              </a:rPr>
-              <a:t>noeuds</a:t>
-            </a:r>
-            <a:r>
-              <a:rPr lang="fr-FR" dirty="0">
-                <a:latin typeface="Arial" panose="020B0604020202020204" pitchFamily="34" charset="0"/>
-                <a:cs typeface="Arial" panose="020B0604020202020204" pitchFamily="34" charset="0"/>
-              </a:rPr>
-              <a:t> déconnectés</a:t>
-            </a:r>
-          </a:p>
-          <a:p>
-            <a:pPr marL="0" indent="0">
-              <a:buNone/>
-            </a:pPr>
-            <a:r>
-              <a:rPr lang="fr-FR" dirty="0">
-                <a:latin typeface="Arial" panose="020B0604020202020204" pitchFamily="34" charset="0"/>
-                <a:cs typeface="Arial" panose="020B0604020202020204" pitchFamily="34" charset="0"/>
-              </a:rPr>
-              <a:t>- Affichez distribution des degrés</a:t>
-            </a:r>
-          </a:p>
-          <a:p>
-            <a:pPr marL="0" indent="0">
-              <a:buNone/>
-            </a:pPr>
-            <a:r>
-              <a:rPr lang="fr-FR" dirty="0">
-                <a:latin typeface="Arial" panose="020B0604020202020204" pitchFamily="34" charset="0"/>
-                <a:cs typeface="Arial" panose="020B0604020202020204" pitchFamily="34" charset="0"/>
-              </a:rPr>
-              <a:t>- Quelle protéine est la plus connectée ?</a:t>
+              <a:t>Résumé des résultats</a:t>
             </a:r>
           </a:p>
         </p:txBody>
@@ -10906,7 +10944,7 @@
     </p:spTree>
     <p:extLst>
       <p:ext uri="{BB962C8B-B14F-4D97-AF65-F5344CB8AC3E}">
-        <p14:creationId xmlns:p14="http://schemas.microsoft.com/office/powerpoint/2010/main" val="1604260450"/>
+        <p14:creationId xmlns:p14="http://schemas.microsoft.com/office/powerpoint/2010/main" val="2333177088"/>
       </p:ext>
     </p:extLst>
   </p:cSld>
@@ -10951,7 +10989,7 @@
         </p:nvSpPr>
         <p:spPr>
           <a:xfrm>
-            <a:off x="145740" y="118307"/>
+            <a:off x="145740" y="117877"/>
             <a:ext cx="11137778" cy="691318"/>
           </a:xfrm>
         </p:spPr>
@@ -10962,32 +11000,21 @@
           <a:lstStyle/>
           <a:p>
             <a:r>
-              <a:rPr lang="fr-FR" sz="3200" b="1" dirty="0">
+              <a:rPr lang="en-US" sz="3200" b="1" dirty="0">
                 <a:latin typeface="Arial" panose="020B0604020202020204" pitchFamily="34" charset="0"/>
                 <a:cs typeface="Arial" panose="020B0604020202020204" pitchFamily="34" charset="0"/>
               </a:rPr>
-              <a:t>3.3.	Mise en réseau – Connection gène-</a:t>
-            </a:r>
-            <a:r>
-              <a:rPr lang="fr-FR" sz="3200" b="1" dirty="0" err="1">
-                <a:latin typeface="Arial" panose="020B0604020202020204" pitchFamily="34" charset="0"/>
-                <a:cs typeface="Arial" panose="020B0604020202020204" pitchFamily="34" charset="0"/>
-              </a:rPr>
-              <a:t>prot</a:t>
-            </a:r>
-            <a:endParaRPr lang="fr-FR" sz="3200" b="1" baseline="30000" dirty="0">
-              <a:latin typeface="Arial" panose="020B0604020202020204" pitchFamily="34" charset="0"/>
-              <a:cs typeface="Arial" panose="020B0604020202020204" pitchFamily="34" charset="0"/>
-            </a:endParaRPr>
-          </a:p>
-        </p:txBody>
-      </p:sp>
-      <p:sp>
-        <p:nvSpPr>
-          <p:cNvPr id="4" name="Espace réservé de la date 3">
-            <a:extLst>
-              <a:ext uri="{FF2B5EF4-FFF2-40B4-BE49-F238E27FC236}">
-                <a16:creationId xmlns:a16="http://schemas.microsoft.com/office/drawing/2014/main" id="{F181D9E9-DC4C-4780-75B9-9F6317E5BD1A}"/>
+              <a:t>References</a:t>
+            </a:r>
+          </a:p>
+        </p:txBody>
+      </p:sp>
+      <p:sp>
+        <p:nvSpPr>
+          <p:cNvPr id="3" name="Espace réservé du contenu 2">
+            <a:extLst>
+              <a:ext uri="{FF2B5EF4-FFF2-40B4-BE49-F238E27FC236}">
+                <a16:creationId xmlns:a16="http://schemas.microsoft.com/office/drawing/2014/main" id="{7D811F63-52EF-83B1-E13C-148915CEDEC3}"/>
               </a:ext>
             </a:extLst>
           </p:cNvPr>
@@ -10995,78 +11022,1042 @@
             <a:spLocks noGrp="1"/>
           </p:cNvSpPr>
           <p:nvPr>
-            <p:ph type="dt" sz="half" idx="10"/>
-          </p:nvPr>
-        </p:nvSpPr>
-        <p:spPr>
-          <a:xfrm>
-            <a:off x="838200" y="6489520"/>
-            <a:ext cx="2743200" cy="365125"/>
+            <p:ph idx="1"/>
+          </p:nvPr>
+        </p:nvSpPr>
+        <p:spPr>
+          <a:xfrm>
+            <a:off x="145740" y="964491"/>
+            <a:ext cx="11910136" cy="5498453"/>
           </a:xfrm>
         </p:spPr>
         <p:txBody>
           <a:bodyPr/>
           <a:lstStyle/>
           <a:p>
-            <a:r>
-              <a:rPr lang="fr-FR" dirty="0"/>
-              <a:t>12/10/2022</a:t>
-            </a:r>
-          </a:p>
-        </p:txBody>
-      </p:sp>
-      <p:sp>
-        <p:nvSpPr>
-          <p:cNvPr id="5" name="Espace réservé du pied de page 4">
-            <a:extLst>
-              <a:ext uri="{FF2B5EF4-FFF2-40B4-BE49-F238E27FC236}">
-                <a16:creationId xmlns:a16="http://schemas.microsoft.com/office/drawing/2014/main" id="{E75C31F4-0182-ED79-928B-0DE07ADECB80}"/>
-              </a:ext>
-            </a:extLst>
-          </p:cNvPr>
-          <p:cNvSpPr>
-            <a:spLocks noGrp="1"/>
-          </p:cNvSpPr>
-          <p:nvPr>
-            <p:ph type="ftr" sz="quarter" idx="11"/>
-          </p:nvPr>
-        </p:nvSpPr>
-        <p:spPr>
-          <a:xfrm>
-            <a:off x="3810000" y="6492876"/>
-            <a:ext cx="4800600" cy="365124"/>
-          </a:xfrm>
-        </p:spPr>
-        <p:txBody>
-          <a:bodyPr/>
-          <a:lstStyle/>
-          <a:p>
-            <a:pPr algn="l"/>
-            <a:r>
-              <a:rPr lang="en-US" dirty="0"/>
-              <a:t>Delhomme Jean, </a:t>
-            </a:r>
-            <a:r>
-              <a:rPr lang="en-US" dirty="0" err="1"/>
-              <a:t>Lecourieux</a:t>
-            </a:r>
-            <a:r>
-              <a:rPr lang="en-US" dirty="0"/>
-              <a:t> Adriana, Rousseau Baptiste, </a:t>
-            </a:r>
-            <a:r>
-              <a:rPr lang="en-US" dirty="0" err="1"/>
-              <a:t>Graa</a:t>
-            </a:r>
-            <a:r>
-              <a:rPr lang="en-US" dirty="0"/>
+            <a:pPr marL="342900" lvl="0" indent="-342900">
+              <a:lnSpc>
+                <a:spcPct val="107000"/>
+              </a:lnSpc>
+              <a:buFont typeface="+mj-lt"/>
+              <a:buAutoNum type="arabicPeriod"/>
+            </a:pPr>
+            <a:r>
+              <a:rPr lang="fr-FR" sz="1800" dirty="0">
+                <a:effectLst/>
+                <a:latin typeface="Times New Roman" panose="02020603050405020304" pitchFamily="18" charset="0"/>
+                <a:ea typeface="Calibri" panose="020F0502020204030204" pitchFamily="34" charset="0"/>
+                <a:cs typeface="Times New Roman" panose="02020603050405020304" pitchFamily="18" charset="0"/>
+              </a:rPr>
+              <a:t>S. </a:t>
+            </a:r>
+            <a:r>
+              <a:rPr lang="fr-FR" sz="1800" dirty="0" err="1">
+                <a:effectLst/>
+                <a:latin typeface="Times New Roman" panose="02020603050405020304" pitchFamily="18" charset="0"/>
+                <a:ea typeface="Calibri" panose="020F0502020204030204" pitchFamily="34" charset="0"/>
+                <a:cs typeface="Times New Roman" panose="02020603050405020304" pitchFamily="18" charset="0"/>
+              </a:rPr>
+              <a:t>Altschul</a:t>
+            </a:r>
+            <a:r>
+              <a:rPr lang="fr-FR" sz="1800" dirty="0">
+                <a:effectLst/>
+                <a:latin typeface="Times New Roman" panose="02020603050405020304" pitchFamily="18" charset="0"/>
+                <a:ea typeface="Calibri" panose="020F0502020204030204" pitchFamily="34" charset="0"/>
+                <a:cs typeface="Times New Roman" panose="02020603050405020304" pitchFamily="18" charset="0"/>
+              </a:rPr>
+              <a:t> et al. (2017) </a:t>
+            </a:r>
+            <a:r>
+              <a:rPr lang="fr-FR" sz="1800" dirty="0" err="1">
+                <a:effectLst/>
+                <a:latin typeface="Times New Roman" panose="02020603050405020304" pitchFamily="18" charset="0"/>
+                <a:ea typeface="Calibri" panose="020F0502020204030204" pitchFamily="34" charset="0"/>
+                <a:cs typeface="Times New Roman" panose="02020603050405020304" pitchFamily="18" charset="0"/>
+              </a:rPr>
+              <a:t>Handbook</a:t>
+            </a:r>
+            <a:r>
+              <a:rPr lang="fr-FR" sz="1800" dirty="0">
+                <a:effectLst/>
+                <a:latin typeface="Times New Roman" panose="02020603050405020304" pitchFamily="18" charset="0"/>
+                <a:ea typeface="Calibri" panose="020F0502020204030204" pitchFamily="34" charset="0"/>
+                <a:cs typeface="Times New Roman" panose="02020603050405020304" pitchFamily="18" charset="0"/>
+              </a:rPr>
+              <a:t> of </a:t>
+            </a:r>
+            <a:r>
+              <a:rPr lang="fr-FR" sz="1800" dirty="0" err="1">
+                <a:effectLst/>
+                <a:latin typeface="Times New Roman" panose="02020603050405020304" pitchFamily="18" charset="0"/>
+                <a:ea typeface="Calibri" panose="020F0502020204030204" pitchFamily="34" charset="0"/>
+                <a:cs typeface="Times New Roman" panose="02020603050405020304" pitchFamily="18" charset="0"/>
+              </a:rPr>
+              <a:t>Discrete</a:t>
+            </a:r>
+            <a:r>
+              <a:rPr lang="fr-FR" sz="1800" dirty="0">
+                <a:effectLst/>
+                <a:latin typeface="Times New Roman" panose="02020603050405020304" pitchFamily="18" charset="0"/>
+                <a:ea typeface="Calibri" panose="020F0502020204030204" pitchFamily="34" charset="0"/>
+                <a:cs typeface="Times New Roman" panose="02020603050405020304" pitchFamily="18" charset="0"/>
+              </a:rPr>
+              <a:t> and </a:t>
+            </a:r>
+            <a:r>
+              <a:rPr lang="fr-FR" sz="1800" dirty="0" err="1">
+                <a:effectLst/>
+                <a:latin typeface="Times New Roman" panose="02020603050405020304" pitchFamily="18" charset="0"/>
+                <a:ea typeface="Calibri" panose="020F0502020204030204" pitchFamily="34" charset="0"/>
+                <a:cs typeface="Times New Roman" panose="02020603050405020304" pitchFamily="18" charset="0"/>
+              </a:rPr>
+              <a:t>Combinatorial</a:t>
+            </a:r>
+            <a:r>
+              <a:rPr lang="fr-FR" sz="1800" dirty="0">
+                <a:effectLst/>
+                <a:latin typeface="Times New Roman" panose="02020603050405020304" pitchFamily="18" charset="0"/>
+                <a:ea typeface="Calibri" panose="020F0502020204030204" pitchFamily="34" charset="0"/>
+                <a:cs typeface="Times New Roman" panose="02020603050405020304" pitchFamily="18" charset="0"/>
+              </a:rPr>
               <a:t> </a:t>
             </a:r>
             <a:r>
-              <a:rPr lang="en-US" dirty="0" err="1"/>
-              <a:t>Maha</a:t>
-            </a:r>
-            <a:endParaRPr lang="en-US" dirty="0"/>
+              <a:rPr lang="fr-FR" sz="1800" dirty="0" err="1">
+                <a:effectLst/>
+                <a:latin typeface="Times New Roman" panose="02020603050405020304" pitchFamily="18" charset="0"/>
+                <a:ea typeface="Calibri" panose="020F0502020204030204" pitchFamily="34" charset="0"/>
+                <a:cs typeface="Times New Roman" panose="02020603050405020304" pitchFamily="18" charset="0"/>
+              </a:rPr>
+              <a:t>Mathematics</a:t>
+            </a:r>
+            <a:r>
+              <a:rPr lang="fr-FR" sz="1800" dirty="0">
+                <a:effectLst/>
+                <a:latin typeface="Times New Roman" panose="02020603050405020304" pitchFamily="18" charset="0"/>
+                <a:ea typeface="Calibri" panose="020F0502020204030204" pitchFamily="34" charset="0"/>
+                <a:cs typeface="Times New Roman" panose="02020603050405020304" pitchFamily="18" charset="0"/>
+              </a:rPr>
+              <a:t>. 2nd </a:t>
+            </a:r>
+            <a:r>
+              <a:rPr lang="fr-FR" sz="1800" dirty="0" err="1">
+                <a:effectLst/>
+                <a:latin typeface="Times New Roman" panose="02020603050405020304" pitchFamily="18" charset="0"/>
+                <a:ea typeface="Calibri" panose="020F0502020204030204" pitchFamily="34" charset="0"/>
+                <a:cs typeface="Times New Roman" panose="02020603050405020304" pitchFamily="18" charset="0"/>
+              </a:rPr>
+              <a:t>edition</a:t>
+            </a:r>
+            <a:r>
+              <a:rPr lang="fr-FR" sz="1800" dirty="0">
+                <a:effectLst/>
+                <a:latin typeface="Times New Roman" panose="02020603050405020304" pitchFamily="18" charset="0"/>
+                <a:ea typeface="Calibri" panose="020F0502020204030204" pitchFamily="34" charset="0"/>
+                <a:cs typeface="Times New Roman" panose="02020603050405020304" pitchFamily="18" charset="0"/>
+              </a:rPr>
+              <a:t>, </a:t>
+            </a:r>
+            <a:r>
+              <a:rPr lang="fr-FR" sz="1800" dirty="0" err="1">
+                <a:effectLst/>
+                <a:latin typeface="Times New Roman" panose="02020603050405020304" pitchFamily="18" charset="0"/>
+                <a:ea typeface="Calibri" panose="020F0502020204030204" pitchFamily="34" charset="0"/>
+                <a:cs typeface="Times New Roman" panose="02020603050405020304" pitchFamily="18" charset="0"/>
+              </a:rPr>
+              <a:t>Chapter</a:t>
+            </a:r>
+            <a:r>
+              <a:rPr lang="fr-FR" sz="1800" dirty="0">
+                <a:effectLst/>
+                <a:latin typeface="Times New Roman" panose="02020603050405020304" pitchFamily="18" charset="0"/>
+                <a:ea typeface="Calibri" panose="020F0502020204030204" pitchFamily="34" charset="0"/>
+                <a:cs typeface="Times New Roman" panose="02020603050405020304" pitchFamily="18" charset="0"/>
+              </a:rPr>
+              <a:t> 20.1 </a:t>
+            </a:r>
+            <a:r>
+              <a:rPr lang="fr-FR" sz="1800" dirty="0" err="1">
+                <a:effectLst/>
+                <a:latin typeface="Times New Roman" panose="02020603050405020304" pitchFamily="18" charset="0"/>
+                <a:ea typeface="Calibri" panose="020F0502020204030204" pitchFamily="34" charset="0"/>
+                <a:cs typeface="Times New Roman" panose="02020603050405020304" pitchFamily="18" charset="0"/>
+              </a:rPr>
+              <a:t>Sequence</a:t>
+            </a:r>
+            <a:endParaRPr lang="fr-FR" sz="1800" dirty="0">
+              <a:effectLst/>
+              <a:latin typeface="Calibri" panose="020F0502020204030204" pitchFamily="34" charset="0"/>
+              <a:ea typeface="Calibri" panose="020F0502020204030204" pitchFamily="34" charset="0"/>
+              <a:cs typeface="Times New Roman" panose="02020603050405020304" pitchFamily="18" charset="0"/>
+            </a:endParaRPr>
+          </a:p>
+          <a:p>
+            <a:pPr marL="342900" lvl="0" indent="-342900" algn="just">
+              <a:lnSpc>
+                <a:spcPct val="107000"/>
+              </a:lnSpc>
+              <a:buFont typeface="+mj-lt"/>
+              <a:buAutoNum type="arabicPeriod"/>
+            </a:pPr>
+            <a:r>
+              <a:rPr lang="fr-FR" sz="1800" dirty="0">
+                <a:effectLst/>
+                <a:latin typeface="Times New Roman" panose="02020603050405020304" pitchFamily="18" charset="0"/>
+                <a:ea typeface="Calibri" panose="020F0502020204030204" pitchFamily="34" charset="0"/>
+                <a:cs typeface="Times New Roman" panose="02020603050405020304" pitchFamily="18" charset="0"/>
+              </a:rPr>
+              <a:t>T. </a:t>
+            </a:r>
+            <a:r>
+              <a:rPr lang="fr-FR" sz="1800" dirty="0" err="1">
+                <a:effectLst/>
+                <a:latin typeface="Times New Roman" panose="02020603050405020304" pitchFamily="18" charset="0"/>
+                <a:ea typeface="Calibri" panose="020F0502020204030204" pitchFamily="34" charset="0"/>
+                <a:cs typeface="Times New Roman" panose="02020603050405020304" pitchFamily="18" charset="0"/>
+              </a:rPr>
+              <a:t>Bepler</a:t>
+            </a:r>
+            <a:r>
+              <a:rPr lang="fr-FR" sz="1800" dirty="0">
+                <a:effectLst/>
+                <a:latin typeface="Times New Roman" panose="02020603050405020304" pitchFamily="18" charset="0"/>
+                <a:ea typeface="Calibri" panose="020F0502020204030204" pitchFamily="34" charset="0"/>
+                <a:cs typeface="Times New Roman" panose="02020603050405020304" pitchFamily="18" charset="0"/>
+              </a:rPr>
+              <a:t> et al. (2021) Learning the </a:t>
+            </a:r>
+            <a:r>
+              <a:rPr lang="fr-FR" sz="1800" dirty="0" err="1">
+                <a:effectLst/>
+                <a:latin typeface="Times New Roman" panose="02020603050405020304" pitchFamily="18" charset="0"/>
+                <a:ea typeface="Calibri" panose="020F0502020204030204" pitchFamily="34" charset="0"/>
+                <a:cs typeface="Times New Roman" panose="02020603050405020304" pitchFamily="18" charset="0"/>
+              </a:rPr>
+              <a:t>protein</a:t>
+            </a:r>
+            <a:r>
+              <a:rPr lang="fr-FR" sz="1800" dirty="0">
+                <a:effectLst/>
+                <a:latin typeface="Times New Roman" panose="02020603050405020304" pitchFamily="18" charset="0"/>
+                <a:ea typeface="Calibri" panose="020F0502020204030204" pitchFamily="34" charset="0"/>
+                <a:cs typeface="Times New Roman" panose="02020603050405020304" pitchFamily="18" charset="0"/>
+              </a:rPr>
+              <a:t> </a:t>
+            </a:r>
+            <a:r>
+              <a:rPr lang="fr-FR" sz="1800" dirty="0" err="1">
+                <a:effectLst/>
+                <a:latin typeface="Times New Roman" panose="02020603050405020304" pitchFamily="18" charset="0"/>
+                <a:ea typeface="Calibri" panose="020F0502020204030204" pitchFamily="34" charset="0"/>
+                <a:cs typeface="Times New Roman" panose="02020603050405020304" pitchFamily="18" charset="0"/>
+              </a:rPr>
+              <a:t>language</a:t>
+            </a:r>
+            <a:r>
+              <a:rPr lang="fr-FR" sz="1800" dirty="0">
+                <a:effectLst/>
+                <a:latin typeface="Times New Roman" panose="02020603050405020304" pitchFamily="18" charset="0"/>
+                <a:ea typeface="Calibri" panose="020F0502020204030204" pitchFamily="34" charset="0"/>
+                <a:cs typeface="Times New Roman" panose="02020603050405020304" pitchFamily="18" charset="0"/>
+              </a:rPr>
+              <a:t>: Evolution, structure, and </a:t>
+            </a:r>
+            <a:r>
+              <a:rPr lang="fr-FR" sz="1800" dirty="0" err="1">
+                <a:effectLst/>
+                <a:latin typeface="Times New Roman" panose="02020603050405020304" pitchFamily="18" charset="0"/>
+                <a:ea typeface="Calibri" panose="020F0502020204030204" pitchFamily="34" charset="0"/>
+                <a:cs typeface="Times New Roman" panose="02020603050405020304" pitchFamily="18" charset="0"/>
+              </a:rPr>
+              <a:t>function</a:t>
+            </a:r>
+            <a:r>
+              <a:rPr lang="fr-FR" sz="1800" dirty="0">
+                <a:effectLst/>
+                <a:latin typeface="Times New Roman" panose="02020603050405020304" pitchFamily="18" charset="0"/>
+                <a:ea typeface="Calibri" panose="020F0502020204030204" pitchFamily="34" charset="0"/>
+                <a:cs typeface="Times New Roman" panose="02020603050405020304" pitchFamily="18" charset="0"/>
+              </a:rPr>
+              <a:t>.</a:t>
+            </a:r>
+            <a:endParaRPr lang="fr-FR" sz="1800" dirty="0">
+              <a:effectLst/>
+              <a:latin typeface="Calibri" panose="020F0502020204030204" pitchFamily="34" charset="0"/>
+              <a:ea typeface="Calibri" panose="020F0502020204030204" pitchFamily="34" charset="0"/>
+              <a:cs typeface="Times New Roman" panose="02020603050405020304" pitchFamily="18" charset="0"/>
+            </a:endParaRPr>
+          </a:p>
+          <a:p>
+            <a:pPr marL="342900" lvl="0" indent="-342900">
+              <a:lnSpc>
+                <a:spcPct val="107000"/>
+              </a:lnSpc>
+              <a:buFont typeface="+mj-lt"/>
+              <a:buAutoNum type="arabicPeriod"/>
+            </a:pPr>
+            <a:r>
+              <a:rPr lang="fr-FR" sz="1800" dirty="0" err="1">
+                <a:effectLst/>
+                <a:latin typeface="Times New Roman" panose="02020603050405020304" pitchFamily="18" charset="0"/>
+                <a:ea typeface="Calibri" panose="020F0502020204030204" pitchFamily="34" charset="0"/>
+                <a:cs typeface="Times New Roman" panose="02020603050405020304" pitchFamily="18" charset="0"/>
+              </a:rPr>
+              <a:t>Needleman</a:t>
+            </a:r>
+            <a:r>
+              <a:rPr lang="fr-FR" sz="1800" dirty="0">
+                <a:effectLst/>
+                <a:latin typeface="Times New Roman" panose="02020603050405020304" pitchFamily="18" charset="0"/>
+                <a:ea typeface="Calibri" panose="020F0502020204030204" pitchFamily="34" charset="0"/>
+                <a:cs typeface="Times New Roman" panose="02020603050405020304" pitchFamily="18" charset="0"/>
+              </a:rPr>
+              <a:t>, Saul B. &amp; </a:t>
+            </a:r>
+            <a:r>
+              <a:rPr lang="fr-FR" sz="1800" dirty="0" err="1">
+                <a:effectLst/>
+                <a:latin typeface="Times New Roman" panose="02020603050405020304" pitchFamily="18" charset="0"/>
+                <a:ea typeface="Calibri" panose="020F0502020204030204" pitchFamily="34" charset="0"/>
+                <a:cs typeface="Times New Roman" panose="02020603050405020304" pitchFamily="18" charset="0"/>
+              </a:rPr>
+              <a:t>Wunsch</a:t>
+            </a:r>
+            <a:r>
+              <a:rPr lang="fr-FR" sz="1800" dirty="0">
+                <a:effectLst/>
+                <a:latin typeface="Times New Roman" panose="02020603050405020304" pitchFamily="18" charset="0"/>
+                <a:ea typeface="Calibri" panose="020F0502020204030204" pitchFamily="34" charset="0"/>
+                <a:cs typeface="Times New Roman" panose="02020603050405020304" pitchFamily="18" charset="0"/>
+              </a:rPr>
+              <a:t>, Christian D. (1970) A </a:t>
+            </a:r>
+            <a:r>
+              <a:rPr lang="fr-FR" sz="1800" dirty="0" err="1">
+                <a:effectLst/>
+                <a:latin typeface="Times New Roman" panose="02020603050405020304" pitchFamily="18" charset="0"/>
+                <a:ea typeface="Calibri" panose="020F0502020204030204" pitchFamily="34" charset="0"/>
+                <a:cs typeface="Times New Roman" panose="02020603050405020304" pitchFamily="18" charset="0"/>
+              </a:rPr>
+              <a:t>general</a:t>
+            </a:r>
+            <a:r>
+              <a:rPr lang="fr-FR" sz="1800" dirty="0">
+                <a:effectLst/>
+                <a:latin typeface="Times New Roman" panose="02020603050405020304" pitchFamily="18" charset="0"/>
+                <a:ea typeface="Calibri" panose="020F0502020204030204" pitchFamily="34" charset="0"/>
+                <a:cs typeface="Times New Roman" panose="02020603050405020304" pitchFamily="18" charset="0"/>
+              </a:rPr>
+              <a:t> </a:t>
+            </a:r>
+            <a:r>
+              <a:rPr lang="fr-FR" sz="1800" dirty="0" err="1">
+                <a:effectLst/>
+                <a:latin typeface="Times New Roman" panose="02020603050405020304" pitchFamily="18" charset="0"/>
+                <a:ea typeface="Calibri" panose="020F0502020204030204" pitchFamily="34" charset="0"/>
+                <a:cs typeface="Times New Roman" panose="02020603050405020304" pitchFamily="18" charset="0"/>
+              </a:rPr>
+              <a:t>method</a:t>
+            </a:r>
+            <a:r>
+              <a:rPr lang="fr-FR" sz="1800" dirty="0">
+                <a:effectLst/>
+                <a:latin typeface="Times New Roman" panose="02020603050405020304" pitchFamily="18" charset="0"/>
+                <a:ea typeface="Calibri" panose="020F0502020204030204" pitchFamily="34" charset="0"/>
+                <a:cs typeface="Times New Roman" panose="02020603050405020304" pitchFamily="18" charset="0"/>
+              </a:rPr>
+              <a:t> applicable to the </a:t>
+            </a:r>
+            <a:r>
+              <a:rPr lang="fr-FR" sz="1800" dirty="0" err="1">
+                <a:effectLst/>
+                <a:latin typeface="Times New Roman" panose="02020603050405020304" pitchFamily="18" charset="0"/>
+                <a:ea typeface="Calibri" panose="020F0502020204030204" pitchFamily="34" charset="0"/>
+                <a:cs typeface="Times New Roman" panose="02020603050405020304" pitchFamily="18" charset="0"/>
+              </a:rPr>
+              <a:t>search</a:t>
+            </a:r>
+            <a:r>
+              <a:rPr lang="fr-FR" sz="1800" dirty="0">
+                <a:effectLst/>
+                <a:latin typeface="Times New Roman" panose="02020603050405020304" pitchFamily="18" charset="0"/>
+                <a:ea typeface="Calibri" panose="020F0502020204030204" pitchFamily="34" charset="0"/>
+                <a:cs typeface="Times New Roman" panose="02020603050405020304" pitchFamily="18" charset="0"/>
+              </a:rPr>
+              <a:t> for </a:t>
+            </a:r>
+            <a:r>
+              <a:rPr lang="fr-FR" sz="1800" dirty="0" err="1">
+                <a:effectLst/>
+                <a:latin typeface="Times New Roman" panose="02020603050405020304" pitchFamily="18" charset="0"/>
+                <a:ea typeface="Calibri" panose="020F0502020204030204" pitchFamily="34" charset="0"/>
+                <a:cs typeface="Times New Roman" panose="02020603050405020304" pitchFamily="18" charset="0"/>
+              </a:rPr>
+              <a:t>similarities</a:t>
+            </a:r>
+            <a:r>
+              <a:rPr lang="fr-FR" sz="1800" dirty="0">
+                <a:effectLst/>
+                <a:latin typeface="Times New Roman" panose="02020603050405020304" pitchFamily="18" charset="0"/>
+                <a:ea typeface="Calibri" panose="020F0502020204030204" pitchFamily="34" charset="0"/>
+                <a:cs typeface="Times New Roman" panose="02020603050405020304" pitchFamily="18" charset="0"/>
+              </a:rPr>
+              <a:t> in the </a:t>
+            </a:r>
+            <a:r>
+              <a:rPr lang="fr-FR" sz="1800" dirty="0" err="1">
+                <a:effectLst/>
+                <a:latin typeface="Times New Roman" panose="02020603050405020304" pitchFamily="18" charset="0"/>
+                <a:ea typeface="Calibri" panose="020F0502020204030204" pitchFamily="34" charset="0"/>
+                <a:cs typeface="Times New Roman" panose="02020603050405020304" pitchFamily="18" charset="0"/>
+              </a:rPr>
+              <a:t>amino</a:t>
+            </a:r>
+            <a:r>
+              <a:rPr lang="fr-FR" sz="1800" dirty="0">
+                <a:effectLst/>
+                <a:latin typeface="Times New Roman" panose="02020603050405020304" pitchFamily="18" charset="0"/>
+                <a:ea typeface="Calibri" panose="020F0502020204030204" pitchFamily="34" charset="0"/>
+                <a:cs typeface="Times New Roman" panose="02020603050405020304" pitchFamily="18" charset="0"/>
+              </a:rPr>
+              <a:t> </a:t>
+            </a:r>
+            <a:r>
+              <a:rPr lang="fr-FR" sz="1800" dirty="0" err="1">
+                <a:effectLst/>
+                <a:latin typeface="Times New Roman" panose="02020603050405020304" pitchFamily="18" charset="0"/>
+                <a:ea typeface="Calibri" panose="020F0502020204030204" pitchFamily="34" charset="0"/>
+                <a:cs typeface="Times New Roman" panose="02020603050405020304" pitchFamily="18" charset="0"/>
+              </a:rPr>
+              <a:t>acid</a:t>
+            </a:r>
+            <a:r>
+              <a:rPr lang="fr-FR" sz="1800" dirty="0">
+                <a:effectLst/>
+                <a:latin typeface="Times New Roman" panose="02020603050405020304" pitchFamily="18" charset="0"/>
+                <a:ea typeface="Calibri" panose="020F0502020204030204" pitchFamily="34" charset="0"/>
+                <a:cs typeface="Times New Roman" panose="02020603050405020304" pitchFamily="18" charset="0"/>
+              </a:rPr>
+              <a:t> </a:t>
+            </a:r>
+            <a:r>
+              <a:rPr lang="fr-FR" sz="1800" dirty="0" err="1">
+                <a:effectLst/>
+                <a:latin typeface="Times New Roman" panose="02020603050405020304" pitchFamily="18" charset="0"/>
+                <a:ea typeface="Calibri" panose="020F0502020204030204" pitchFamily="34" charset="0"/>
+                <a:cs typeface="Times New Roman" panose="02020603050405020304" pitchFamily="18" charset="0"/>
+              </a:rPr>
+              <a:t>sequence</a:t>
+            </a:r>
+            <a:r>
+              <a:rPr lang="fr-FR" sz="1800" dirty="0">
+                <a:effectLst/>
+                <a:latin typeface="Times New Roman" panose="02020603050405020304" pitchFamily="18" charset="0"/>
+                <a:ea typeface="Calibri" panose="020F0502020204030204" pitchFamily="34" charset="0"/>
+                <a:cs typeface="Times New Roman" panose="02020603050405020304" pitchFamily="18" charset="0"/>
+              </a:rPr>
+              <a:t> of </a:t>
+            </a:r>
+            <a:r>
+              <a:rPr lang="fr-FR" sz="1800" dirty="0" err="1">
+                <a:effectLst/>
+                <a:latin typeface="Times New Roman" panose="02020603050405020304" pitchFamily="18" charset="0"/>
+                <a:ea typeface="Calibri" panose="020F0502020204030204" pitchFamily="34" charset="0"/>
+                <a:cs typeface="Times New Roman" panose="02020603050405020304" pitchFamily="18" charset="0"/>
+              </a:rPr>
+              <a:t>two</a:t>
+            </a:r>
+            <a:r>
+              <a:rPr lang="fr-FR" sz="1800" dirty="0">
+                <a:effectLst/>
+                <a:latin typeface="Times New Roman" panose="02020603050405020304" pitchFamily="18" charset="0"/>
+                <a:ea typeface="Calibri" panose="020F0502020204030204" pitchFamily="34" charset="0"/>
+                <a:cs typeface="Times New Roman" panose="02020603050405020304" pitchFamily="18" charset="0"/>
+              </a:rPr>
+              <a:t> </a:t>
+            </a:r>
+            <a:r>
+              <a:rPr lang="fr-FR" sz="1800" dirty="0" err="1">
+                <a:effectLst/>
+                <a:latin typeface="Times New Roman" panose="02020603050405020304" pitchFamily="18" charset="0"/>
+                <a:ea typeface="Calibri" panose="020F0502020204030204" pitchFamily="34" charset="0"/>
+                <a:cs typeface="Times New Roman" panose="02020603050405020304" pitchFamily="18" charset="0"/>
+              </a:rPr>
+              <a:t>proteins</a:t>
+            </a:r>
+            <a:r>
+              <a:rPr lang="fr-FR" sz="1800" dirty="0">
+                <a:effectLst/>
+                <a:latin typeface="Times New Roman" panose="02020603050405020304" pitchFamily="18" charset="0"/>
+                <a:ea typeface="Calibri" panose="020F0502020204030204" pitchFamily="34" charset="0"/>
+                <a:cs typeface="Times New Roman" panose="02020603050405020304" pitchFamily="18" charset="0"/>
+              </a:rPr>
+              <a:t>.</a:t>
+            </a:r>
+            <a:endParaRPr lang="fr-FR" sz="1800" dirty="0">
+              <a:effectLst/>
+              <a:latin typeface="Calibri" panose="020F0502020204030204" pitchFamily="34" charset="0"/>
+              <a:ea typeface="Calibri" panose="020F0502020204030204" pitchFamily="34" charset="0"/>
+              <a:cs typeface="Times New Roman" panose="02020603050405020304" pitchFamily="18" charset="0"/>
+            </a:endParaRPr>
+          </a:p>
+          <a:p>
+            <a:pPr marL="342900" lvl="0" indent="-342900">
+              <a:lnSpc>
+                <a:spcPct val="107000"/>
+              </a:lnSpc>
+              <a:buFont typeface="+mj-lt"/>
+              <a:buAutoNum type="arabicPeriod"/>
+            </a:pPr>
+            <a:r>
+              <a:rPr lang="fr-FR" sz="1800" dirty="0">
+                <a:effectLst/>
+                <a:latin typeface="Times New Roman" panose="02020603050405020304" pitchFamily="18" charset="0"/>
+                <a:ea typeface="Calibri" panose="020F0502020204030204" pitchFamily="34" charset="0"/>
+                <a:cs typeface="Times New Roman" panose="02020603050405020304" pitchFamily="18" charset="0"/>
+              </a:rPr>
+              <a:t>Smith, Temple F. &amp; Waterman, Michael S. (1981) Identification of Common </a:t>
+            </a:r>
+            <a:r>
+              <a:rPr lang="fr-FR" sz="1800" dirty="0" err="1">
+                <a:effectLst/>
+                <a:latin typeface="Times New Roman" panose="02020603050405020304" pitchFamily="18" charset="0"/>
+                <a:ea typeface="Calibri" panose="020F0502020204030204" pitchFamily="34" charset="0"/>
+                <a:cs typeface="Times New Roman" panose="02020603050405020304" pitchFamily="18" charset="0"/>
+              </a:rPr>
+              <a:t>Molecular</a:t>
+            </a:r>
+            <a:r>
+              <a:rPr lang="fr-FR" sz="1800" dirty="0">
+                <a:effectLst/>
+                <a:latin typeface="Times New Roman" panose="02020603050405020304" pitchFamily="18" charset="0"/>
+                <a:ea typeface="Calibri" panose="020F0502020204030204" pitchFamily="34" charset="0"/>
+                <a:cs typeface="Times New Roman" panose="02020603050405020304" pitchFamily="18" charset="0"/>
+              </a:rPr>
+              <a:t> </a:t>
+            </a:r>
+            <a:r>
+              <a:rPr lang="fr-FR" sz="1800" dirty="0" err="1">
+                <a:effectLst/>
+                <a:latin typeface="Times New Roman" panose="02020603050405020304" pitchFamily="18" charset="0"/>
+                <a:ea typeface="Calibri" panose="020F0502020204030204" pitchFamily="34" charset="0"/>
+                <a:cs typeface="Times New Roman" panose="02020603050405020304" pitchFamily="18" charset="0"/>
+              </a:rPr>
+              <a:t>Subsequences</a:t>
+            </a:r>
+            <a:r>
+              <a:rPr lang="fr-FR" sz="1800" dirty="0">
+                <a:effectLst/>
+                <a:latin typeface="Times New Roman" panose="02020603050405020304" pitchFamily="18" charset="0"/>
+                <a:ea typeface="Calibri" panose="020F0502020204030204" pitchFamily="34" charset="0"/>
+                <a:cs typeface="Times New Roman" panose="02020603050405020304" pitchFamily="18" charset="0"/>
+              </a:rPr>
+              <a:t>.</a:t>
+            </a:r>
+            <a:endParaRPr lang="fr-FR" sz="1800" dirty="0">
+              <a:effectLst/>
+              <a:latin typeface="Calibri" panose="020F0502020204030204" pitchFamily="34" charset="0"/>
+              <a:ea typeface="Calibri" panose="020F0502020204030204" pitchFamily="34" charset="0"/>
+              <a:cs typeface="Times New Roman" panose="02020603050405020304" pitchFamily="18" charset="0"/>
+            </a:endParaRPr>
+          </a:p>
+          <a:p>
+            <a:pPr marL="342900" lvl="0" indent="-342900">
+              <a:lnSpc>
+                <a:spcPct val="107000"/>
+              </a:lnSpc>
+              <a:buFont typeface="+mj-lt"/>
+              <a:buAutoNum type="arabicPeriod"/>
+            </a:pPr>
+            <a:r>
+              <a:rPr lang="fr-FR" sz="1800" u="none" strike="noStrike" dirty="0">
+                <a:solidFill>
+                  <a:srgbClr val="0000FF"/>
+                </a:solidFill>
+                <a:effectLst/>
+                <a:latin typeface="Times New Roman" panose="02020603050405020304" pitchFamily="18" charset="0"/>
+                <a:ea typeface="Calibri" panose="020F0502020204030204" pitchFamily="34" charset="0"/>
+                <a:cs typeface="Times New Roman" panose="02020603050405020304" pitchFamily="18" charset="0"/>
+                <a:hlinkClick r:id="rId2"/>
+              </a:rPr>
+              <a:t>A </a:t>
+            </a:r>
+            <a:r>
+              <a:rPr lang="fr-FR" sz="1800" u="none" strike="noStrike" dirty="0" err="1">
+                <a:solidFill>
+                  <a:srgbClr val="0000FF"/>
+                </a:solidFill>
+                <a:effectLst/>
+                <a:latin typeface="Times New Roman" panose="02020603050405020304" pitchFamily="18" charset="0"/>
+                <a:ea typeface="Calibri" panose="020F0502020204030204" pitchFamily="34" charset="0"/>
+                <a:cs typeface="Times New Roman" panose="02020603050405020304" pitchFamily="18" charset="0"/>
+                <a:hlinkClick r:id="rId2"/>
+              </a:rPr>
+              <a:t>Elnaggar</a:t>
+            </a:r>
+            <a:r>
+              <a:rPr lang="fr-FR" sz="1800" dirty="0">
+                <a:effectLst/>
+                <a:latin typeface="Times New Roman" panose="02020603050405020304" pitchFamily="18" charset="0"/>
+                <a:ea typeface="Calibri" panose="020F0502020204030204" pitchFamily="34" charset="0"/>
+                <a:cs typeface="Times New Roman" panose="02020603050405020304" pitchFamily="18" charset="0"/>
+              </a:rPr>
+              <a:t> et al. (2020) </a:t>
+            </a:r>
+            <a:r>
+              <a:rPr lang="fr-FR" sz="1800" dirty="0" err="1">
+                <a:effectLst/>
+                <a:latin typeface="Times New Roman" panose="02020603050405020304" pitchFamily="18" charset="0"/>
+                <a:ea typeface="Calibri" panose="020F0502020204030204" pitchFamily="34" charset="0"/>
+                <a:cs typeface="Times New Roman" panose="02020603050405020304" pitchFamily="18" charset="0"/>
+              </a:rPr>
+              <a:t>ProtTrans</a:t>
+            </a:r>
+            <a:r>
+              <a:rPr lang="fr-FR" sz="1800" dirty="0">
+                <a:effectLst/>
+                <a:latin typeface="Times New Roman" panose="02020603050405020304" pitchFamily="18" charset="0"/>
+                <a:ea typeface="Calibri" panose="020F0502020204030204" pitchFamily="34" charset="0"/>
+                <a:cs typeface="Times New Roman" panose="02020603050405020304" pitchFamily="18" charset="0"/>
+              </a:rPr>
+              <a:t>: </a:t>
+            </a:r>
+            <a:r>
+              <a:rPr lang="fr-FR" sz="1800" dirty="0" err="1">
+                <a:effectLst/>
+                <a:latin typeface="Times New Roman" panose="02020603050405020304" pitchFamily="18" charset="0"/>
+                <a:ea typeface="Calibri" panose="020F0502020204030204" pitchFamily="34" charset="0"/>
+                <a:cs typeface="Times New Roman" panose="02020603050405020304" pitchFamily="18" charset="0"/>
+              </a:rPr>
+              <a:t>Towards</a:t>
+            </a:r>
+            <a:r>
+              <a:rPr lang="fr-FR" sz="1800" dirty="0">
+                <a:effectLst/>
+                <a:latin typeface="Times New Roman" panose="02020603050405020304" pitchFamily="18" charset="0"/>
+                <a:ea typeface="Calibri" panose="020F0502020204030204" pitchFamily="34" charset="0"/>
+                <a:cs typeface="Times New Roman" panose="02020603050405020304" pitchFamily="18" charset="0"/>
+              </a:rPr>
+              <a:t> Cracking the </a:t>
+            </a:r>
+            <a:r>
+              <a:rPr lang="fr-FR" sz="1800" dirty="0" err="1">
+                <a:effectLst/>
+                <a:latin typeface="Times New Roman" panose="02020603050405020304" pitchFamily="18" charset="0"/>
+                <a:ea typeface="Calibri" panose="020F0502020204030204" pitchFamily="34" charset="0"/>
+                <a:cs typeface="Times New Roman" panose="02020603050405020304" pitchFamily="18" charset="0"/>
+              </a:rPr>
+              <a:t>Language</a:t>
+            </a:r>
+            <a:r>
+              <a:rPr lang="fr-FR" sz="1800" dirty="0">
+                <a:effectLst/>
+                <a:latin typeface="Times New Roman" panose="02020603050405020304" pitchFamily="18" charset="0"/>
+                <a:ea typeface="Calibri" panose="020F0502020204030204" pitchFamily="34" charset="0"/>
+                <a:cs typeface="Times New Roman" panose="02020603050405020304" pitchFamily="18" charset="0"/>
+              </a:rPr>
+              <a:t> of </a:t>
+            </a:r>
+            <a:r>
+              <a:rPr lang="fr-FR" sz="1800" dirty="0" err="1">
+                <a:effectLst/>
+                <a:latin typeface="Times New Roman" panose="02020603050405020304" pitchFamily="18" charset="0"/>
+                <a:ea typeface="Calibri" panose="020F0502020204030204" pitchFamily="34" charset="0"/>
+                <a:cs typeface="Times New Roman" panose="02020603050405020304" pitchFamily="18" charset="0"/>
+              </a:rPr>
+              <a:t>Life's</a:t>
+            </a:r>
+            <a:r>
+              <a:rPr lang="fr-FR" sz="1800" dirty="0">
+                <a:effectLst/>
+                <a:latin typeface="Times New Roman" panose="02020603050405020304" pitchFamily="18" charset="0"/>
+                <a:ea typeface="Calibri" panose="020F0502020204030204" pitchFamily="34" charset="0"/>
+                <a:cs typeface="Times New Roman" panose="02020603050405020304" pitchFamily="18" charset="0"/>
+              </a:rPr>
+              <a:t> Code </a:t>
+            </a:r>
+            <a:r>
+              <a:rPr lang="fr-FR" sz="1800" dirty="0" err="1">
+                <a:effectLst/>
+                <a:latin typeface="Times New Roman" panose="02020603050405020304" pitchFamily="18" charset="0"/>
+                <a:ea typeface="Calibri" panose="020F0502020204030204" pitchFamily="34" charset="0"/>
+                <a:cs typeface="Times New Roman" panose="02020603050405020304" pitchFamily="18" charset="0"/>
+              </a:rPr>
+              <a:t>Through</a:t>
+            </a:r>
+            <a:r>
+              <a:rPr lang="fr-FR" sz="1800" dirty="0">
+                <a:effectLst/>
+                <a:latin typeface="Times New Roman" panose="02020603050405020304" pitchFamily="18" charset="0"/>
+                <a:ea typeface="Calibri" panose="020F0502020204030204" pitchFamily="34" charset="0"/>
+                <a:cs typeface="Times New Roman" panose="02020603050405020304" pitchFamily="18" charset="0"/>
+              </a:rPr>
+              <a:t> Self-</a:t>
+            </a:r>
+            <a:r>
+              <a:rPr lang="fr-FR" sz="1800" dirty="0" err="1">
+                <a:effectLst/>
+                <a:latin typeface="Times New Roman" panose="02020603050405020304" pitchFamily="18" charset="0"/>
+                <a:ea typeface="Calibri" panose="020F0502020204030204" pitchFamily="34" charset="0"/>
+                <a:cs typeface="Times New Roman" panose="02020603050405020304" pitchFamily="18" charset="0"/>
+              </a:rPr>
+              <a:t>Supervised</a:t>
+            </a:r>
+            <a:r>
+              <a:rPr lang="fr-FR" sz="1800" dirty="0">
+                <a:effectLst/>
+                <a:latin typeface="Times New Roman" panose="02020603050405020304" pitchFamily="18" charset="0"/>
+                <a:ea typeface="Calibri" panose="020F0502020204030204" pitchFamily="34" charset="0"/>
+                <a:cs typeface="Times New Roman" panose="02020603050405020304" pitchFamily="18" charset="0"/>
+              </a:rPr>
+              <a:t> </a:t>
+            </a:r>
+            <a:r>
+              <a:rPr lang="fr-FR" sz="1800" dirty="0" err="1">
+                <a:effectLst/>
+                <a:latin typeface="Times New Roman" panose="02020603050405020304" pitchFamily="18" charset="0"/>
+                <a:ea typeface="Calibri" panose="020F0502020204030204" pitchFamily="34" charset="0"/>
+                <a:cs typeface="Times New Roman" panose="02020603050405020304" pitchFamily="18" charset="0"/>
+              </a:rPr>
+              <a:t>Deep</a:t>
+            </a:r>
+            <a:r>
+              <a:rPr lang="fr-FR" sz="1800" dirty="0">
+                <a:effectLst/>
+                <a:latin typeface="Times New Roman" panose="02020603050405020304" pitchFamily="18" charset="0"/>
+                <a:ea typeface="Calibri" panose="020F0502020204030204" pitchFamily="34" charset="0"/>
+                <a:cs typeface="Times New Roman" panose="02020603050405020304" pitchFamily="18" charset="0"/>
+              </a:rPr>
+              <a:t> Learning and High Performance </a:t>
+            </a:r>
+            <a:r>
+              <a:rPr lang="fr-FR" sz="1800" dirty="0" err="1">
+                <a:effectLst/>
+                <a:latin typeface="Times New Roman" panose="02020603050405020304" pitchFamily="18" charset="0"/>
+                <a:ea typeface="Calibri" panose="020F0502020204030204" pitchFamily="34" charset="0"/>
+                <a:cs typeface="Times New Roman" panose="02020603050405020304" pitchFamily="18" charset="0"/>
+              </a:rPr>
+              <a:t>Computing</a:t>
+            </a:r>
+            <a:r>
+              <a:rPr lang="fr-FR" sz="1800" dirty="0">
+                <a:effectLst/>
+                <a:latin typeface="Times New Roman" panose="02020603050405020304" pitchFamily="18" charset="0"/>
+                <a:ea typeface="Calibri" panose="020F0502020204030204" pitchFamily="34" charset="0"/>
+                <a:cs typeface="Times New Roman" panose="02020603050405020304" pitchFamily="18" charset="0"/>
+              </a:rPr>
+              <a:t> </a:t>
+            </a:r>
+            <a:endParaRPr lang="fr-FR" sz="1800" dirty="0">
+              <a:effectLst/>
+              <a:latin typeface="Calibri" panose="020F0502020204030204" pitchFamily="34" charset="0"/>
+              <a:ea typeface="Calibri" panose="020F0502020204030204" pitchFamily="34" charset="0"/>
+              <a:cs typeface="Times New Roman" panose="02020603050405020304" pitchFamily="18" charset="0"/>
+            </a:endParaRPr>
+          </a:p>
+          <a:p>
+            <a:pPr marL="342900" lvl="0" indent="-342900">
+              <a:lnSpc>
+                <a:spcPct val="107000"/>
+              </a:lnSpc>
+              <a:buFont typeface="+mj-lt"/>
+              <a:buAutoNum type="arabicPeriod"/>
+            </a:pPr>
+            <a:r>
+              <a:rPr lang="fr-FR" sz="1800" dirty="0">
+                <a:effectLst/>
+                <a:latin typeface="Times New Roman" panose="02020603050405020304" pitchFamily="18" charset="0"/>
+                <a:ea typeface="Calibri" panose="020F0502020204030204" pitchFamily="34" charset="0"/>
+                <a:cs typeface="Times New Roman" panose="02020603050405020304" pitchFamily="18" charset="0"/>
+              </a:rPr>
+              <a:t>Page pdb de la 6-phosphofructo-2-kinase/fructose-2,6-bisphosphatase </a:t>
+            </a:r>
+            <a:r>
+              <a:rPr lang="fr-FR" sz="1800" dirty="0" err="1">
+                <a:effectLst/>
+                <a:latin typeface="Times New Roman" panose="02020603050405020304" pitchFamily="18" charset="0"/>
+                <a:ea typeface="Calibri" panose="020F0502020204030204" pitchFamily="34" charset="0"/>
+                <a:cs typeface="Times New Roman" panose="02020603050405020304" pitchFamily="18" charset="0"/>
+              </a:rPr>
+              <a:t>bifunctional</a:t>
+            </a:r>
+            <a:r>
+              <a:rPr lang="fr-FR" sz="1800" dirty="0">
+                <a:effectLst/>
+                <a:latin typeface="Times New Roman" panose="02020603050405020304" pitchFamily="18" charset="0"/>
+                <a:ea typeface="Calibri" panose="020F0502020204030204" pitchFamily="34" charset="0"/>
+                <a:cs typeface="Times New Roman" panose="02020603050405020304" pitchFamily="18" charset="0"/>
+              </a:rPr>
+              <a:t> enzyme </a:t>
+            </a:r>
+            <a:r>
+              <a:rPr lang="fr-FR" sz="1800" dirty="0" err="1">
+                <a:effectLst/>
+                <a:latin typeface="Times New Roman" panose="02020603050405020304" pitchFamily="18" charset="0"/>
+                <a:ea typeface="Calibri" panose="020F0502020204030204" pitchFamily="34" charset="0"/>
+                <a:cs typeface="Times New Roman" panose="02020603050405020304" pitchFamily="18" charset="0"/>
+              </a:rPr>
+              <a:t>complexed</a:t>
+            </a:r>
+            <a:r>
+              <a:rPr lang="fr-FR" sz="1800" dirty="0">
+                <a:effectLst/>
+                <a:latin typeface="Times New Roman" panose="02020603050405020304" pitchFamily="18" charset="0"/>
+                <a:ea typeface="Calibri" panose="020F0502020204030204" pitchFamily="34" charset="0"/>
+                <a:cs typeface="Times New Roman" panose="02020603050405020304" pitchFamily="18" charset="0"/>
+              </a:rPr>
+              <a:t> </a:t>
+            </a:r>
+            <a:r>
+              <a:rPr lang="fr-FR" sz="1800" dirty="0" err="1">
+                <a:effectLst/>
+                <a:latin typeface="Times New Roman" panose="02020603050405020304" pitchFamily="18" charset="0"/>
+                <a:ea typeface="Calibri" panose="020F0502020204030204" pitchFamily="34" charset="0"/>
+                <a:cs typeface="Times New Roman" panose="02020603050405020304" pitchFamily="18" charset="0"/>
+              </a:rPr>
+              <a:t>with</a:t>
+            </a:r>
+            <a:r>
+              <a:rPr lang="fr-FR" sz="1800" dirty="0">
+                <a:effectLst/>
+                <a:latin typeface="Times New Roman" panose="02020603050405020304" pitchFamily="18" charset="0"/>
+                <a:ea typeface="Calibri" panose="020F0502020204030204" pitchFamily="34" charset="0"/>
+                <a:cs typeface="Times New Roman" panose="02020603050405020304" pitchFamily="18" charset="0"/>
+              </a:rPr>
+              <a:t> atp-g-s and phosphate : </a:t>
+            </a:r>
+            <a:r>
+              <a:rPr lang="fr-FR" sz="1800" u="sng" dirty="0">
+                <a:solidFill>
+                  <a:srgbClr val="0000FF"/>
+                </a:solidFill>
+                <a:effectLst/>
+                <a:latin typeface="Times New Roman" panose="02020603050405020304" pitchFamily="18" charset="0"/>
+                <a:ea typeface="Calibri" panose="020F0502020204030204" pitchFamily="34" charset="0"/>
+                <a:cs typeface="Times New Roman" panose="02020603050405020304" pitchFamily="18" charset="0"/>
+                <a:hlinkClick r:id="rId3"/>
+              </a:rPr>
+              <a:t>https://www.rcsb.org/structure/1bif</a:t>
+            </a:r>
+            <a:r>
+              <a:rPr lang="fr-FR" sz="1800" dirty="0">
+                <a:effectLst/>
+                <a:latin typeface="Times New Roman" panose="02020603050405020304" pitchFamily="18" charset="0"/>
+                <a:ea typeface="Calibri" panose="020F0502020204030204" pitchFamily="34" charset="0"/>
+                <a:cs typeface="Times New Roman" panose="02020603050405020304" pitchFamily="18" charset="0"/>
+              </a:rPr>
+              <a:t> </a:t>
+            </a:r>
+            <a:endParaRPr lang="fr-FR" sz="1800" dirty="0">
+              <a:effectLst/>
+              <a:latin typeface="Calibri" panose="020F0502020204030204" pitchFamily="34" charset="0"/>
+              <a:ea typeface="Calibri" panose="020F0502020204030204" pitchFamily="34" charset="0"/>
+              <a:cs typeface="Times New Roman" panose="02020603050405020304" pitchFamily="18" charset="0"/>
+            </a:endParaRPr>
+          </a:p>
+          <a:p>
+            <a:pPr marL="342900" lvl="0" indent="-342900">
+              <a:lnSpc>
+                <a:spcPct val="107000"/>
+              </a:lnSpc>
+              <a:buFont typeface="+mj-lt"/>
+              <a:buAutoNum type="arabicPeriod"/>
+            </a:pPr>
+            <a:r>
+              <a:rPr lang="fr-FR" sz="1800" dirty="0">
+                <a:effectLst/>
+                <a:latin typeface="Times New Roman" panose="02020603050405020304" pitchFamily="18" charset="0"/>
+                <a:ea typeface="Calibri" panose="020F0502020204030204" pitchFamily="34" charset="0"/>
+                <a:cs typeface="Times New Roman" panose="02020603050405020304" pitchFamily="18" charset="0"/>
+              </a:rPr>
+              <a:t>Page pdb de la hyperthermophile </a:t>
+            </a:r>
+            <a:r>
+              <a:rPr lang="fr-FR" sz="1800" dirty="0" err="1">
+                <a:effectLst/>
+                <a:latin typeface="Times New Roman" panose="02020603050405020304" pitchFamily="18" charset="0"/>
+                <a:ea typeface="Calibri" panose="020F0502020204030204" pitchFamily="34" charset="0"/>
+                <a:cs typeface="Times New Roman" panose="02020603050405020304" pitchFamily="18" charset="0"/>
+              </a:rPr>
+              <a:t>chromosomal</a:t>
+            </a:r>
+            <a:r>
+              <a:rPr lang="fr-FR" sz="1800" dirty="0">
+                <a:effectLst/>
+                <a:latin typeface="Times New Roman" panose="02020603050405020304" pitchFamily="18" charset="0"/>
+                <a:ea typeface="Calibri" panose="020F0502020204030204" pitchFamily="34" charset="0"/>
+                <a:cs typeface="Times New Roman" panose="02020603050405020304" pitchFamily="18" charset="0"/>
+              </a:rPr>
+              <a:t> </a:t>
+            </a:r>
+            <a:r>
+              <a:rPr lang="fr-FR" sz="1800" dirty="0" err="1">
+                <a:effectLst/>
+                <a:latin typeface="Times New Roman" panose="02020603050405020304" pitchFamily="18" charset="0"/>
+                <a:ea typeface="Calibri" panose="020F0502020204030204" pitchFamily="34" charset="0"/>
+                <a:cs typeface="Times New Roman" panose="02020603050405020304" pitchFamily="18" charset="0"/>
+              </a:rPr>
+              <a:t>protein</a:t>
+            </a:r>
+            <a:r>
+              <a:rPr lang="fr-FR" sz="1800" dirty="0">
+                <a:effectLst/>
+                <a:latin typeface="Times New Roman" panose="02020603050405020304" pitchFamily="18" charset="0"/>
+                <a:ea typeface="Calibri" panose="020F0502020204030204" pitchFamily="34" charset="0"/>
+                <a:cs typeface="Times New Roman" panose="02020603050405020304" pitchFamily="18" charset="0"/>
+              </a:rPr>
+              <a:t> sac7d </a:t>
+            </a:r>
+            <a:r>
+              <a:rPr lang="fr-FR" sz="1800" dirty="0" err="1">
+                <a:effectLst/>
+                <a:latin typeface="Times New Roman" panose="02020603050405020304" pitchFamily="18" charset="0"/>
+                <a:ea typeface="Calibri" panose="020F0502020204030204" pitchFamily="34" charset="0"/>
+                <a:cs typeface="Times New Roman" panose="02020603050405020304" pitchFamily="18" charset="0"/>
+              </a:rPr>
+              <a:t>bound</a:t>
+            </a:r>
+            <a:r>
+              <a:rPr lang="fr-FR" sz="1800" dirty="0">
+                <a:effectLst/>
+                <a:latin typeface="Times New Roman" panose="02020603050405020304" pitchFamily="18" charset="0"/>
+                <a:ea typeface="Calibri" panose="020F0502020204030204" pitchFamily="34" charset="0"/>
+                <a:cs typeface="Times New Roman" panose="02020603050405020304" pitchFamily="18" charset="0"/>
+              </a:rPr>
+              <a:t> </a:t>
+            </a:r>
+            <a:r>
+              <a:rPr lang="fr-FR" sz="1800" dirty="0" err="1">
+                <a:effectLst/>
+                <a:latin typeface="Times New Roman" panose="02020603050405020304" pitchFamily="18" charset="0"/>
+                <a:ea typeface="Calibri" panose="020F0502020204030204" pitchFamily="34" charset="0"/>
+                <a:cs typeface="Times New Roman" panose="02020603050405020304" pitchFamily="18" charset="0"/>
+              </a:rPr>
+              <a:t>with</a:t>
+            </a:r>
+            <a:r>
+              <a:rPr lang="fr-FR" sz="1800" dirty="0">
+                <a:effectLst/>
+                <a:latin typeface="Times New Roman" panose="02020603050405020304" pitchFamily="18" charset="0"/>
+                <a:ea typeface="Calibri" panose="020F0502020204030204" pitchFamily="34" charset="0"/>
+                <a:cs typeface="Times New Roman" panose="02020603050405020304" pitchFamily="18" charset="0"/>
+              </a:rPr>
+              <a:t> </a:t>
+            </a:r>
+            <a:r>
+              <a:rPr lang="fr-FR" sz="1800" dirty="0" err="1">
+                <a:effectLst/>
+                <a:latin typeface="Times New Roman" panose="02020603050405020304" pitchFamily="18" charset="0"/>
+                <a:ea typeface="Calibri" panose="020F0502020204030204" pitchFamily="34" charset="0"/>
+                <a:cs typeface="Times New Roman" panose="02020603050405020304" pitchFamily="18" charset="0"/>
+              </a:rPr>
+              <a:t>kinked</a:t>
+            </a:r>
+            <a:r>
+              <a:rPr lang="fr-FR" sz="1800" dirty="0">
+                <a:effectLst/>
+                <a:latin typeface="Times New Roman" panose="02020603050405020304" pitchFamily="18" charset="0"/>
+                <a:ea typeface="Calibri" panose="020F0502020204030204" pitchFamily="34" charset="0"/>
+                <a:cs typeface="Times New Roman" panose="02020603050405020304" pitchFamily="18" charset="0"/>
+              </a:rPr>
+              <a:t> </a:t>
+            </a:r>
+            <a:r>
+              <a:rPr lang="fr-FR" sz="1800" dirty="0" err="1">
+                <a:effectLst/>
+                <a:latin typeface="Times New Roman" panose="02020603050405020304" pitchFamily="18" charset="0"/>
+                <a:ea typeface="Calibri" panose="020F0502020204030204" pitchFamily="34" charset="0"/>
+                <a:cs typeface="Times New Roman" panose="02020603050405020304" pitchFamily="18" charset="0"/>
+              </a:rPr>
+              <a:t>dna</a:t>
+            </a:r>
+            <a:r>
+              <a:rPr lang="fr-FR" sz="1800" dirty="0">
+                <a:effectLst/>
+                <a:latin typeface="Times New Roman" panose="02020603050405020304" pitchFamily="18" charset="0"/>
+                <a:ea typeface="Calibri" panose="020F0502020204030204" pitchFamily="34" charset="0"/>
+                <a:cs typeface="Times New Roman" panose="02020603050405020304" pitchFamily="18" charset="0"/>
+              </a:rPr>
+              <a:t> duplex : </a:t>
+            </a:r>
+            <a:r>
+              <a:rPr lang="fr-FR" sz="1800" u="sng" dirty="0">
+                <a:solidFill>
+                  <a:srgbClr val="0000FF"/>
+                </a:solidFill>
+                <a:effectLst/>
+                <a:latin typeface="Times New Roman" panose="02020603050405020304" pitchFamily="18" charset="0"/>
+                <a:ea typeface="Calibri" panose="020F0502020204030204" pitchFamily="34" charset="0"/>
+                <a:cs typeface="Times New Roman" panose="02020603050405020304" pitchFamily="18" charset="0"/>
+                <a:hlinkClick r:id="rId4"/>
+              </a:rPr>
+              <a:t>https://www.rcsb.org/structure/1azp</a:t>
+            </a:r>
+            <a:r>
+              <a:rPr lang="fr-FR" sz="1800" dirty="0">
+                <a:effectLst/>
+                <a:latin typeface="Times New Roman" panose="02020603050405020304" pitchFamily="18" charset="0"/>
+                <a:ea typeface="Calibri" panose="020F0502020204030204" pitchFamily="34" charset="0"/>
+                <a:cs typeface="Times New Roman" panose="02020603050405020304" pitchFamily="18" charset="0"/>
+              </a:rPr>
+              <a:t> </a:t>
+            </a:r>
+            <a:endParaRPr lang="fr-FR" sz="1800" dirty="0">
+              <a:effectLst/>
+              <a:latin typeface="Calibri" panose="020F0502020204030204" pitchFamily="34" charset="0"/>
+              <a:ea typeface="Calibri" panose="020F0502020204030204" pitchFamily="34" charset="0"/>
+              <a:cs typeface="Times New Roman" panose="02020603050405020304" pitchFamily="18" charset="0"/>
+            </a:endParaRPr>
+          </a:p>
+          <a:p>
+            <a:pPr marL="342900" lvl="0" indent="-342900">
+              <a:lnSpc>
+                <a:spcPct val="107000"/>
+              </a:lnSpc>
+              <a:spcAft>
+                <a:spcPts val="800"/>
+              </a:spcAft>
+              <a:buFont typeface="+mj-lt"/>
+              <a:buAutoNum type="arabicPeriod"/>
+            </a:pPr>
+            <a:r>
+              <a:rPr lang="fr-FR" sz="1800" dirty="0">
+                <a:effectLst/>
+                <a:latin typeface="Times New Roman" panose="02020603050405020304" pitchFamily="18" charset="0"/>
+                <a:ea typeface="Calibri" panose="020F0502020204030204" pitchFamily="34" charset="0"/>
+                <a:cs typeface="Times New Roman" panose="02020603050405020304" pitchFamily="18" charset="0"/>
+              </a:rPr>
+              <a:t>Page pdb de 2AK3 : </a:t>
+            </a:r>
+            <a:r>
+              <a:rPr lang="fr-FR" sz="1800" u="sng" dirty="0">
+                <a:solidFill>
+                  <a:srgbClr val="0000FF"/>
+                </a:solidFill>
+                <a:effectLst/>
+                <a:latin typeface="Times New Roman" panose="02020603050405020304" pitchFamily="18" charset="0"/>
+                <a:ea typeface="Calibri" panose="020F0502020204030204" pitchFamily="34" charset="0"/>
+                <a:cs typeface="Times New Roman" panose="02020603050405020304" pitchFamily="18" charset="0"/>
+                <a:hlinkClick r:id="rId5"/>
+              </a:rPr>
+              <a:t>https://www.rcsb.org/structure/2ak3</a:t>
+            </a:r>
+            <a:r>
+              <a:rPr lang="fr-FR" sz="1800" dirty="0">
+                <a:effectLst/>
+                <a:latin typeface="Times New Roman" panose="02020603050405020304" pitchFamily="18" charset="0"/>
+                <a:ea typeface="Calibri" panose="020F0502020204030204" pitchFamily="34" charset="0"/>
+                <a:cs typeface="Times New Roman" panose="02020603050405020304" pitchFamily="18" charset="0"/>
+              </a:rPr>
+              <a:t> </a:t>
+            </a:r>
+            <a:endParaRPr lang="fr-FR" sz="1800" dirty="0">
+              <a:effectLst/>
+              <a:latin typeface="Calibri" panose="020F0502020204030204" pitchFamily="34" charset="0"/>
+              <a:ea typeface="Calibri" panose="020F0502020204030204" pitchFamily="34" charset="0"/>
+              <a:cs typeface="Times New Roman" panose="02020603050405020304" pitchFamily="18" charset="0"/>
+            </a:endParaRPr>
           </a:p>
         </p:txBody>
       </p:sp>
@@ -11119,7 +12110,7 @@
           <p:nvPr/>
         </p:nvPicPr>
         <p:blipFill>
-          <a:blip r:embed="rId2">
+          <a:blip r:embed="rId6">
             <a:extLst>
               <a:ext uri="{28A0092B-C50C-407E-A947-70E740481C1C}">
                 <a14:useLocalDpi xmlns:a14="http://schemas.microsoft.com/office/drawing/2010/main" val="0"/>
@@ -11194,371 +12185,96 @@
       </p:cxnSp>
       <p:sp>
         <p:nvSpPr>
-          <p:cNvPr id="25" name="Espace réservé du contenu 2">
-            <a:extLst>
-              <a:ext uri="{FF2B5EF4-FFF2-40B4-BE49-F238E27FC236}">
-                <a16:creationId xmlns:a16="http://schemas.microsoft.com/office/drawing/2014/main" id="{57CB1EB0-7288-3F4E-B1CC-99784B654109}"/>
-              </a:ext>
-            </a:extLst>
-          </p:cNvPr>
-          <p:cNvSpPr txBox="1">
-            <a:spLocks/>
-          </p:cNvSpPr>
-          <p:nvPr/>
-        </p:nvSpPr>
-        <p:spPr>
-          <a:xfrm>
-            <a:off x="231320" y="1006054"/>
-            <a:ext cx="11824556" cy="5300591"/>
-          </a:xfrm>
-          <a:prstGeom prst="rect">
-            <a:avLst/>
-          </a:prstGeom>
-        </p:spPr>
-        <p:txBody>
-          <a:bodyPr vert="horz" lIns="91440" tIns="45720" rIns="91440" bIns="45720" rtlCol="0">
-            <a:normAutofit/>
-          </a:bodyPr>
-          <a:lstStyle>
-            <a:lvl1pPr marL="228600" indent="-228600" algn="l" defTabSz="914400" rtl="0" eaLnBrk="1" latinLnBrk="0" hangingPunct="1">
-              <a:lnSpc>
-                <a:spcPct val="90000"/>
-              </a:lnSpc>
-              <a:spcBef>
-                <a:spcPts val="1000"/>
-              </a:spcBef>
-              <a:buFont typeface="Arial" panose="020B0604020202020204" pitchFamily="34" charset="0"/>
-              <a:buChar char="•"/>
-              <a:defRPr sz="2800" kern="1200">
-                <a:solidFill>
-                  <a:schemeClr val="tx1"/>
-                </a:solidFill>
-                <a:latin typeface="+mn-lt"/>
-                <a:ea typeface="+mn-ea"/>
-                <a:cs typeface="+mn-cs"/>
-              </a:defRPr>
-            </a:lvl1pPr>
-            <a:lvl2pPr marL="685800" indent="-228600" algn="l" defTabSz="914400" rtl="0" eaLnBrk="1" latinLnBrk="0" hangingPunct="1">
-              <a:lnSpc>
-                <a:spcPct val="90000"/>
-              </a:lnSpc>
-              <a:spcBef>
-                <a:spcPts val="500"/>
-              </a:spcBef>
-              <a:buFont typeface="Arial" panose="020B0604020202020204" pitchFamily="34" charset="0"/>
-              <a:buChar char="•"/>
-              <a:defRPr sz="2400" kern="1200">
-                <a:solidFill>
-                  <a:schemeClr val="tx1"/>
-                </a:solidFill>
-                <a:latin typeface="+mn-lt"/>
-                <a:ea typeface="+mn-ea"/>
-                <a:cs typeface="+mn-cs"/>
-              </a:defRPr>
-            </a:lvl2pPr>
-            <a:lvl3pPr marL="1143000" indent="-228600" algn="l" defTabSz="914400" rtl="0" eaLnBrk="1" latinLnBrk="0" hangingPunct="1">
-              <a:lnSpc>
-                <a:spcPct val="90000"/>
-              </a:lnSpc>
-              <a:spcBef>
-                <a:spcPts val="500"/>
-              </a:spcBef>
-              <a:buFont typeface="Arial" panose="020B0604020202020204" pitchFamily="34" charset="0"/>
-              <a:buChar char="•"/>
-              <a:defRPr sz="2000" kern="1200">
-                <a:solidFill>
-                  <a:schemeClr val="tx1"/>
-                </a:solidFill>
-                <a:latin typeface="+mn-lt"/>
-                <a:ea typeface="+mn-ea"/>
-                <a:cs typeface="+mn-cs"/>
-              </a:defRPr>
-            </a:lvl3pPr>
-            <a:lvl4pPr marL="1600200" indent="-228600" algn="l" defTabSz="914400" rtl="0" eaLnBrk="1" latinLnBrk="0" hangingPunct="1">
-              <a:lnSpc>
-                <a:spcPct val="90000"/>
-              </a:lnSpc>
-              <a:spcBef>
-                <a:spcPts val="500"/>
-              </a:spcBef>
-              <a:buFont typeface="Arial" panose="020B0604020202020204" pitchFamily="34" charset="0"/>
-              <a:buChar char="•"/>
-              <a:defRPr sz="1800" kern="1200">
-                <a:solidFill>
-                  <a:schemeClr val="tx1"/>
-                </a:solidFill>
-                <a:latin typeface="+mn-lt"/>
-                <a:ea typeface="+mn-ea"/>
-                <a:cs typeface="+mn-cs"/>
-              </a:defRPr>
-            </a:lvl4pPr>
-            <a:lvl5pPr marL="2057400" indent="-228600" algn="l" defTabSz="914400" rtl="0" eaLnBrk="1" latinLnBrk="0" hangingPunct="1">
-              <a:lnSpc>
-                <a:spcPct val="90000"/>
-              </a:lnSpc>
-              <a:spcBef>
-                <a:spcPts val="500"/>
-              </a:spcBef>
-              <a:buFont typeface="Arial" panose="020B0604020202020204" pitchFamily="34" charset="0"/>
-              <a:buChar char="•"/>
-              <a:defRPr sz="1800" kern="1200">
-                <a:solidFill>
-                  <a:schemeClr val="tx1"/>
-                </a:solidFill>
-                <a:latin typeface="+mn-lt"/>
-                <a:ea typeface="+mn-ea"/>
-                <a:cs typeface="+mn-cs"/>
-              </a:defRPr>
-            </a:lvl5pPr>
-            <a:lvl6pPr marL="2514600" indent="-228600" algn="l" defTabSz="914400" rtl="0" eaLnBrk="1" latinLnBrk="0" hangingPunct="1">
-              <a:lnSpc>
-                <a:spcPct val="90000"/>
-              </a:lnSpc>
-              <a:spcBef>
-                <a:spcPts val="500"/>
-              </a:spcBef>
-              <a:buFont typeface="Arial" panose="020B0604020202020204" pitchFamily="34" charset="0"/>
-              <a:buChar char="•"/>
-              <a:defRPr sz="1800" kern="1200">
-                <a:solidFill>
-                  <a:schemeClr val="tx1"/>
-                </a:solidFill>
-                <a:latin typeface="+mn-lt"/>
-                <a:ea typeface="+mn-ea"/>
-                <a:cs typeface="+mn-cs"/>
-              </a:defRPr>
-            </a:lvl6pPr>
-            <a:lvl7pPr marL="2971800" indent="-228600" algn="l" defTabSz="914400" rtl="0" eaLnBrk="1" latinLnBrk="0" hangingPunct="1">
-              <a:lnSpc>
-                <a:spcPct val="90000"/>
-              </a:lnSpc>
-              <a:spcBef>
-                <a:spcPts val="500"/>
-              </a:spcBef>
-              <a:buFont typeface="Arial" panose="020B0604020202020204" pitchFamily="34" charset="0"/>
-              <a:buChar char="•"/>
-              <a:defRPr sz="1800" kern="1200">
-                <a:solidFill>
-                  <a:schemeClr val="tx1"/>
-                </a:solidFill>
-                <a:latin typeface="+mn-lt"/>
-                <a:ea typeface="+mn-ea"/>
-                <a:cs typeface="+mn-cs"/>
-              </a:defRPr>
-            </a:lvl7pPr>
-            <a:lvl8pPr marL="3429000" indent="-228600" algn="l" defTabSz="914400" rtl="0" eaLnBrk="1" latinLnBrk="0" hangingPunct="1">
-              <a:lnSpc>
-                <a:spcPct val="90000"/>
-              </a:lnSpc>
-              <a:spcBef>
-                <a:spcPts val="500"/>
-              </a:spcBef>
-              <a:buFont typeface="Arial" panose="020B0604020202020204" pitchFamily="34" charset="0"/>
-              <a:buChar char="•"/>
-              <a:defRPr sz="1800" kern="1200">
-                <a:solidFill>
-                  <a:schemeClr val="tx1"/>
-                </a:solidFill>
-                <a:latin typeface="+mn-lt"/>
-                <a:ea typeface="+mn-ea"/>
-                <a:cs typeface="+mn-cs"/>
-              </a:defRPr>
-            </a:lvl8pPr>
-            <a:lvl9pPr marL="3886200" indent="-228600" algn="l" defTabSz="914400" rtl="0" eaLnBrk="1" latinLnBrk="0" hangingPunct="1">
-              <a:lnSpc>
-                <a:spcPct val="90000"/>
-              </a:lnSpc>
-              <a:spcBef>
-                <a:spcPts val="500"/>
-              </a:spcBef>
-              <a:buFont typeface="Arial" panose="020B0604020202020204" pitchFamily="34" charset="0"/>
-              <a:buChar char="•"/>
-              <a:defRPr sz="1800" kern="1200">
-                <a:solidFill>
-                  <a:schemeClr val="tx1"/>
-                </a:solidFill>
-                <a:latin typeface="+mn-lt"/>
-                <a:ea typeface="+mn-ea"/>
-                <a:cs typeface="+mn-cs"/>
-              </a:defRPr>
-            </a:lvl9pPr>
-          </a:lstStyle>
-          <a:p>
-            <a:pPr marL="0" indent="0">
-              <a:buNone/>
-            </a:pPr>
-            <a:r>
-              <a:rPr lang="fr-FR" dirty="0">
-                <a:latin typeface="Arial" panose="020B0604020202020204" pitchFamily="34" charset="0"/>
-                <a:cs typeface="Arial" panose="020B0604020202020204" pitchFamily="34" charset="0"/>
-              </a:rPr>
-              <a:t>Pour connecter le sous réseau gène avec le sous réseau protéine, vous devez utiliser à la fois l’information gène - </a:t>
-            </a:r>
-            <a:r>
-              <a:rPr lang="fr-FR" dirty="0" err="1">
-                <a:latin typeface="Arial" panose="020B0604020202020204" pitchFamily="34" charset="0"/>
-                <a:cs typeface="Arial" panose="020B0604020202020204" pitchFamily="34" charset="0"/>
-              </a:rPr>
-              <a:t>protein</a:t>
-            </a:r>
-            <a:r>
-              <a:rPr lang="fr-FR" dirty="0">
-                <a:latin typeface="Arial" panose="020B0604020202020204" pitchFamily="34" charset="0"/>
-                <a:cs typeface="Arial" panose="020B0604020202020204" pitchFamily="34" charset="0"/>
-              </a:rPr>
+          <p:cNvPr id="7" name="Espace réservé de la date 3">
+            <a:extLst>
+              <a:ext uri="{FF2B5EF4-FFF2-40B4-BE49-F238E27FC236}">
+                <a16:creationId xmlns:a16="http://schemas.microsoft.com/office/drawing/2014/main" id="{76BB1596-A3EC-F339-4D57-5E00BE5468DC}"/>
+              </a:ext>
+            </a:extLst>
+          </p:cNvPr>
+          <p:cNvSpPr>
+            <a:spLocks noGrp="1"/>
+          </p:cNvSpPr>
+          <p:nvPr>
+            <p:ph type="dt" sz="half" idx="10"/>
+          </p:nvPr>
+        </p:nvSpPr>
+        <p:spPr>
+          <a:xfrm>
+            <a:off x="838200" y="6489520"/>
+            <a:ext cx="2743200" cy="365125"/>
+          </a:xfrm>
+        </p:spPr>
+        <p:txBody>
+          <a:bodyPr/>
+          <a:lstStyle/>
+          <a:p>
+            <a:r>
+              <a:rPr lang="fr-FR" dirty="0"/>
+              <a:t>12/10/2022</a:t>
+            </a:r>
+          </a:p>
+        </p:txBody>
+      </p:sp>
+      <p:sp>
+        <p:nvSpPr>
+          <p:cNvPr id="9" name="Espace réservé du pied de page 4">
+            <a:extLst>
+              <a:ext uri="{FF2B5EF4-FFF2-40B4-BE49-F238E27FC236}">
+                <a16:creationId xmlns:a16="http://schemas.microsoft.com/office/drawing/2014/main" id="{CE5FBD6C-6FE4-1FFE-40FE-CDECCB34C023}"/>
+              </a:ext>
+            </a:extLst>
+          </p:cNvPr>
+          <p:cNvSpPr>
+            <a:spLocks noGrp="1"/>
+          </p:cNvSpPr>
+          <p:nvPr>
+            <p:ph type="ftr" sz="quarter" idx="11"/>
+          </p:nvPr>
+        </p:nvSpPr>
+        <p:spPr>
+          <a:xfrm>
+            <a:off x="3810000" y="6492876"/>
+            <a:ext cx="4800600" cy="365124"/>
+          </a:xfrm>
+        </p:spPr>
+        <p:txBody>
+          <a:bodyPr/>
+          <a:lstStyle/>
+          <a:p>
+            <a:pPr algn="l"/>
+            <a:r>
+              <a:rPr lang="en-US" dirty="0"/>
+              <a:t>Delhomme Jean, </a:t>
+            </a:r>
+            <a:r>
+              <a:rPr lang="en-US" dirty="0" err="1"/>
+              <a:t>Lecourieux</a:t>
+            </a:r>
+            <a:r>
+              <a:rPr lang="en-US" dirty="0"/>
+              <a:t> Adriana, Rousseau Baptiste, </a:t>
+            </a:r>
+            <a:r>
+              <a:rPr lang="en-US" dirty="0" err="1"/>
+              <a:t>Graa</a:t>
+            </a:r>
+            <a:r>
+              <a:rPr lang="en-US" dirty="0"/>
               <a:t> </a:t>
             </a:r>
             <a:r>
-              <a:rPr lang="fr-FR" dirty="0" err="1">
-                <a:latin typeface="Arial" panose="020B0604020202020204" pitchFamily="34" charset="0"/>
-                <a:cs typeface="Arial" panose="020B0604020202020204" pitchFamily="34" charset="0"/>
-              </a:rPr>
-              <a:t>coding</a:t>
-            </a:r>
-            <a:r>
-              <a:rPr lang="fr-FR" dirty="0">
-                <a:latin typeface="Arial" panose="020B0604020202020204" pitchFamily="34" charset="0"/>
-                <a:cs typeface="Arial" panose="020B0604020202020204" pitchFamily="34" charset="0"/>
-              </a:rPr>
-              <a:t> pour l’information de traduction mais aussi l’information TF -&gt; gène.</a:t>
-            </a:r>
-          </a:p>
-          <a:p>
-            <a:pPr marL="0" indent="0">
-              <a:buNone/>
-            </a:pPr>
-            <a:r>
-              <a:rPr lang="fr-FR" dirty="0">
-                <a:latin typeface="Arial" panose="020B0604020202020204" pitchFamily="34" charset="0"/>
-                <a:cs typeface="Arial" panose="020B0604020202020204" pitchFamily="34" charset="0"/>
-              </a:rPr>
-              <a:t>- Décrivez votre réseau.</a:t>
-            </a:r>
-          </a:p>
-          <a:p>
-            <a:pPr marL="0" indent="0">
-              <a:buNone/>
-            </a:pPr>
-            <a:r>
-              <a:rPr lang="fr-FR" dirty="0">
-                <a:latin typeface="Arial" panose="020B0604020202020204" pitchFamily="34" charset="0"/>
-                <a:cs typeface="Arial" panose="020B0604020202020204" pitchFamily="34" charset="0"/>
-              </a:rPr>
-              <a:t>- Combien de liens TF-gène et gène-protéine recensez-vous ?</a:t>
-            </a:r>
-          </a:p>
-          <a:p>
-            <a:pPr marL="0" indent="0">
-              <a:buNone/>
-            </a:pPr>
-            <a:r>
-              <a:rPr lang="fr-FR" dirty="0">
-                <a:latin typeface="Arial" panose="020B0604020202020204" pitchFamily="34" charset="0"/>
-                <a:cs typeface="Arial" panose="020B0604020202020204" pitchFamily="34" charset="0"/>
-              </a:rPr>
-              <a:t>- Faire une analyse de modularité, présentez les résultats</a:t>
-            </a:r>
-          </a:p>
-          <a:p>
-            <a:pPr marL="0" indent="0">
-              <a:buNone/>
-            </a:pPr>
-            <a:r>
-              <a:rPr lang="fr-FR" dirty="0">
-                <a:latin typeface="Arial" panose="020B0604020202020204" pitchFamily="34" charset="0"/>
-                <a:cs typeface="Arial" panose="020B0604020202020204" pitchFamily="34" charset="0"/>
-              </a:rPr>
-              <a:t>- A partir du </a:t>
-            </a:r>
-            <a:r>
-              <a:rPr lang="fr-FR" dirty="0" err="1">
-                <a:latin typeface="Arial" panose="020B0604020202020204" pitchFamily="34" charset="0"/>
-                <a:cs typeface="Arial" panose="020B0604020202020204" pitchFamily="34" charset="0"/>
-              </a:rPr>
-              <a:t>noeud</a:t>
-            </a:r>
-            <a:r>
-              <a:rPr lang="fr-FR" dirty="0">
-                <a:latin typeface="Arial" panose="020B0604020202020204" pitchFamily="34" charset="0"/>
-                <a:cs typeface="Arial" panose="020B0604020202020204" pitchFamily="34" charset="0"/>
-              </a:rPr>
-              <a:t> </a:t>
-            </a:r>
-            <a:r>
-              <a:rPr lang="fr-FR" dirty="0" err="1">
-                <a:latin typeface="Arial" panose="020B0604020202020204" pitchFamily="34" charset="0"/>
-                <a:cs typeface="Arial" panose="020B0604020202020204" pitchFamily="34" charset="0"/>
-              </a:rPr>
-              <a:t>chosi</a:t>
-            </a:r>
-            <a:r>
-              <a:rPr lang="fr-FR" dirty="0">
-                <a:latin typeface="Arial" panose="020B0604020202020204" pitchFamily="34" charset="0"/>
-                <a:cs typeface="Arial" panose="020B0604020202020204" pitchFamily="34" charset="0"/>
-              </a:rPr>
-              <a:t> avec soin, réalisez une analyse par </a:t>
-            </a:r>
-            <a:r>
-              <a:rPr lang="fr-FR" dirty="0" err="1">
-                <a:latin typeface="Arial" panose="020B0604020202020204" pitchFamily="34" charset="0"/>
-                <a:cs typeface="Arial" panose="020B0604020202020204" pitchFamily="34" charset="0"/>
-              </a:rPr>
-              <a:t>random</a:t>
-            </a:r>
-            <a:r>
-              <a:rPr lang="fr-FR" dirty="0">
-                <a:latin typeface="Arial" panose="020B0604020202020204" pitchFamily="34" charset="0"/>
-                <a:cs typeface="Arial" panose="020B0604020202020204" pitchFamily="34" charset="0"/>
-              </a:rPr>
-              <a:t> </a:t>
-            </a:r>
-            <a:r>
-              <a:rPr lang="fr-FR" dirty="0" err="1">
-                <a:latin typeface="Arial" panose="020B0604020202020204" pitchFamily="34" charset="0"/>
-                <a:cs typeface="Arial" panose="020B0604020202020204" pitchFamily="34" charset="0"/>
-              </a:rPr>
-              <a:t>walk</a:t>
-            </a:r>
-            <a:r>
-              <a:rPr lang="fr-FR" dirty="0">
-                <a:latin typeface="Arial" panose="020B0604020202020204" pitchFamily="34" charset="0"/>
-                <a:cs typeface="Arial" panose="020B0604020202020204" pitchFamily="34" charset="0"/>
-              </a:rPr>
-              <a:t>, justifiez le choix de la </a:t>
-            </a:r>
-            <a:r>
-              <a:rPr lang="fr-FR" dirty="0" err="1">
-                <a:latin typeface="Arial" panose="020B0604020202020204" pitchFamily="34" charset="0"/>
-                <a:cs typeface="Arial" panose="020B0604020202020204" pitchFamily="34" charset="0"/>
-              </a:rPr>
-              <a:t>seed</a:t>
-            </a:r>
-            <a:r>
-              <a:rPr lang="fr-FR" dirty="0">
-                <a:latin typeface="Arial" panose="020B0604020202020204" pitchFamily="34" charset="0"/>
-                <a:cs typeface="Arial" panose="020B0604020202020204" pitchFamily="34" charset="0"/>
-              </a:rPr>
-              <a:t>, présentez les résultats.</a:t>
-            </a:r>
-          </a:p>
-          <a:p>
-            <a:pPr marL="0" indent="0">
-              <a:buNone/>
-            </a:pPr>
-            <a:r>
-              <a:rPr lang="fr-FR" dirty="0">
-                <a:latin typeface="Arial" panose="020B0604020202020204" pitchFamily="34" charset="0"/>
-                <a:cs typeface="Arial" panose="020B0604020202020204" pitchFamily="34" charset="0"/>
-              </a:rPr>
-              <a:t>- Réalisez une analyse d’enrichissement sur les données</a:t>
-            </a:r>
+              <a:rPr lang="en-US" dirty="0" err="1"/>
+              <a:t>Maha</a:t>
+            </a:r>
+            <a:endParaRPr lang="en-US" dirty="0"/>
           </a:p>
         </p:txBody>
       </p:sp>
     </p:spTree>
     <p:extLst>
       <p:ext uri="{BB962C8B-B14F-4D97-AF65-F5344CB8AC3E}">
-        <p14:creationId xmlns:p14="http://schemas.microsoft.com/office/powerpoint/2010/main" val="3156516260"/>
+        <p14:creationId xmlns:p14="http://schemas.microsoft.com/office/powerpoint/2010/main" val="3627111302"/>
       </p:ext>
     </p:extLst>
   </p:cSld>
@@ -11614,1951 +12330,6 @@
           <a:lstStyle/>
           <a:p>
             <a:r>
-              <a:rPr lang="en-US" sz="3200" b="1" dirty="0">
-                <a:latin typeface="Arial" panose="020B0604020202020204" pitchFamily="34" charset="0"/>
-                <a:cs typeface="Arial" panose="020B0604020202020204" pitchFamily="34" charset="0"/>
-              </a:rPr>
-              <a:t>Conclusion</a:t>
-            </a:r>
-          </a:p>
-        </p:txBody>
-      </p:sp>
-      <p:sp>
-        <p:nvSpPr>
-          <p:cNvPr id="6" name="Espace réservé du numéro de diapositive 5">
-            <a:extLst>
-              <a:ext uri="{FF2B5EF4-FFF2-40B4-BE49-F238E27FC236}">
-                <a16:creationId xmlns:a16="http://schemas.microsoft.com/office/drawing/2014/main" id="{EDD49CB1-F959-4004-3097-04AE4D0121BD}"/>
-              </a:ext>
-            </a:extLst>
-          </p:cNvPr>
-          <p:cNvSpPr>
-            <a:spLocks noGrp="1"/>
-          </p:cNvSpPr>
-          <p:nvPr>
-            <p:ph type="sldNum" sz="quarter" idx="12"/>
-          </p:nvPr>
-        </p:nvSpPr>
-        <p:spPr>
-          <a:xfrm>
-            <a:off x="8610600" y="6489520"/>
-            <a:ext cx="2743200" cy="365125"/>
-          </a:xfrm>
-        </p:spPr>
-        <p:txBody>
-          <a:bodyPr/>
-          <a:lstStyle/>
-          <a:p>
-            <a:fld id="{DB0B8EAA-8CF6-49F4-8FA8-2BD42B7C9F8B}" type="slidenum">
-              <a:rPr lang="fr-FR" smtClean="0"/>
-              <a:t>24</a:t>
-            </a:fld>
-            <a:endParaRPr lang="fr-FR"/>
-          </a:p>
-        </p:txBody>
-      </p:sp>
-      <p:pic>
-        <p:nvPicPr>
-          <p:cNvPr id="1026" name="Picture 2" descr="Appellation, logo et charte graphique : tout ce qu'il faut savoir | Université  Paris Cité">
-            <a:extLst>
-              <a:ext uri="{FF2B5EF4-FFF2-40B4-BE49-F238E27FC236}">
-                <a16:creationId xmlns:a16="http://schemas.microsoft.com/office/drawing/2014/main" id="{42388675-4549-B077-D592-84080955D58F}"/>
-              </a:ext>
-            </a:extLst>
-          </p:cNvPr>
-          <p:cNvPicPr>
-            <a:picLocks noChangeAspect="1" noChangeArrowheads="1"/>
-          </p:cNvPicPr>
-          <p:nvPr/>
-        </p:nvPicPr>
-        <p:blipFill>
-          <a:blip r:embed="rId2">
-            <a:extLst>
-              <a:ext uri="{28A0092B-C50C-407E-A947-70E740481C1C}">
-                <a14:useLocalDpi xmlns:a14="http://schemas.microsoft.com/office/drawing/2010/main" val="0"/>
-              </a:ext>
-            </a:extLst>
-          </a:blip>
-          <a:srcRect/>
-          <a:stretch>
-            <a:fillRect/>
-          </a:stretch>
-        </p:blipFill>
-        <p:spPr bwMode="auto">
-          <a:xfrm>
-            <a:off x="11363415" y="121082"/>
-            <a:ext cx="692461" cy="688543"/>
-          </a:xfrm>
-          <a:prstGeom prst="rect">
-            <a:avLst/>
-          </a:prstGeom>
-          <a:noFill/>
-          <a:extLst>
-            <a:ext uri="{909E8E84-426E-40DD-AFC4-6F175D3DCCD1}">
-              <a14:hiddenFill xmlns:a14="http://schemas.microsoft.com/office/drawing/2010/main">
-                <a:solidFill>
-                  <a:srgbClr val="FFFFFF"/>
-                </a:solidFill>
-              </a14:hiddenFill>
-            </a:ext>
-          </a:extLst>
-        </p:spPr>
-      </p:pic>
-      <p:cxnSp>
-        <p:nvCxnSpPr>
-          <p:cNvPr id="8" name="Connecteur droit 7">
-            <a:extLst>
-              <a:ext uri="{FF2B5EF4-FFF2-40B4-BE49-F238E27FC236}">
-                <a16:creationId xmlns:a16="http://schemas.microsoft.com/office/drawing/2014/main" id="{58EF74DE-8092-1233-D850-99E4719D068A}"/>
-              </a:ext>
-            </a:extLst>
-          </p:cNvPr>
-          <p:cNvCxnSpPr/>
-          <p:nvPr/>
-        </p:nvCxnSpPr>
-        <p:spPr>
-          <a:xfrm>
-            <a:off x="145740" y="853585"/>
-            <a:ext cx="11910136" cy="0"/>
-          </a:xfrm>
-          <a:prstGeom prst="line">
-            <a:avLst/>
-          </a:prstGeom>
-          <a:ln w="28575">
-            <a:solidFill>
-              <a:srgbClr val="8B1538"/>
-            </a:solidFill>
-          </a:ln>
-        </p:spPr>
-        <p:style>
-          <a:lnRef idx="1">
-            <a:schemeClr val="accent1"/>
-          </a:lnRef>
-          <a:fillRef idx="0">
-            <a:schemeClr val="accent1"/>
-          </a:fillRef>
-          <a:effectRef idx="0">
-            <a:schemeClr val="accent1"/>
-          </a:effectRef>
-          <a:fontRef idx="minor">
-            <a:schemeClr val="tx1"/>
-          </a:fontRef>
-        </p:style>
-      </p:cxnSp>
-      <p:sp>
-        <p:nvSpPr>
-          <p:cNvPr id="3" name="Espace réservé de la date 3">
-            <a:extLst>
-              <a:ext uri="{FF2B5EF4-FFF2-40B4-BE49-F238E27FC236}">
-                <a16:creationId xmlns:a16="http://schemas.microsoft.com/office/drawing/2014/main" id="{00CC99EF-F5C1-BD43-1DFF-BCBA359F5E21}"/>
-              </a:ext>
-            </a:extLst>
-          </p:cNvPr>
-          <p:cNvSpPr>
-            <a:spLocks noGrp="1"/>
-          </p:cNvSpPr>
-          <p:nvPr>
-            <p:ph type="dt" sz="half" idx="10"/>
-          </p:nvPr>
-        </p:nvSpPr>
-        <p:spPr>
-          <a:xfrm>
-            <a:off x="838200" y="6489520"/>
-            <a:ext cx="2743200" cy="365125"/>
-          </a:xfrm>
-        </p:spPr>
-        <p:txBody>
-          <a:bodyPr/>
-          <a:lstStyle/>
-          <a:p>
-            <a:r>
-              <a:rPr lang="fr-FR" dirty="0"/>
-              <a:t>12/10/2022</a:t>
-            </a:r>
-          </a:p>
-        </p:txBody>
-      </p:sp>
-      <p:sp>
-        <p:nvSpPr>
-          <p:cNvPr id="7" name="Espace réservé du pied de page 4">
-            <a:extLst>
-              <a:ext uri="{FF2B5EF4-FFF2-40B4-BE49-F238E27FC236}">
-                <a16:creationId xmlns:a16="http://schemas.microsoft.com/office/drawing/2014/main" id="{69D56551-2494-9A74-75F6-47857596E832}"/>
-              </a:ext>
-            </a:extLst>
-          </p:cNvPr>
-          <p:cNvSpPr>
-            <a:spLocks noGrp="1"/>
-          </p:cNvSpPr>
-          <p:nvPr>
-            <p:ph type="ftr" sz="quarter" idx="11"/>
-          </p:nvPr>
-        </p:nvSpPr>
-        <p:spPr>
-          <a:xfrm>
-            <a:off x="3810000" y="6492876"/>
-            <a:ext cx="4800600" cy="365124"/>
-          </a:xfrm>
-        </p:spPr>
-        <p:txBody>
-          <a:bodyPr/>
-          <a:lstStyle/>
-          <a:p>
-            <a:pPr algn="l"/>
-            <a:r>
-              <a:rPr lang="en-US" dirty="0"/>
-              <a:t>Delhomme Jean, </a:t>
-            </a:r>
-            <a:r>
-              <a:rPr lang="en-US" dirty="0" err="1"/>
-              <a:t>Lecourieux</a:t>
-            </a:r>
-            <a:r>
-              <a:rPr lang="en-US" dirty="0"/>
-              <a:t> Adriana, Rousseau Baptiste, </a:t>
-            </a:r>
-            <a:r>
-              <a:rPr lang="en-US" dirty="0" err="1"/>
-              <a:t>Graa</a:t>
-            </a:r>
-            <a:r>
-              <a:rPr lang="en-US" dirty="0"/>
-              <a:t> </a:t>
-            </a:r>
-            <a:r>
-              <a:rPr lang="en-US" dirty="0" err="1"/>
-              <a:t>Maha</a:t>
-            </a:r>
-            <a:endParaRPr lang="en-US" dirty="0"/>
-          </a:p>
-        </p:txBody>
-      </p:sp>
-      <p:sp>
-        <p:nvSpPr>
-          <p:cNvPr id="9" name="Espace réservé du contenu 2">
-            <a:extLst>
-              <a:ext uri="{FF2B5EF4-FFF2-40B4-BE49-F238E27FC236}">
-                <a16:creationId xmlns:a16="http://schemas.microsoft.com/office/drawing/2014/main" id="{24661F3C-BD68-1889-C53B-A4CD91554EA7}"/>
-              </a:ext>
-            </a:extLst>
-          </p:cNvPr>
-          <p:cNvSpPr txBox="1">
-            <a:spLocks/>
-          </p:cNvSpPr>
-          <p:nvPr/>
-        </p:nvSpPr>
-        <p:spPr>
-          <a:xfrm>
-            <a:off x="231320" y="1078238"/>
-            <a:ext cx="11824556" cy="5300591"/>
-          </a:xfrm>
-          <a:prstGeom prst="rect">
-            <a:avLst/>
-          </a:prstGeom>
-        </p:spPr>
-        <p:txBody>
-          <a:bodyPr vert="horz" lIns="91440" tIns="45720" rIns="91440" bIns="45720" rtlCol="0">
-            <a:normAutofit/>
-          </a:bodyPr>
-          <a:lstStyle>
-            <a:lvl1pPr marL="228600" indent="-228600" algn="l" defTabSz="914400" rtl="0" eaLnBrk="1" latinLnBrk="0" hangingPunct="1">
-              <a:lnSpc>
-                <a:spcPct val="90000"/>
-              </a:lnSpc>
-              <a:spcBef>
-                <a:spcPts val="1000"/>
-              </a:spcBef>
-              <a:buFont typeface="Arial" panose="020B0604020202020204" pitchFamily="34" charset="0"/>
-              <a:buChar char="•"/>
-              <a:defRPr sz="2800" kern="1200">
-                <a:solidFill>
-                  <a:schemeClr val="tx1"/>
-                </a:solidFill>
-                <a:latin typeface="+mn-lt"/>
-                <a:ea typeface="+mn-ea"/>
-                <a:cs typeface="+mn-cs"/>
-              </a:defRPr>
-            </a:lvl1pPr>
-            <a:lvl2pPr marL="685800" indent="-228600" algn="l" defTabSz="914400" rtl="0" eaLnBrk="1" latinLnBrk="0" hangingPunct="1">
-              <a:lnSpc>
-                <a:spcPct val="90000"/>
-              </a:lnSpc>
-              <a:spcBef>
-                <a:spcPts val="500"/>
-              </a:spcBef>
-              <a:buFont typeface="Arial" panose="020B0604020202020204" pitchFamily="34" charset="0"/>
-              <a:buChar char="•"/>
-              <a:defRPr sz="2400" kern="1200">
-                <a:solidFill>
-                  <a:schemeClr val="tx1"/>
-                </a:solidFill>
-                <a:latin typeface="+mn-lt"/>
-                <a:ea typeface="+mn-ea"/>
-                <a:cs typeface="+mn-cs"/>
-              </a:defRPr>
-            </a:lvl2pPr>
-            <a:lvl3pPr marL="1143000" indent="-228600" algn="l" defTabSz="914400" rtl="0" eaLnBrk="1" latinLnBrk="0" hangingPunct="1">
-              <a:lnSpc>
-                <a:spcPct val="90000"/>
-              </a:lnSpc>
-              <a:spcBef>
-                <a:spcPts val="500"/>
-              </a:spcBef>
-              <a:buFont typeface="Arial" panose="020B0604020202020204" pitchFamily="34" charset="0"/>
-              <a:buChar char="•"/>
-              <a:defRPr sz="2000" kern="1200">
-                <a:solidFill>
-                  <a:schemeClr val="tx1"/>
-                </a:solidFill>
-                <a:latin typeface="+mn-lt"/>
-                <a:ea typeface="+mn-ea"/>
-                <a:cs typeface="+mn-cs"/>
-              </a:defRPr>
-            </a:lvl3pPr>
-            <a:lvl4pPr marL="1600200" indent="-228600" algn="l" defTabSz="914400" rtl="0" eaLnBrk="1" latinLnBrk="0" hangingPunct="1">
-              <a:lnSpc>
-                <a:spcPct val="90000"/>
-              </a:lnSpc>
-              <a:spcBef>
-                <a:spcPts val="500"/>
-              </a:spcBef>
-              <a:buFont typeface="Arial" panose="020B0604020202020204" pitchFamily="34" charset="0"/>
-              <a:buChar char="•"/>
-              <a:defRPr sz="1800" kern="1200">
-                <a:solidFill>
-                  <a:schemeClr val="tx1"/>
-                </a:solidFill>
-                <a:latin typeface="+mn-lt"/>
-                <a:ea typeface="+mn-ea"/>
-                <a:cs typeface="+mn-cs"/>
-              </a:defRPr>
-            </a:lvl4pPr>
-            <a:lvl5pPr marL="2057400" indent="-228600" algn="l" defTabSz="914400" rtl="0" eaLnBrk="1" latinLnBrk="0" hangingPunct="1">
-              <a:lnSpc>
-                <a:spcPct val="90000"/>
-              </a:lnSpc>
-              <a:spcBef>
-                <a:spcPts val="500"/>
-              </a:spcBef>
-              <a:buFont typeface="Arial" panose="020B0604020202020204" pitchFamily="34" charset="0"/>
-              <a:buChar char="•"/>
-              <a:defRPr sz="1800" kern="1200">
-                <a:solidFill>
-                  <a:schemeClr val="tx1"/>
-                </a:solidFill>
-                <a:latin typeface="+mn-lt"/>
-                <a:ea typeface="+mn-ea"/>
-                <a:cs typeface="+mn-cs"/>
-              </a:defRPr>
-            </a:lvl5pPr>
-            <a:lvl6pPr marL="2514600" indent="-228600" algn="l" defTabSz="914400" rtl="0" eaLnBrk="1" latinLnBrk="0" hangingPunct="1">
-              <a:lnSpc>
-                <a:spcPct val="90000"/>
-              </a:lnSpc>
-              <a:spcBef>
-                <a:spcPts val="500"/>
-              </a:spcBef>
-              <a:buFont typeface="Arial" panose="020B0604020202020204" pitchFamily="34" charset="0"/>
-              <a:buChar char="•"/>
-              <a:defRPr sz="1800" kern="1200">
-                <a:solidFill>
-                  <a:schemeClr val="tx1"/>
-                </a:solidFill>
-                <a:latin typeface="+mn-lt"/>
-                <a:ea typeface="+mn-ea"/>
-                <a:cs typeface="+mn-cs"/>
-              </a:defRPr>
-            </a:lvl6pPr>
-            <a:lvl7pPr marL="2971800" indent="-228600" algn="l" defTabSz="914400" rtl="0" eaLnBrk="1" latinLnBrk="0" hangingPunct="1">
-              <a:lnSpc>
-                <a:spcPct val="90000"/>
-              </a:lnSpc>
-              <a:spcBef>
-                <a:spcPts val="500"/>
-              </a:spcBef>
-              <a:buFont typeface="Arial" panose="020B0604020202020204" pitchFamily="34" charset="0"/>
-              <a:buChar char="•"/>
-              <a:defRPr sz="1800" kern="1200">
-                <a:solidFill>
-                  <a:schemeClr val="tx1"/>
-                </a:solidFill>
-                <a:latin typeface="+mn-lt"/>
-                <a:ea typeface="+mn-ea"/>
-                <a:cs typeface="+mn-cs"/>
-              </a:defRPr>
-            </a:lvl7pPr>
-            <a:lvl8pPr marL="3429000" indent="-228600" algn="l" defTabSz="914400" rtl="0" eaLnBrk="1" latinLnBrk="0" hangingPunct="1">
-              <a:lnSpc>
-                <a:spcPct val="90000"/>
-              </a:lnSpc>
-              <a:spcBef>
-                <a:spcPts val="500"/>
-              </a:spcBef>
-              <a:buFont typeface="Arial" panose="020B0604020202020204" pitchFamily="34" charset="0"/>
-              <a:buChar char="•"/>
-              <a:defRPr sz="1800" kern="1200">
-                <a:solidFill>
-                  <a:schemeClr val="tx1"/>
-                </a:solidFill>
-                <a:latin typeface="+mn-lt"/>
-                <a:ea typeface="+mn-ea"/>
-                <a:cs typeface="+mn-cs"/>
-              </a:defRPr>
-            </a:lvl8pPr>
-            <a:lvl9pPr marL="3886200" indent="-228600" algn="l" defTabSz="914400" rtl="0" eaLnBrk="1" latinLnBrk="0" hangingPunct="1">
-              <a:lnSpc>
-                <a:spcPct val="90000"/>
-              </a:lnSpc>
-              <a:spcBef>
-                <a:spcPts val="500"/>
-              </a:spcBef>
-              <a:buFont typeface="Arial" panose="020B0604020202020204" pitchFamily="34" charset="0"/>
-              <a:buChar char="•"/>
-              <a:defRPr sz="1800" kern="1200">
-                <a:solidFill>
-                  <a:schemeClr val="tx1"/>
-                </a:solidFill>
-                <a:latin typeface="+mn-lt"/>
-                <a:ea typeface="+mn-ea"/>
-                <a:cs typeface="+mn-cs"/>
-              </a:defRPr>
-            </a:lvl9pPr>
-          </a:lstStyle>
-          <a:p>
-            <a:pPr>
-              <a:buFontTx/>
-              <a:buChar char="-"/>
-            </a:pPr>
-            <a:r>
-              <a:rPr lang="fr-FR" dirty="0">
-                <a:latin typeface="Arial" panose="020B0604020202020204" pitchFamily="34" charset="0"/>
-                <a:cs typeface="Arial" panose="020B0604020202020204" pitchFamily="34" charset="0"/>
-              </a:rPr>
-              <a:t>Points forts et points faibles des outils</a:t>
-            </a:r>
-          </a:p>
-          <a:p>
-            <a:pPr marL="0" indent="0">
-              <a:buNone/>
-            </a:pPr>
-            <a:r>
-              <a:rPr lang="fr-FR" dirty="0" err="1">
-                <a:latin typeface="Arial" panose="020B0604020202020204" pitchFamily="34" charset="0"/>
-                <a:cs typeface="Arial" panose="020B0604020202020204" pitchFamily="34" charset="0"/>
-              </a:rPr>
-              <a:t>Diffiile</a:t>
-            </a:r>
-            <a:r>
-              <a:rPr lang="fr-FR" dirty="0">
-                <a:latin typeface="Arial" panose="020B0604020202020204" pitchFamily="34" charset="0"/>
-                <a:cs typeface="Arial" panose="020B0604020202020204" pitchFamily="34" charset="0"/>
-              </a:rPr>
-              <a:t> d’installer les packages</a:t>
-            </a:r>
-          </a:p>
-          <a:p>
-            <a:pPr marL="0" indent="0">
-              <a:buNone/>
-            </a:pPr>
-            <a:r>
-              <a:rPr lang="fr-FR" dirty="0" err="1">
-                <a:latin typeface="Arial" panose="020B0604020202020204" pitchFamily="34" charset="0"/>
-                <a:cs typeface="Arial" panose="020B0604020202020204" pitchFamily="34" charset="0"/>
-              </a:rPr>
-              <a:t>mixOmics</a:t>
-            </a:r>
-            <a:r>
-              <a:rPr lang="fr-FR" dirty="0">
-                <a:latin typeface="Arial" panose="020B0604020202020204" pitchFamily="34" charset="0"/>
-                <a:cs typeface="Arial" panose="020B0604020202020204" pitchFamily="34" charset="0"/>
-              </a:rPr>
-              <a:t> c’est top</a:t>
-            </a:r>
-          </a:p>
-          <a:p>
-            <a:pPr marL="0" indent="0">
-              <a:buNone/>
-            </a:pPr>
-            <a:r>
-              <a:rPr lang="fr-FR" dirty="0" err="1">
-                <a:latin typeface="Arial" panose="020B0604020202020204" pitchFamily="34" charset="0"/>
-                <a:cs typeface="Arial" panose="020B0604020202020204" pitchFamily="34" charset="0"/>
-              </a:rPr>
-              <a:t>Mirtarbase</a:t>
-            </a:r>
-            <a:r>
-              <a:rPr lang="fr-FR" dirty="0">
-                <a:latin typeface="Arial" panose="020B0604020202020204" pitchFamily="34" charset="0"/>
-                <a:cs typeface="Arial" panose="020B0604020202020204" pitchFamily="34" charset="0"/>
-              </a:rPr>
-              <a:t> est nul et mal documenté (le site est mort)</a:t>
-            </a:r>
-          </a:p>
-          <a:p>
-            <a:pPr marL="0" indent="0">
-              <a:buNone/>
-            </a:pPr>
-            <a:r>
-              <a:rPr lang="fr-FR" dirty="0" err="1">
-                <a:latin typeface="Arial" panose="020B0604020202020204" pitchFamily="34" charset="0"/>
-                <a:cs typeface="Arial" panose="020B0604020202020204" pitchFamily="34" charset="0"/>
-              </a:rPr>
-              <a:t>MirdB</a:t>
-            </a:r>
-            <a:endParaRPr lang="fr-FR" dirty="0">
-              <a:latin typeface="Arial" panose="020B0604020202020204" pitchFamily="34" charset="0"/>
-              <a:cs typeface="Arial" panose="020B0604020202020204" pitchFamily="34" charset="0"/>
-            </a:endParaRPr>
-          </a:p>
-          <a:p>
-            <a:pPr marL="0" indent="0">
-              <a:buNone/>
-            </a:pPr>
-            <a:r>
-              <a:rPr lang="fr-FR" dirty="0" err="1">
-                <a:latin typeface="Arial" panose="020B0604020202020204" pitchFamily="34" charset="0"/>
-                <a:cs typeface="Arial" panose="020B0604020202020204" pitchFamily="34" charset="0"/>
-              </a:rPr>
-              <a:t>MirBase</a:t>
-            </a:r>
-            <a:endParaRPr lang="fr-FR" dirty="0">
-              <a:latin typeface="Arial" panose="020B0604020202020204" pitchFamily="34" charset="0"/>
-              <a:cs typeface="Arial" panose="020B0604020202020204" pitchFamily="34" charset="0"/>
-            </a:endParaRPr>
-          </a:p>
-          <a:p>
-            <a:pPr marL="0" indent="0">
-              <a:buNone/>
-            </a:pPr>
-            <a:r>
-              <a:rPr lang="fr-FR" dirty="0" err="1">
-                <a:latin typeface="Arial" panose="020B0604020202020204" pitchFamily="34" charset="0"/>
-                <a:cs typeface="Arial" panose="020B0604020202020204" pitchFamily="34" charset="0"/>
-              </a:rPr>
-              <a:t>Tarbase</a:t>
-            </a:r>
-            <a:endParaRPr lang="fr-FR" dirty="0">
-              <a:latin typeface="Arial" panose="020B0604020202020204" pitchFamily="34" charset="0"/>
-              <a:cs typeface="Arial" panose="020B0604020202020204" pitchFamily="34" charset="0"/>
-            </a:endParaRPr>
-          </a:p>
-          <a:p>
-            <a:pPr>
-              <a:buFontTx/>
-              <a:buChar char="-"/>
-            </a:pPr>
-            <a:r>
-              <a:rPr lang="fr-FR" dirty="0">
-                <a:latin typeface="Arial" panose="020B0604020202020204" pitchFamily="34" charset="0"/>
-                <a:cs typeface="Arial" panose="020B0604020202020204" pitchFamily="34" charset="0"/>
-              </a:rPr>
-              <a:t>Difficultés rencontrées</a:t>
-            </a:r>
-          </a:p>
-          <a:p>
-            <a:pPr>
-              <a:buFontTx/>
-              <a:buChar char="-"/>
-            </a:pPr>
-            <a:r>
-              <a:rPr lang="fr-FR" dirty="0">
-                <a:latin typeface="Arial" panose="020B0604020202020204" pitchFamily="34" charset="0"/>
-                <a:cs typeface="Arial" panose="020B0604020202020204" pitchFamily="34" charset="0"/>
-              </a:rPr>
-              <a:t>Résumé des résultats</a:t>
-            </a:r>
-          </a:p>
-        </p:txBody>
-      </p:sp>
-    </p:spTree>
-    <p:extLst>
-      <p:ext uri="{BB962C8B-B14F-4D97-AF65-F5344CB8AC3E}">
-        <p14:creationId xmlns:p14="http://schemas.microsoft.com/office/powerpoint/2010/main" val="2333177088"/>
-      </p:ext>
-    </p:extLst>
-  </p:cSld>
-  <p:clrMapOvr>
-    <a:masterClrMapping/>
-  </p:clrMapOvr>
-</p:sld>
-</file>
-
-<file path=ppt/slides/slide25.xml><?xml version="1.0" encoding="utf-8"?>
-<p:sld xmlns:a="http://schemas.openxmlformats.org/drawingml/2006/main" xmlns:r="http://schemas.openxmlformats.org/officeDocument/2006/relationships" xmlns:p="http://schemas.openxmlformats.org/presentationml/2006/main">
-  <p:cSld>
-    <p:spTree>
-      <p:nvGrpSpPr>
-        <p:cNvPr id="1" name=""/>
-        <p:cNvGrpSpPr/>
-        <p:nvPr/>
-      </p:nvGrpSpPr>
-      <p:grpSpPr>
-        <a:xfrm>
-          <a:off x="0" y="0"/>
-          <a:ext cx="0" cy="0"/>
-          <a:chOff x="0" y="0"/>
-          <a:chExt cx="0" cy="0"/>
-        </a:xfrm>
-      </p:grpSpPr>
-      <p:sp>
-        <p:nvSpPr>
-          <p:cNvPr id="2" name="Titre 1">
-            <a:extLst>
-              <a:ext uri="{FF2B5EF4-FFF2-40B4-BE49-F238E27FC236}">
-                <a16:creationId xmlns:a16="http://schemas.microsoft.com/office/drawing/2014/main" id="{3AC5EA2C-9518-355B-24FA-608C24FE72E3}"/>
-              </a:ext>
-            </a:extLst>
-          </p:cNvPr>
-          <p:cNvSpPr>
-            <a:spLocks noGrp="1"/>
-          </p:cNvSpPr>
-          <p:nvPr>
-            <p:ph type="title"/>
-          </p:nvPr>
-        </p:nvSpPr>
-        <p:spPr>
-          <a:xfrm>
-            <a:off x="145740" y="117877"/>
-            <a:ext cx="11137778" cy="691318"/>
-          </a:xfrm>
-        </p:spPr>
-        <p:txBody>
-          <a:bodyPr>
-            <a:normAutofit/>
-          </a:bodyPr>
-          <a:lstStyle/>
-          <a:p>
-            <a:r>
-              <a:rPr lang="en-US" sz="3200" b="1" dirty="0">
-                <a:latin typeface="Arial" panose="020B0604020202020204" pitchFamily="34" charset="0"/>
-                <a:cs typeface="Arial" panose="020B0604020202020204" pitchFamily="34" charset="0"/>
-              </a:rPr>
-              <a:t>References</a:t>
-            </a:r>
-          </a:p>
-        </p:txBody>
-      </p:sp>
-      <p:sp>
-        <p:nvSpPr>
-          <p:cNvPr id="3" name="Espace réservé du contenu 2">
-            <a:extLst>
-              <a:ext uri="{FF2B5EF4-FFF2-40B4-BE49-F238E27FC236}">
-                <a16:creationId xmlns:a16="http://schemas.microsoft.com/office/drawing/2014/main" id="{7D811F63-52EF-83B1-E13C-148915CEDEC3}"/>
-              </a:ext>
-            </a:extLst>
-          </p:cNvPr>
-          <p:cNvSpPr>
-            <a:spLocks noGrp="1"/>
-          </p:cNvSpPr>
-          <p:nvPr>
-            <p:ph idx="1"/>
-          </p:nvPr>
-        </p:nvSpPr>
-        <p:spPr>
-          <a:xfrm>
-            <a:off x="145740" y="964491"/>
-            <a:ext cx="11910136" cy="5498453"/>
-          </a:xfrm>
-        </p:spPr>
-        <p:txBody>
-          <a:bodyPr/>
-          <a:lstStyle/>
-          <a:p>
-            <a:pPr marL="342900" lvl="0" indent="-342900">
-              <a:lnSpc>
-                <a:spcPct val="107000"/>
-              </a:lnSpc>
-              <a:buFont typeface="+mj-lt"/>
-              <a:buAutoNum type="arabicPeriod"/>
-            </a:pPr>
-            <a:r>
-              <a:rPr lang="fr-FR" sz="1800" dirty="0">
-                <a:effectLst/>
-                <a:latin typeface="Times New Roman" panose="02020603050405020304" pitchFamily="18" charset="0"/>
-                <a:ea typeface="Calibri" panose="020F0502020204030204" pitchFamily="34" charset="0"/>
-                <a:cs typeface="Times New Roman" panose="02020603050405020304" pitchFamily="18" charset="0"/>
-              </a:rPr>
-              <a:t>S. </a:t>
-            </a:r>
-            <a:r>
-              <a:rPr lang="fr-FR" sz="1800" dirty="0" err="1">
-                <a:effectLst/>
-                <a:latin typeface="Times New Roman" panose="02020603050405020304" pitchFamily="18" charset="0"/>
-                <a:ea typeface="Calibri" panose="020F0502020204030204" pitchFamily="34" charset="0"/>
-                <a:cs typeface="Times New Roman" panose="02020603050405020304" pitchFamily="18" charset="0"/>
-              </a:rPr>
-              <a:t>Altschul</a:t>
-            </a:r>
-            <a:r>
-              <a:rPr lang="fr-FR" sz="1800" dirty="0">
-                <a:effectLst/>
-                <a:latin typeface="Times New Roman" panose="02020603050405020304" pitchFamily="18" charset="0"/>
-                <a:ea typeface="Calibri" panose="020F0502020204030204" pitchFamily="34" charset="0"/>
-                <a:cs typeface="Times New Roman" panose="02020603050405020304" pitchFamily="18" charset="0"/>
-              </a:rPr>
-              <a:t> et al. (2017) </a:t>
-            </a:r>
-            <a:r>
-              <a:rPr lang="fr-FR" sz="1800" dirty="0" err="1">
-                <a:effectLst/>
-                <a:latin typeface="Times New Roman" panose="02020603050405020304" pitchFamily="18" charset="0"/>
-                <a:ea typeface="Calibri" panose="020F0502020204030204" pitchFamily="34" charset="0"/>
-                <a:cs typeface="Times New Roman" panose="02020603050405020304" pitchFamily="18" charset="0"/>
-              </a:rPr>
-              <a:t>Handbook</a:t>
-            </a:r>
-            <a:r>
-              <a:rPr lang="fr-FR" sz="1800" dirty="0">
-                <a:effectLst/>
-                <a:latin typeface="Times New Roman" panose="02020603050405020304" pitchFamily="18" charset="0"/>
-                <a:ea typeface="Calibri" panose="020F0502020204030204" pitchFamily="34" charset="0"/>
-                <a:cs typeface="Times New Roman" panose="02020603050405020304" pitchFamily="18" charset="0"/>
-              </a:rPr>
-              <a:t> of </a:t>
-            </a:r>
-            <a:r>
-              <a:rPr lang="fr-FR" sz="1800" dirty="0" err="1">
-                <a:effectLst/>
-                <a:latin typeface="Times New Roman" panose="02020603050405020304" pitchFamily="18" charset="0"/>
-                <a:ea typeface="Calibri" panose="020F0502020204030204" pitchFamily="34" charset="0"/>
-                <a:cs typeface="Times New Roman" panose="02020603050405020304" pitchFamily="18" charset="0"/>
-              </a:rPr>
-              <a:t>Discrete</a:t>
-            </a:r>
-            <a:r>
-              <a:rPr lang="fr-FR" sz="1800" dirty="0">
-                <a:effectLst/>
-                <a:latin typeface="Times New Roman" panose="02020603050405020304" pitchFamily="18" charset="0"/>
-                <a:ea typeface="Calibri" panose="020F0502020204030204" pitchFamily="34" charset="0"/>
-                <a:cs typeface="Times New Roman" panose="02020603050405020304" pitchFamily="18" charset="0"/>
-              </a:rPr>
-              <a:t> and </a:t>
-            </a:r>
-            <a:r>
-              <a:rPr lang="fr-FR" sz="1800" dirty="0" err="1">
-                <a:effectLst/>
-                <a:latin typeface="Times New Roman" panose="02020603050405020304" pitchFamily="18" charset="0"/>
-                <a:ea typeface="Calibri" panose="020F0502020204030204" pitchFamily="34" charset="0"/>
-                <a:cs typeface="Times New Roman" panose="02020603050405020304" pitchFamily="18" charset="0"/>
-              </a:rPr>
-              <a:t>Combinatorial</a:t>
-            </a:r>
-            <a:r>
-              <a:rPr lang="fr-FR" sz="1800" dirty="0">
-                <a:effectLst/>
-                <a:latin typeface="Times New Roman" panose="02020603050405020304" pitchFamily="18" charset="0"/>
-                <a:ea typeface="Calibri" panose="020F0502020204030204" pitchFamily="34" charset="0"/>
-                <a:cs typeface="Times New Roman" panose="02020603050405020304" pitchFamily="18" charset="0"/>
-              </a:rPr>
-              <a:t> </a:t>
-            </a:r>
-            <a:r>
-              <a:rPr lang="fr-FR" sz="1800" dirty="0" err="1">
-                <a:effectLst/>
-                <a:latin typeface="Times New Roman" panose="02020603050405020304" pitchFamily="18" charset="0"/>
-                <a:ea typeface="Calibri" panose="020F0502020204030204" pitchFamily="34" charset="0"/>
-                <a:cs typeface="Times New Roman" panose="02020603050405020304" pitchFamily="18" charset="0"/>
-              </a:rPr>
-              <a:t>Mathematics</a:t>
-            </a:r>
-            <a:r>
-              <a:rPr lang="fr-FR" sz="1800" dirty="0">
-                <a:effectLst/>
-                <a:latin typeface="Times New Roman" panose="02020603050405020304" pitchFamily="18" charset="0"/>
-                <a:ea typeface="Calibri" panose="020F0502020204030204" pitchFamily="34" charset="0"/>
-                <a:cs typeface="Times New Roman" panose="02020603050405020304" pitchFamily="18" charset="0"/>
-              </a:rPr>
-              <a:t>. 2nd </a:t>
-            </a:r>
-            <a:r>
-              <a:rPr lang="fr-FR" sz="1800" dirty="0" err="1">
-                <a:effectLst/>
-                <a:latin typeface="Times New Roman" panose="02020603050405020304" pitchFamily="18" charset="0"/>
-                <a:ea typeface="Calibri" panose="020F0502020204030204" pitchFamily="34" charset="0"/>
-                <a:cs typeface="Times New Roman" panose="02020603050405020304" pitchFamily="18" charset="0"/>
-              </a:rPr>
-              <a:t>edition</a:t>
-            </a:r>
-            <a:r>
-              <a:rPr lang="fr-FR" sz="1800" dirty="0">
-                <a:effectLst/>
-                <a:latin typeface="Times New Roman" panose="02020603050405020304" pitchFamily="18" charset="0"/>
-                <a:ea typeface="Calibri" panose="020F0502020204030204" pitchFamily="34" charset="0"/>
-                <a:cs typeface="Times New Roman" panose="02020603050405020304" pitchFamily="18" charset="0"/>
-              </a:rPr>
-              <a:t>, </a:t>
-            </a:r>
-            <a:r>
-              <a:rPr lang="fr-FR" sz="1800" dirty="0" err="1">
-                <a:effectLst/>
-                <a:latin typeface="Times New Roman" panose="02020603050405020304" pitchFamily="18" charset="0"/>
-                <a:ea typeface="Calibri" panose="020F0502020204030204" pitchFamily="34" charset="0"/>
-                <a:cs typeface="Times New Roman" panose="02020603050405020304" pitchFamily="18" charset="0"/>
-              </a:rPr>
-              <a:t>Chapter</a:t>
-            </a:r>
-            <a:r>
-              <a:rPr lang="fr-FR" sz="1800" dirty="0">
-                <a:effectLst/>
-                <a:latin typeface="Times New Roman" panose="02020603050405020304" pitchFamily="18" charset="0"/>
-                <a:ea typeface="Calibri" panose="020F0502020204030204" pitchFamily="34" charset="0"/>
-                <a:cs typeface="Times New Roman" panose="02020603050405020304" pitchFamily="18" charset="0"/>
-              </a:rPr>
-              <a:t> 20.1 </a:t>
-            </a:r>
-            <a:r>
-              <a:rPr lang="fr-FR" sz="1800" dirty="0" err="1">
-                <a:effectLst/>
-                <a:latin typeface="Times New Roman" panose="02020603050405020304" pitchFamily="18" charset="0"/>
-                <a:ea typeface="Calibri" panose="020F0502020204030204" pitchFamily="34" charset="0"/>
-                <a:cs typeface="Times New Roman" panose="02020603050405020304" pitchFamily="18" charset="0"/>
-              </a:rPr>
-              <a:t>Sequence</a:t>
-            </a:r>
-            <a:endParaRPr lang="fr-FR" sz="1800" dirty="0">
-              <a:effectLst/>
-              <a:latin typeface="Calibri" panose="020F0502020204030204" pitchFamily="34" charset="0"/>
-              <a:ea typeface="Calibri" panose="020F0502020204030204" pitchFamily="34" charset="0"/>
-              <a:cs typeface="Times New Roman" panose="02020603050405020304" pitchFamily="18" charset="0"/>
-            </a:endParaRPr>
-          </a:p>
-          <a:p>
-            <a:pPr marL="342900" lvl="0" indent="-342900" algn="just">
-              <a:lnSpc>
-                <a:spcPct val="107000"/>
-              </a:lnSpc>
-              <a:buFont typeface="+mj-lt"/>
-              <a:buAutoNum type="arabicPeriod"/>
-            </a:pPr>
-            <a:r>
-              <a:rPr lang="fr-FR" sz="1800" dirty="0">
-                <a:effectLst/>
-                <a:latin typeface="Times New Roman" panose="02020603050405020304" pitchFamily="18" charset="0"/>
-                <a:ea typeface="Calibri" panose="020F0502020204030204" pitchFamily="34" charset="0"/>
-                <a:cs typeface="Times New Roman" panose="02020603050405020304" pitchFamily="18" charset="0"/>
-              </a:rPr>
-              <a:t>T. </a:t>
-            </a:r>
-            <a:r>
-              <a:rPr lang="fr-FR" sz="1800" dirty="0" err="1">
-                <a:effectLst/>
-                <a:latin typeface="Times New Roman" panose="02020603050405020304" pitchFamily="18" charset="0"/>
-                <a:ea typeface="Calibri" panose="020F0502020204030204" pitchFamily="34" charset="0"/>
-                <a:cs typeface="Times New Roman" panose="02020603050405020304" pitchFamily="18" charset="0"/>
-              </a:rPr>
-              <a:t>Bepler</a:t>
-            </a:r>
-            <a:r>
-              <a:rPr lang="fr-FR" sz="1800" dirty="0">
-                <a:effectLst/>
-                <a:latin typeface="Times New Roman" panose="02020603050405020304" pitchFamily="18" charset="0"/>
-                <a:ea typeface="Calibri" panose="020F0502020204030204" pitchFamily="34" charset="0"/>
-                <a:cs typeface="Times New Roman" panose="02020603050405020304" pitchFamily="18" charset="0"/>
-              </a:rPr>
-              <a:t> et al. (2021) Learning the </a:t>
-            </a:r>
-            <a:r>
-              <a:rPr lang="fr-FR" sz="1800" dirty="0" err="1">
-                <a:effectLst/>
-                <a:latin typeface="Times New Roman" panose="02020603050405020304" pitchFamily="18" charset="0"/>
-                <a:ea typeface="Calibri" panose="020F0502020204030204" pitchFamily="34" charset="0"/>
-                <a:cs typeface="Times New Roman" panose="02020603050405020304" pitchFamily="18" charset="0"/>
-              </a:rPr>
-              <a:t>protein</a:t>
-            </a:r>
-            <a:r>
-              <a:rPr lang="fr-FR" sz="1800" dirty="0">
-                <a:effectLst/>
-                <a:latin typeface="Times New Roman" panose="02020603050405020304" pitchFamily="18" charset="0"/>
-                <a:ea typeface="Calibri" panose="020F0502020204030204" pitchFamily="34" charset="0"/>
-                <a:cs typeface="Times New Roman" panose="02020603050405020304" pitchFamily="18" charset="0"/>
-              </a:rPr>
-              <a:t> </a:t>
-            </a:r>
-            <a:r>
-              <a:rPr lang="fr-FR" sz="1800" dirty="0" err="1">
-                <a:effectLst/>
-                <a:latin typeface="Times New Roman" panose="02020603050405020304" pitchFamily="18" charset="0"/>
-                <a:ea typeface="Calibri" panose="020F0502020204030204" pitchFamily="34" charset="0"/>
-                <a:cs typeface="Times New Roman" panose="02020603050405020304" pitchFamily="18" charset="0"/>
-              </a:rPr>
-              <a:t>language</a:t>
-            </a:r>
-            <a:r>
-              <a:rPr lang="fr-FR" sz="1800" dirty="0">
-                <a:effectLst/>
-                <a:latin typeface="Times New Roman" panose="02020603050405020304" pitchFamily="18" charset="0"/>
-                <a:ea typeface="Calibri" panose="020F0502020204030204" pitchFamily="34" charset="0"/>
-                <a:cs typeface="Times New Roman" panose="02020603050405020304" pitchFamily="18" charset="0"/>
-              </a:rPr>
-              <a:t>: Evolution, structure, and </a:t>
-            </a:r>
-            <a:r>
-              <a:rPr lang="fr-FR" sz="1800" dirty="0" err="1">
-                <a:effectLst/>
-                <a:latin typeface="Times New Roman" panose="02020603050405020304" pitchFamily="18" charset="0"/>
-                <a:ea typeface="Calibri" panose="020F0502020204030204" pitchFamily="34" charset="0"/>
-                <a:cs typeface="Times New Roman" panose="02020603050405020304" pitchFamily="18" charset="0"/>
-              </a:rPr>
-              <a:t>function</a:t>
-            </a:r>
-            <a:r>
-              <a:rPr lang="fr-FR" sz="1800" dirty="0">
-                <a:effectLst/>
-                <a:latin typeface="Times New Roman" panose="02020603050405020304" pitchFamily="18" charset="0"/>
-                <a:ea typeface="Calibri" panose="020F0502020204030204" pitchFamily="34" charset="0"/>
-                <a:cs typeface="Times New Roman" panose="02020603050405020304" pitchFamily="18" charset="0"/>
-              </a:rPr>
-              <a:t>.</a:t>
-            </a:r>
-            <a:endParaRPr lang="fr-FR" sz="1800" dirty="0">
-              <a:effectLst/>
-              <a:latin typeface="Calibri" panose="020F0502020204030204" pitchFamily="34" charset="0"/>
-              <a:ea typeface="Calibri" panose="020F0502020204030204" pitchFamily="34" charset="0"/>
-              <a:cs typeface="Times New Roman" panose="02020603050405020304" pitchFamily="18" charset="0"/>
-            </a:endParaRPr>
-          </a:p>
-          <a:p>
-            <a:pPr marL="342900" lvl="0" indent="-342900">
-              <a:lnSpc>
-                <a:spcPct val="107000"/>
-              </a:lnSpc>
-              <a:buFont typeface="+mj-lt"/>
-              <a:buAutoNum type="arabicPeriod"/>
-            </a:pPr>
-            <a:r>
-              <a:rPr lang="fr-FR" sz="1800" dirty="0" err="1">
-                <a:effectLst/>
-                <a:latin typeface="Times New Roman" panose="02020603050405020304" pitchFamily="18" charset="0"/>
-                <a:ea typeface="Calibri" panose="020F0502020204030204" pitchFamily="34" charset="0"/>
-                <a:cs typeface="Times New Roman" panose="02020603050405020304" pitchFamily="18" charset="0"/>
-              </a:rPr>
-              <a:t>Needleman</a:t>
-            </a:r>
-            <a:r>
-              <a:rPr lang="fr-FR" sz="1800" dirty="0">
-                <a:effectLst/>
-                <a:latin typeface="Times New Roman" panose="02020603050405020304" pitchFamily="18" charset="0"/>
-                <a:ea typeface="Calibri" panose="020F0502020204030204" pitchFamily="34" charset="0"/>
-                <a:cs typeface="Times New Roman" panose="02020603050405020304" pitchFamily="18" charset="0"/>
-              </a:rPr>
-              <a:t>, Saul B. &amp; </a:t>
-            </a:r>
-            <a:r>
-              <a:rPr lang="fr-FR" sz="1800" dirty="0" err="1">
-                <a:effectLst/>
-                <a:latin typeface="Times New Roman" panose="02020603050405020304" pitchFamily="18" charset="0"/>
-                <a:ea typeface="Calibri" panose="020F0502020204030204" pitchFamily="34" charset="0"/>
-                <a:cs typeface="Times New Roman" panose="02020603050405020304" pitchFamily="18" charset="0"/>
-              </a:rPr>
-              <a:t>Wunsch</a:t>
-            </a:r>
-            <a:r>
-              <a:rPr lang="fr-FR" sz="1800" dirty="0">
-                <a:effectLst/>
-                <a:latin typeface="Times New Roman" panose="02020603050405020304" pitchFamily="18" charset="0"/>
-                <a:ea typeface="Calibri" panose="020F0502020204030204" pitchFamily="34" charset="0"/>
-                <a:cs typeface="Times New Roman" panose="02020603050405020304" pitchFamily="18" charset="0"/>
-              </a:rPr>
-              <a:t>, Christian D. (1970) A </a:t>
-            </a:r>
-            <a:r>
-              <a:rPr lang="fr-FR" sz="1800" dirty="0" err="1">
-                <a:effectLst/>
-                <a:latin typeface="Times New Roman" panose="02020603050405020304" pitchFamily="18" charset="0"/>
-                <a:ea typeface="Calibri" panose="020F0502020204030204" pitchFamily="34" charset="0"/>
-                <a:cs typeface="Times New Roman" panose="02020603050405020304" pitchFamily="18" charset="0"/>
-              </a:rPr>
-              <a:t>general</a:t>
-            </a:r>
-            <a:r>
-              <a:rPr lang="fr-FR" sz="1800" dirty="0">
-                <a:effectLst/>
-                <a:latin typeface="Times New Roman" panose="02020603050405020304" pitchFamily="18" charset="0"/>
-                <a:ea typeface="Calibri" panose="020F0502020204030204" pitchFamily="34" charset="0"/>
-                <a:cs typeface="Times New Roman" panose="02020603050405020304" pitchFamily="18" charset="0"/>
-              </a:rPr>
-              <a:t> </a:t>
-            </a:r>
-            <a:r>
-              <a:rPr lang="fr-FR" sz="1800" dirty="0" err="1">
-                <a:effectLst/>
-                <a:latin typeface="Times New Roman" panose="02020603050405020304" pitchFamily="18" charset="0"/>
-                <a:ea typeface="Calibri" panose="020F0502020204030204" pitchFamily="34" charset="0"/>
-                <a:cs typeface="Times New Roman" panose="02020603050405020304" pitchFamily="18" charset="0"/>
-              </a:rPr>
-              <a:t>method</a:t>
-            </a:r>
-            <a:r>
-              <a:rPr lang="fr-FR" sz="1800" dirty="0">
-                <a:effectLst/>
-                <a:latin typeface="Times New Roman" panose="02020603050405020304" pitchFamily="18" charset="0"/>
-                <a:ea typeface="Calibri" panose="020F0502020204030204" pitchFamily="34" charset="0"/>
-                <a:cs typeface="Times New Roman" panose="02020603050405020304" pitchFamily="18" charset="0"/>
-              </a:rPr>
-              <a:t> applicable to the </a:t>
-            </a:r>
-            <a:r>
-              <a:rPr lang="fr-FR" sz="1800" dirty="0" err="1">
-                <a:effectLst/>
-                <a:latin typeface="Times New Roman" panose="02020603050405020304" pitchFamily="18" charset="0"/>
-                <a:ea typeface="Calibri" panose="020F0502020204030204" pitchFamily="34" charset="0"/>
-                <a:cs typeface="Times New Roman" panose="02020603050405020304" pitchFamily="18" charset="0"/>
-              </a:rPr>
-              <a:t>search</a:t>
-            </a:r>
-            <a:r>
-              <a:rPr lang="fr-FR" sz="1800" dirty="0">
-                <a:effectLst/>
-                <a:latin typeface="Times New Roman" panose="02020603050405020304" pitchFamily="18" charset="0"/>
-                <a:ea typeface="Calibri" panose="020F0502020204030204" pitchFamily="34" charset="0"/>
-                <a:cs typeface="Times New Roman" panose="02020603050405020304" pitchFamily="18" charset="0"/>
-              </a:rPr>
-              <a:t> for </a:t>
-            </a:r>
-            <a:r>
-              <a:rPr lang="fr-FR" sz="1800" dirty="0" err="1">
-                <a:effectLst/>
-                <a:latin typeface="Times New Roman" panose="02020603050405020304" pitchFamily="18" charset="0"/>
-                <a:ea typeface="Calibri" panose="020F0502020204030204" pitchFamily="34" charset="0"/>
-                <a:cs typeface="Times New Roman" panose="02020603050405020304" pitchFamily="18" charset="0"/>
-              </a:rPr>
-              <a:t>similarities</a:t>
-            </a:r>
-            <a:r>
-              <a:rPr lang="fr-FR" sz="1800" dirty="0">
-                <a:effectLst/>
-                <a:latin typeface="Times New Roman" panose="02020603050405020304" pitchFamily="18" charset="0"/>
-                <a:ea typeface="Calibri" panose="020F0502020204030204" pitchFamily="34" charset="0"/>
-                <a:cs typeface="Times New Roman" panose="02020603050405020304" pitchFamily="18" charset="0"/>
-              </a:rPr>
-              <a:t> in the </a:t>
-            </a:r>
-            <a:r>
-              <a:rPr lang="fr-FR" sz="1800" dirty="0" err="1">
-                <a:effectLst/>
-                <a:latin typeface="Times New Roman" panose="02020603050405020304" pitchFamily="18" charset="0"/>
-                <a:ea typeface="Calibri" panose="020F0502020204030204" pitchFamily="34" charset="0"/>
-                <a:cs typeface="Times New Roman" panose="02020603050405020304" pitchFamily="18" charset="0"/>
-              </a:rPr>
-              <a:t>amino</a:t>
-            </a:r>
-            <a:r>
-              <a:rPr lang="fr-FR" sz="1800" dirty="0">
-                <a:effectLst/>
-                <a:latin typeface="Times New Roman" panose="02020603050405020304" pitchFamily="18" charset="0"/>
-                <a:ea typeface="Calibri" panose="020F0502020204030204" pitchFamily="34" charset="0"/>
-                <a:cs typeface="Times New Roman" panose="02020603050405020304" pitchFamily="18" charset="0"/>
-              </a:rPr>
-              <a:t> </a:t>
-            </a:r>
-            <a:r>
-              <a:rPr lang="fr-FR" sz="1800" dirty="0" err="1">
-                <a:effectLst/>
-                <a:latin typeface="Times New Roman" panose="02020603050405020304" pitchFamily="18" charset="0"/>
-                <a:ea typeface="Calibri" panose="020F0502020204030204" pitchFamily="34" charset="0"/>
-                <a:cs typeface="Times New Roman" panose="02020603050405020304" pitchFamily="18" charset="0"/>
-              </a:rPr>
-              <a:t>acid</a:t>
-            </a:r>
-            <a:r>
-              <a:rPr lang="fr-FR" sz="1800" dirty="0">
-                <a:effectLst/>
-                <a:latin typeface="Times New Roman" panose="02020603050405020304" pitchFamily="18" charset="0"/>
-                <a:ea typeface="Calibri" panose="020F0502020204030204" pitchFamily="34" charset="0"/>
-                <a:cs typeface="Times New Roman" panose="02020603050405020304" pitchFamily="18" charset="0"/>
-              </a:rPr>
-              <a:t> </a:t>
-            </a:r>
-            <a:r>
-              <a:rPr lang="fr-FR" sz="1800" dirty="0" err="1">
-                <a:effectLst/>
-                <a:latin typeface="Times New Roman" panose="02020603050405020304" pitchFamily="18" charset="0"/>
-                <a:ea typeface="Calibri" panose="020F0502020204030204" pitchFamily="34" charset="0"/>
-                <a:cs typeface="Times New Roman" panose="02020603050405020304" pitchFamily="18" charset="0"/>
-              </a:rPr>
-              <a:t>sequence</a:t>
-            </a:r>
-            <a:r>
-              <a:rPr lang="fr-FR" sz="1800" dirty="0">
-                <a:effectLst/>
-                <a:latin typeface="Times New Roman" panose="02020603050405020304" pitchFamily="18" charset="0"/>
-                <a:ea typeface="Calibri" panose="020F0502020204030204" pitchFamily="34" charset="0"/>
-                <a:cs typeface="Times New Roman" panose="02020603050405020304" pitchFamily="18" charset="0"/>
-              </a:rPr>
-              <a:t> of </a:t>
-            </a:r>
-            <a:r>
-              <a:rPr lang="fr-FR" sz="1800" dirty="0" err="1">
-                <a:effectLst/>
-                <a:latin typeface="Times New Roman" panose="02020603050405020304" pitchFamily="18" charset="0"/>
-                <a:ea typeface="Calibri" panose="020F0502020204030204" pitchFamily="34" charset="0"/>
-                <a:cs typeface="Times New Roman" panose="02020603050405020304" pitchFamily="18" charset="0"/>
-              </a:rPr>
-              <a:t>two</a:t>
-            </a:r>
-            <a:r>
-              <a:rPr lang="fr-FR" sz="1800" dirty="0">
-                <a:effectLst/>
-                <a:latin typeface="Times New Roman" panose="02020603050405020304" pitchFamily="18" charset="0"/>
-                <a:ea typeface="Calibri" panose="020F0502020204030204" pitchFamily="34" charset="0"/>
-                <a:cs typeface="Times New Roman" panose="02020603050405020304" pitchFamily="18" charset="0"/>
-              </a:rPr>
-              <a:t> </a:t>
-            </a:r>
-            <a:r>
-              <a:rPr lang="fr-FR" sz="1800" dirty="0" err="1">
-                <a:effectLst/>
-                <a:latin typeface="Times New Roman" panose="02020603050405020304" pitchFamily="18" charset="0"/>
-                <a:ea typeface="Calibri" panose="020F0502020204030204" pitchFamily="34" charset="0"/>
-                <a:cs typeface="Times New Roman" panose="02020603050405020304" pitchFamily="18" charset="0"/>
-              </a:rPr>
-              <a:t>proteins</a:t>
-            </a:r>
-            <a:r>
-              <a:rPr lang="fr-FR" sz="1800" dirty="0">
-                <a:effectLst/>
-                <a:latin typeface="Times New Roman" panose="02020603050405020304" pitchFamily="18" charset="0"/>
-                <a:ea typeface="Calibri" panose="020F0502020204030204" pitchFamily="34" charset="0"/>
-                <a:cs typeface="Times New Roman" panose="02020603050405020304" pitchFamily="18" charset="0"/>
-              </a:rPr>
-              <a:t>.</a:t>
-            </a:r>
-            <a:endParaRPr lang="fr-FR" sz="1800" dirty="0">
-              <a:effectLst/>
-              <a:latin typeface="Calibri" panose="020F0502020204030204" pitchFamily="34" charset="0"/>
-              <a:ea typeface="Calibri" panose="020F0502020204030204" pitchFamily="34" charset="0"/>
-              <a:cs typeface="Times New Roman" panose="02020603050405020304" pitchFamily="18" charset="0"/>
-            </a:endParaRPr>
-          </a:p>
-          <a:p>
-            <a:pPr marL="342900" lvl="0" indent="-342900">
-              <a:lnSpc>
-                <a:spcPct val="107000"/>
-              </a:lnSpc>
-              <a:buFont typeface="+mj-lt"/>
-              <a:buAutoNum type="arabicPeriod"/>
-            </a:pPr>
-            <a:r>
-              <a:rPr lang="fr-FR" sz="1800" dirty="0">
-                <a:effectLst/>
-                <a:latin typeface="Times New Roman" panose="02020603050405020304" pitchFamily="18" charset="0"/>
-                <a:ea typeface="Calibri" panose="020F0502020204030204" pitchFamily="34" charset="0"/>
-                <a:cs typeface="Times New Roman" panose="02020603050405020304" pitchFamily="18" charset="0"/>
-              </a:rPr>
-              <a:t>Smith, Temple F. &amp; Waterman, Michael S. (1981) Identification of Common </a:t>
-            </a:r>
-            <a:r>
-              <a:rPr lang="fr-FR" sz="1800" dirty="0" err="1">
-                <a:effectLst/>
-                <a:latin typeface="Times New Roman" panose="02020603050405020304" pitchFamily="18" charset="0"/>
-                <a:ea typeface="Calibri" panose="020F0502020204030204" pitchFamily="34" charset="0"/>
-                <a:cs typeface="Times New Roman" panose="02020603050405020304" pitchFamily="18" charset="0"/>
-              </a:rPr>
-              <a:t>Molecular</a:t>
-            </a:r>
-            <a:r>
-              <a:rPr lang="fr-FR" sz="1800" dirty="0">
-                <a:effectLst/>
-                <a:latin typeface="Times New Roman" panose="02020603050405020304" pitchFamily="18" charset="0"/>
-                <a:ea typeface="Calibri" panose="020F0502020204030204" pitchFamily="34" charset="0"/>
-                <a:cs typeface="Times New Roman" panose="02020603050405020304" pitchFamily="18" charset="0"/>
-              </a:rPr>
-              <a:t> </a:t>
-            </a:r>
-            <a:r>
-              <a:rPr lang="fr-FR" sz="1800" dirty="0" err="1">
-                <a:effectLst/>
-                <a:latin typeface="Times New Roman" panose="02020603050405020304" pitchFamily="18" charset="0"/>
-                <a:ea typeface="Calibri" panose="020F0502020204030204" pitchFamily="34" charset="0"/>
-                <a:cs typeface="Times New Roman" panose="02020603050405020304" pitchFamily="18" charset="0"/>
-              </a:rPr>
-              <a:t>Subsequences</a:t>
-            </a:r>
-            <a:r>
-              <a:rPr lang="fr-FR" sz="1800" dirty="0">
-                <a:effectLst/>
-                <a:latin typeface="Times New Roman" panose="02020603050405020304" pitchFamily="18" charset="0"/>
-                <a:ea typeface="Calibri" panose="020F0502020204030204" pitchFamily="34" charset="0"/>
-                <a:cs typeface="Times New Roman" panose="02020603050405020304" pitchFamily="18" charset="0"/>
-              </a:rPr>
-              <a:t>.</a:t>
-            </a:r>
-            <a:endParaRPr lang="fr-FR" sz="1800" dirty="0">
-              <a:effectLst/>
-              <a:latin typeface="Calibri" panose="020F0502020204030204" pitchFamily="34" charset="0"/>
-              <a:ea typeface="Calibri" panose="020F0502020204030204" pitchFamily="34" charset="0"/>
-              <a:cs typeface="Times New Roman" panose="02020603050405020304" pitchFamily="18" charset="0"/>
-            </a:endParaRPr>
-          </a:p>
-          <a:p>
-            <a:pPr marL="342900" lvl="0" indent="-342900">
-              <a:lnSpc>
-                <a:spcPct val="107000"/>
-              </a:lnSpc>
-              <a:buFont typeface="+mj-lt"/>
-              <a:buAutoNum type="arabicPeriod"/>
-            </a:pPr>
-            <a:r>
-              <a:rPr lang="fr-FR" sz="1800" u="none" strike="noStrike" dirty="0">
-                <a:solidFill>
-                  <a:srgbClr val="0000FF"/>
-                </a:solidFill>
-                <a:effectLst/>
-                <a:latin typeface="Times New Roman" panose="02020603050405020304" pitchFamily="18" charset="0"/>
-                <a:ea typeface="Calibri" panose="020F0502020204030204" pitchFamily="34" charset="0"/>
-                <a:cs typeface="Times New Roman" panose="02020603050405020304" pitchFamily="18" charset="0"/>
-                <a:hlinkClick r:id="rId2"/>
-              </a:rPr>
-              <a:t>A </a:t>
-            </a:r>
-            <a:r>
-              <a:rPr lang="fr-FR" sz="1800" u="none" strike="noStrike" dirty="0" err="1">
-                <a:solidFill>
-                  <a:srgbClr val="0000FF"/>
-                </a:solidFill>
-                <a:effectLst/>
-                <a:latin typeface="Times New Roman" panose="02020603050405020304" pitchFamily="18" charset="0"/>
-                <a:ea typeface="Calibri" panose="020F0502020204030204" pitchFamily="34" charset="0"/>
-                <a:cs typeface="Times New Roman" panose="02020603050405020304" pitchFamily="18" charset="0"/>
-                <a:hlinkClick r:id="rId2"/>
-              </a:rPr>
-              <a:t>Elnaggar</a:t>
-            </a:r>
-            <a:r>
-              <a:rPr lang="fr-FR" sz="1800" dirty="0">
-                <a:effectLst/>
-                <a:latin typeface="Times New Roman" panose="02020603050405020304" pitchFamily="18" charset="0"/>
-                <a:ea typeface="Calibri" panose="020F0502020204030204" pitchFamily="34" charset="0"/>
-                <a:cs typeface="Times New Roman" panose="02020603050405020304" pitchFamily="18" charset="0"/>
-              </a:rPr>
-              <a:t> et al. (2020) </a:t>
-            </a:r>
-            <a:r>
-              <a:rPr lang="fr-FR" sz="1800" dirty="0" err="1">
-                <a:effectLst/>
-                <a:latin typeface="Times New Roman" panose="02020603050405020304" pitchFamily="18" charset="0"/>
-                <a:ea typeface="Calibri" panose="020F0502020204030204" pitchFamily="34" charset="0"/>
-                <a:cs typeface="Times New Roman" panose="02020603050405020304" pitchFamily="18" charset="0"/>
-              </a:rPr>
-              <a:t>ProtTrans</a:t>
-            </a:r>
-            <a:r>
-              <a:rPr lang="fr-FR" sz="1800" dirty="0">
-                <a:effectLst/>
-                <a:latin typeface="Times New Roman" panose="02020603050405020304" pitchFamily="18" charset="0"/>
-                <a:ea typeface="Calibri" panose="020F0502020204030204" pitchFamily="34" charset="0"/>
-                <a:cs typeface="Times New Roman" panose="02020603050405020304" pitchFamily="18" charset="0"/>
-              </a:rPr>
-              <a:t>: </a:t>
-            </a:r>
-            <a:r>
-              <a:rPr lang="fr-FR" sz="1800" dirty="0" err="1">
-                <a:effectLst/>
-                <a:latin typeface="Times New Roman" panose="02020603050405020304" pitchFamily="18" charset="0"/>
-                <a:ea typeface="Calibri" panose="020F0502020204030204" pitchFamily="34" charset="0"/>
-                <a:cs typeface="Times New Roman" panose="02020603050405020304" pitchFamily="18" charset="0"/>
-              </a:rPr>
-              <a:t>Towards</a:t>
-            </a:r>
-            <a:r>
-              <a:rPr lang="fr-FR" sz="1800" dirty="0">
-                <a:effectLst/>
-                <a:latin typeface="Times New Roman" panose="02020603050405020304" pitchFamily="18" charset="0"/>
-                <a:ea typeface="Calibri" panose="020F0502020204030204" pitchFamily="34" charset="0"/>
-                <a:cs typeface="Times New Roman" panose="02020603050405020304" pitchFamily="18" charset="0"/>
-              </a:rPr>
-              <a:t> Cracking the </a:t>
-            </a:r>
-            <a:r>
-              <a:rPr lang="fr-FR" sz="1800" dirty="0" err="1">
-                <a:effectLst/>
-                <a:latin typeface="Times New Roman" panose="02020603050405020304" pitchFamily="18" charset="0"/>
-                <a:ea typeface="Calibri" panose="020F0502020204030204" pitchFamily="34" charset="0"/>
-                <a:cs typeface="Times New Roman" panose="02020603050405020304" pitchFamily="18" charset="0"/>
-              </a:rPr>
-              <a:t>Language</a:t>
-            </a:r>
-            <a:r>
-              <a:rPr lang="fr-FR" sz="1800" dirty="0">
-                <a:effectLst/>
-                <a:latin typeface="Times New Roman" panose="02020603050405020304" pitchFamily="18" charset="0"/>
-                <a:ea typeface="Calibri" panose="020F0502020204030204" pitchFamily="34" charset="0"/>
-                <a:cs typeface="Times New Roman" panose="02020603050405020304" pitchFamily="18" charset="0"/>
-              </a:rPr>
-              <a:t> of </a:t>
-            </a:r>
-            <a:r>
-              <a:rPr lang="fr-FR" sz="1800" dirty="0" err="1">
-                <a:effectLst/>
-                <a:latin typeface="Times New Roman" panose="02020603050405020304" pitchFamily="18" charset="0"/>
-                <a:ea typeface="Calibri" panose="020F0502020204030204" pitchFamily="34" charset="0"/>
-                <a:cs typeface="Times New Roman" panose="02020603050405020304" pitchFamily="18" charset="0"/>
-              </a:rPr>
-              <a:t>Life's</a:t>
-            </a:r>
-            <a:r>
-              <a:rPr lang="fr-FR" sz="1800" dirty="0">
-                <a:effectLst/>
-                <a:latin typeface="Times New Roman" panose="02020603050405020304" pitchFamily="18" charset="0"/>
-                <a:ea typeface="Calibri" panose="020F0502020204030204" pitchFamily="34" charset="0"/>
-                <a:cs typeface="Times New Roman" panose="02020603050405020304" pitchFamily="18" charset="0"/>
-              </a:rPr>
-              <a:t> Code </a:t>
-            </a:r>
-            <a:r>
-              <a:rPr lang="fr-FR" sz="1800" dirty="0" err="1">
-                <a:effectLst/>
-                <a:latin typeface="Times New Roman" panose="02020603050405020304" pitchFamily="18" charset="0"/>
-                <a:ea typeface="Calibri" panose="020F0502020204030204" pitchFamily="34" charset="0"/>
-                <a:cs typeface="Times New Roman" panose="02020603050405020304" pitchFamily="18" charset="0"/>
-              </a:rPr>
-              <a:t>Through</a:t>
-            </a:r>
-            <a:r>
-              <a:rPr lang="fr-FR" sz="1800" dirty="0">
-                <a:effectLst/>
-                <a:latin typeface="Times New Roman" panose="02020603050405020304" pitchFamily="18" charset="0"/>
-                <a:ea typeface="Calibri" panose="020F0502020204030204" pitchFamily="34" charset="0"/>
-                <a:cs typeface="Times New Roman" panose="02020603050405020304" pitchFamily="18" charset="0"/>
-              </a:rPr>
-              <a:t> Self-</a:t>
-            </a:r>
-            <a:r>
-              <a:rPr lang="fr-FR" sz="1800" dirty="0" err="1">
-                <a:effectLst/>
-                <a:latin typeface="Times New Roman" panose="02020603050405020304" pitchFamily="18" charset="0"/>
-                <a:ea typeface="Calibri" panose="020F0502020204030204" pitchFamily="34" charset="0"/>
-                <a:cs typeface="Times New Roman" panose="02020603050405020304" pitchFamily="18" charset="0"/>
-              </a:rPr>
-              <a:t>Supervised</a:t>
-            </a:r>
-            <a:r>
-              <a:rPr lang="fr-FR" sz="1800" dirty="0">
-                <a:effectLst/>
-                <a:latin typeface="Times New Roman" panose="02020603050405020304" pitchFamily="18" charset="0"/>
-                <a:ea typeface="Calibri" panose="020F0502020204030204" pitchFamily="34" charset="0"/>
-                <a:cs typeface="Times New Roman" panose="02020603050405020304" pitchFamily="18" charset="0"/>
-              </a:rPr>
-              <a:t> </a:t>
-            </a:r>
-            <a:r>
-              <a:rPr lang="fr-FR" sz="1800" dirty="0" err="1">
-                <a:effectLst/>
-                <a:latin typeface="Times New Roman" panose="02020603050405020304" pitchFamily="18" charset="0"/>
-                <a:ea typeface="Calibri" panose="020F0502020204030204" pitchFamily="34" charset="0"/>
-                <a:cs typeface="Times New Roman" panose="02020603050405020304" pitchFamily="18" charset="0"/>
-              </a:rPr>
-              <a:t>Deep</a:t>
-            </a:r>
-            <a:r>
-              <a:rPr lang="fr-FR" sz="1800" dirty="0">
-                <a:effectLst/>
-                <a:latin typeface="Times New Roman" panose="02020603050405020304" pitchFamily="18" charset="0"/>
-                <a:ea typeface="Calibri" panose="020F0502020204030204" pitchFamily="34" charset="0"/>
-                <a:cs typeface="Times New Roman" panose="02020603050405020304" pitchFamily="18" charset="0"/>
-              </a:rPr>
-              <a:t> Learning and High Performance </a:t>
-            </a:r>
-            <a:r>
-              <a:rPr lang="fr-FR" sz="1800" dirty="0" err="1">
-                <a:effectLst/>
-                <a:latin typeface="Times New Roman" panose="02020603050405020304" pitchFamily="18" charset="0"/>
-                <a:ea typeface="Calibri" panose="020F0502020204030204" pitchFamily="34" charset="0"/>
-                <a:cs typeface="Times New Roman" panose="02020603050405020304" pitchFamily="18" charset="0"/>
-              </a:rPr>
-              <a:t>Computing</a:t>
-            </a:r>
-            <a:r>
-              <a:rPr lang="fr-FR" sz="1800" dirty="0">
-                <a:effectLst/>
-                <a:latin typeface="Times New Roman" panose="02020603050405020304" pitchFamily="18" charset="0"/>
-                <a:ea typeface="Calibri" panose="020F0502020204030204" pitchFamily="34" charset="0"/>
-                <a:cs typeface="Times New Roman" panose="02020603050405020304" pitchFamily="18" charset="0"/>
-              </a:rPr>
-              <a:t> </a:t>
-            </a:r>
-            <a:endParaRPr lang="fr-FR" sz="1800" dirty="0">
-              <a:effectLst/>
-              <a:latin typeface="Calibri" panose="020F0502020204030204" pitchFamily="34" charset="0"/>
-              <a:ea typeface="Calibri" panose="020F0502020204030204" pitchFamily="34" charset="0"/>
-              <a:cs typeface="Times New Roman" panose="02020603050405020304" pitchFamily="18" charset="0"/>
-            </a:endParaRPr>
-          </a:p>
-          <a:p>
-            <a:pPr marL="342900" lvl="0" indent="-342900">
-              <a:lnSpc>
-                <a:spcPct val="107000"/>
-              </a:lnSpc>
-              <a:buFont typeface="+mj-lt"/>
-              <a:buAutoNum type="arabicPeriod"/>
-            </a:pPr>
-            <a:r>
-              <a:rPr lang="fr-FR" sz="1800" dirty="0">
-                <a:effectLst/>
-                <a:latin typeface="Times New Roman" panose="02020603050405020304" pitchFamily="18" charset="0"/>
-                <a:ea typeface="Calibri" panose="020F0502020204030204" pitchFamily="34" charset="0"/>
-                <a:cs typeface="Times New Roman" panose="02020603050405020304" pitchFamily="18" charset="0"/>
-              </a:rPr>
-              <a:t>Page pdb de la 6-phosphofructo-2-kinase/fructose-2,6-bisphosphatase </a:t>
-            </a:r>
-            <a:r>
-              <a:rPr lang="fr-FR" sz="1800" dirty="0" err="1">
-                <a:effectLst/>
-                <a:latin typeface="Times New Roman" panose="02020603050405020304" pitchFamily="18" charset="0"/>
-                <a:ea typeface="Calibri" panose="020F0502020204030204" pitchFamily="34" charset="0"/>
-                <a:cs typeface="Times New Roman" panose="02020603050405020304" pitchFamily="18" charset="0"/>
-              </a:rPr>
-              <a:t>bifunctional</a:t>
-            </a:r>
-            <a:r>
-              <a:rPr lang="fr-FR" sz="1800" dirty="0">
-                <a:effectLst/>
-                <a:latin typeface="Times New Roman" panose="02020603050405020304" pitchFamily="18" charset="0"/>
-                <a:ea typeface="Calibri" panose="020F0502020204030204" pitchFamily="34" charset="0"/>
-                <a:cs typeface="Times New Roman" panose="02020603050405020304" pitchFamily="18" charset="0"/>
-              </a:rPr>
-              <a:t> enzyme </a:t>
-            </a:r>
-            <a:r>
-              <a:rPr lang="fr-FR" sz="1800" dirty="0" err="1">
-                <a:effectLst/>
-                <a:latin typeface="Times New Roman" panose="02020603050405020304" pitchFamily="18" charset="0"/>
-                <a:ea typeface="Calibri" panose="020F0502020204030204" pitchFamily="34" charset="0"/>
-                <a:cs typeface="Times New Roman" panose="02020603050405020304" pitchFamily="18" charset="0"/>
-              </a:rPr>
-              <a:t>complexed</a:t>
-            </a:r>
-            <a:r>
-              <a:rPr lang="fr-FR" sz="1800" dirty="0">
-                <a:effectLst/>
-                <a:latin typeface="Times New Roman" panose="02020603050405020304" pitchFamily="18" charset="0"/>
-                <a:ea typeface="Calibri" panose="020F0502020204030204" pitchFamily="34" charset="0"/>
-                <a:cs typeface="Times New Roman" panose="02020603050405020304" pitchFamily="18" charset="0"/>
-              </a:rPr>
-              <a:t> </a:t>
-            </a:r>
-            <a:r>
-              <a:rPr lang="fr-FR" sz="1800" dirty="0" err="1">
-                <a:effectLst/>
-                <a:latin typeface="Times New Roman" panose="02020603050405020304" pitchFamily="18" charset="0"/>
-                <a:ea typeface="Calibri" panose="020F0502020204030204" pitchFamily="34" charset="0"/>
-                <a:cs typeface="Times New Roman" panose="02020603050405020304" pitchFamily="18" charset="0"/>
-              </a:rPr>
-              <a:t>with</a:t>
-            </a:r>
-            <a:r>
-              <a:rPr lang="fr-FR" sz="1800" dirty="0">
-                <a:effectLst/>
-                <a:latin typeface="Times New Roman" panose="02020603050405020304" pitchFamily="18" charset="0"/>
-                <a:ea typeface="Calibri" panose="020F0502020204030204" pitchFamily="34" charset="0"/>
-                <a:cs typeface="Times New Roman" panose="02020603050405020304" pitchFamily="18" charset="0"/>
-              </a:rPr>
-              <a:t> atp-g-s and phosphate : </a:t>
-            </a:r>
-            <a:r>
-              <a:rPr lang="fr-FR" sz="1800" u="sng" dirty="0">
-                <a:solidFill>
-                  <a:srgbClr val="0000FF"/>
-                </a:solidFill>
-                <a:effectLst/>
-                <a:latin typeface="Times New Roman" panose="02020603050405020304" pitchFamily="18" charset="0"/>
-                <a:ea typeface="Calibri" panose="020F0502020204030204" pitchFamily="34" charset="0"/>
-                <a:cs typeface="Times New Roman" panose="02020603050405020304" pitchFamily="18" charset="0"/>
-                <a:hlinkClick r:id="rId3"/>
-              </a:rPr>
-              <a:t>https://www.rcsb.org/structure/1bif</a:t>
-            </a:r>
-            <a:r>
-              <a:rPr lang="fr-FR" sz="1800" dirty="0">
-                <a:effectLst/>
-                <a:latin typeface="Times New Roman" panose="02020603050405020304" pitchFamily="18" charset="0"/>
-                <a:ea typeface="Calibri" panose="020F0502020204030204" pitchFamily="34" charset="0"/>
-                <a:cs typeface="Times New Roman" panose="02020603050405020304" pitchFamily="18" charset="0"/>
-              </a:rPr>
-              <a:t> </a:t>
-            </a:r>
-            <a:endParaRPr lang="fr-FR" sz="1800" dirty="0">
-              <a:effectLst/>
-              <a:latin typeface="Calibri" panose="020F0502020204030204" pitchFamily="34" charset="0"/>
-              <a:ea typeface="Calibri" panose="020F0502020204030204" pitchFamily="34" charset="0"/>
-              <a:cs typeface="Times New Roman" panose="02020603050405020304" pitchFamily="18" charset="0"/>
-            </a:endParaRPr>
-          </a:p>
-          <a:p>
-            <a:pPr marL="342900" lvl="0" indent="-342900">
-              <a:lnSpc>
-                <a:spcPct val="107000"/>
-              </a:lnSpc>
-              <a:buFont typeface="+mj-lt"/>
-              <a:buAutoNum type="arabicPeriod"/>
-            </a:pPr>
-            <a:r>
-              <a:rPr lang="fr-FR" sz="1800" dirty="0">
-                <a:effectLst/>
-                <a:latin typeface="Times New Roman" panose="02020603050405020304" pitchFamily="18" charset="0"/>
-                <a:ea typeface="Calibri" panose="020F0502020204030204" pitchFamily="34" charset="0"/>
-                <a:cs typeface="Times New Roman" panose="02020603050405020304" pitchFamily="18" charset="0"/>
-              </a:rPr>
-              <a:t>Page pdb de la hyperthermophile </a:t>
-            </a:r>
-            <a:r>
-              <a:rPr lang="fr-FR" sz="1800" dirty="0" err="1">
-                <a:effectLst/>
-                <a:latin typeface="Times New Roman" panose="02020603050405020304" pitchFamily="18" charset="0"/>
-                <a:ea typeface="Calibri" panose="020F0502020204030204" pitchFamily="34" charset="0"/>
-                <a:cs typeface="Times New Roman" panose="02020603050405020304" pitchFamily="18" charset="0"/>
-              </a:rPr>
-              <a:t>chromosomal</a:t>
-            </a:r>
-            <a:r>
-              <a:rPr lang="fr-FR" sz="1800" dirty="0">
-                <a:effectLst/>
-                <a:latin typeface="Times New Roman" panose="02020603050405020304" pitchFamily="18" charset="0"/>
-                <a:ea typeface="Calibri" panose="020F0502020204030204" pitchFamily="34" charset="0"/>
-                <a:cs typeface="Times New Roman" panose="02020603050405020304" pitchFamily="18" charset="0"/>
-              </a:rPr>
-              <a:t> </a:t>
-            </a:r>
-            <a:r>
-              <a:rPr lang="fr-FR" sz="1800" dirty="0" err="1">
-                <a:effectLst/>
-                <a:latin typeface="Times New Roman" panose="02020603050405020304" pitchFamily="18" charset="0"/>
-                <a:ea typeface="Calibri" panose="020F0502020204030204" pitchFamily="34" charset="0"/>
-                <a:cs typeface="Times New Roman" panose="02020603050405020304" pitchFamily="18" charset="0"/>
-              </a:rPr>
-              <a:t>protein</a:t>
-            </a:r>
-            <a:r>
-              <a:rPr lang="fr-FR" sz="1800" dirty="0">
-                <a:effectLst/>
-                <a:latin typeface="Times New Roman" panose="02020603050405020304" pitchFamily="18" charset="0"/>
-                <a:ea typeface="Calibri" panose="020F0502020204030204" pitchFamily="34" charset="0"/>
-                <a:cs typeface="Times New Roman" panose="02020603050405020304" pitchFamily="18" charset="0"/>
-              </a:rPr>
-              <a:t> sac7d </a:t>
-            </a:r>
-            <a:r>
-              <a:rPr lang="fr-FR" sz="1800" dirty="0" err="1">
-                <a:effectLst/>
-                <a:latin typeface="Times New Roman" panose="02020603050405020304" pitchFamily="18" charset="0"/>
-                <a:ea typeface="Calibri" panose="020F0502020204030204" pitchFamily="34" charset="0"/>
-                <a:cs typeface="Times New Roman" panose="02020603050405020304" pitchFamily="18" charset="0"/>
-              </a:rPr>
-              <a:t>bound</a:t>
-            </a:r>
-            <a:r>
-              <a:rPr lang="fr-FR" sz="1800" dirty="0">
-                <a:effectLst/>
-                <a:latin typeface="Times New Roman" panose="02020603050405020304" pitchFamily="18" charset="0"/>
-                <a:ea typeface="Calibri" panose="020F0502020204030204" pitchFamily="34" charset="0"/>
-                <a:cs typeface="Times New Roman" panose="02020603050405020304" pitchFamily="18" charset="0"/>
-              </a:rPr>
-              <a:t> </a:t>
-            </a:r>
-            <a:r>
-              <a:rPr lang="fr-FR" sz="1800" dirty="0" err="1">
-                <a:effectLst/>
-                <a:latin typeface="Times New Roman" panose="02020603050405020304" pitchFamily="18" charset="0"/>
-                <a:ea typeface="Calibri" panose="020F0502020204030204" pitchFamily="34" charset="0"/>
-                <a:cs typeface="Times New Roman" panose="02020603050405020304" pitchFamily="18" charset="0"/>
-              </a:rPr>
-              <a:t>with</a:t>
-            </a:r>
-            <a:r>
-              <a:rPr lang="fr-FR" sz="1800" dirty="0">
-                <a:effectLst/>
-                <a:latin typeface="Times New Roman" panose="02020603050405020304" pitchFamily="18" charset="0"/>
-                <a:ea typeface="Calibri" panose="020F0502020204030204" pitchFamily="34" charset="0"/>
-                <a:cs typeface="Times New Roman" panose="02020603050405020304" pitchFamily="18" charset="0"/>
-              </a:rPr>
-              <a:t> </a:t>
-            </a:r>
-            <a:r>
-              <a:rPr lang="fr-FR" sz="1800" dirty="0" err="1">
-                <a:effectLst/>
-                <a:latin typeface="Times New Roman" panose="02020603050405020304" pitchFamily="18" charset="0"/>
-                <a:ea typeface="Calibri" panose="020F0502020204030204" pitchFamily="34" charset="0"/>
-                <a:cs typeface="Times New Roman" panose="02020603050405020304" pitchFamily="18" charset="0"/>
-              </a:rPr>
-              <a:t>kinked</a:t>
-            </a:r>
-            <a:r>
-              <a:rPr lang="fr-FR" sz="1800" dirty="0">
-                <a:effectLst/>
-                <a:latin typeface="Times New Roman" panose="02020603050405020304" pitchFamily="18" charset="0"/>
-                <a:ea typeface="Calibri" panose="020F0502020204030204" pitchFamily="34" charset="0"/>
-                <a:cs typeface="Times New Roman" panose="02020603050405020304" pitchFamily="18" charset="0"/>
-              </a:rPr>
-              <a:t> </a:t>
-            </a:r>
-            <a:r>
-              <a:rPr lang="fr-FR" sz="1800" dirty="0" err="1">
-                <a:effectLst/>
-                <a:latin typeface="Times New Roman" panose="02020603050405020304" pitchFamily="18" charset="0"/>
-                <a:ea typeface="Calibri" panose="020F0502020204030204" pitchFamily="34" charset="0"/>
-                <a:cs typeface="Times New Roman" panose="02020603050405020304" pitchFamily="18" charset="0"/>
-              </a:rPr>
-              <a:t>dna</a:t>
-            </a:r>
-            <a:r>
-              <a:rPr lang="fr-FR" sz="1800" dirty="0">
-                <a:effectLst/>
-                <a:latin typeface="Times New Roman" panose="02020603050405020304" pitchFamily="18" charset="0"/>
-                <a:ea typeface="Calibri" panose="020F0502020204030204" pitchFamily="34" charset="0"/>
-                <a:cs typeface="Times New Roman" panose="02020603050405020304" pitchFamily="18" charset="0"/>
-              </a:rPr>
-              <a:t> duplex : </a:t>
-            </a:r>
-            <a:r>
-              <a:rPr lang="fr-FR" sz="1800" u="sng" dirty="0">
-                <a:solidFill>
-                  <a:srgbClr val="0000FF"/>
-                </a:solidFill>
-                <a:effectLst/>
-                <a:latin typeface="Times New Roman" panose="02020603050405020304" pitchFamily="18" charset="0"/>
-                <a:ea typeface="Calibri" panose="020F0502020204030204" pitchFamily="34" charset="0"/>
-                <a:cs typeface="Times New Roman" panose="02020603050405020304" pitchFamily="18" charset="0"/>
-                <a:hlinkClick r:id="rId4"/>
-              </a:rPr>
-              <a:t>https://www.rcsb.org/structure/1azp</a:t>
-            </a:r>
-            <a:r>
-              <a:rPr lang="fr-FR" sz="1800" dirty="0">
-                <a:effectLst/>
-                <a:latin typeface="Times New Roman" panose="02020603050405020304" pitchFamily="18" charset="0"/>
-                <a:ea typeface="Calibri" panose="020F0502020204030204" pitchFamily="34" charset="0"/>
-                <a:cs typeface="Times New Roman" panose="02020603050405020304" pitchFamily="18" charset="0"/>
-              </a:rPr>
-              <a:t> </a:t>
-            </a:r>
-            <a:endParaRPr lang="fr-FR" sz="1800" dirty="0">
-              <a:effectLst/>
-              <a:latin typeface="Calibri" panose="020F0502020204030204" pitchFamily="34" charset="0"/>
-              <a:ea typeface="Calibri" panose="020F0502020204030204" pitchFamily="34" charset="0"/>
-              <a:cs typeface="Times New Roman" panose="02020603050405020304" pitchFamily="18" charset="0"/>
-            </a:endParaRPr>
-          </a:p>
-          <a:p>
-            <a:pPr marL="342900" lvl="0" indent="-342900">
-              <a:lnSpc>
-                <a:spcPct val="107000"/>
-              </a:lnSpc>
-              <a:spcAft>
-                <a:spcPts val="800"/>
-              </a:spcAft>
-              <a:buFont typeface="+mj-lt"/>
-              <a:buAutoNum type="arabicPeriod"/>
-            </a:pPr>
-            <a:r>
-              <a:rPr lang="fr-FR" sz="1800" dirty="0">
-                <a:effectLst/>
-                <a:latin typeface="Times New Roman" panose="02020603050405020304" pitchFamily="18" charset="0"/>
-                <a:ea typeface="Calibri" panose="020F0502020204030204" pitchFamily="34" charset="0"/>
-                <a:cs typeface="Times New Roman" panose="02020603050405020304" pitchFamily="18" charset="0"/>
-              </a:rPr>
-              <a:t>Page pdb de 2AK3 : </a:t>
-            </a:r>
-            <a:r>
-              <a:rPr lang="fr-FR" sz="1800" u="sng" dirty="0">
-                <a:solidFill>
-                  <a:srgbClr val="0000FF"/>
-                </a:solidFill>
-                <a:effectLst/>
-                <a:latin typeface="Times New Roman" panose="02020603050405020304" pitchFamily="18" charset="0"/>
-                <a:ea typeface="Calibri" panose="020F0502020204030204" pitchFamily="34" charset="0"/>
-                <a:cs typeface="Times New Roman" panose="02020603050405020304" pitchFamily="18" charset="0"/>
-                <a:hlinkClick r:id="rId5"/>
-              </a:rPr>
-              <a:t>https://www.rcsb.org/structure/2ak3</a:t>
-            </a:r>
-            <a:r>
-              <a:rPr lang="fr-FR" sz="1800" dirty="0">
-                <a:effectLst/>
-                <a:latin typeface="Times New Roman" panose="02020603050405020304" pitchFamily="18" charset="0"/>
-                <a:ea typeface="Calibri" panose="020F0502020204030204" pitchFamily="34" charset="0"/>
-                <a:cs typeface="Times New Roman" panose="02020603050405020304" pitchFamily="18" charset="0"/>
-              </a:rPr>
-              <a:t> </a:t>
-            </a:r>
-            <a:endParaRPr lang="fr-FR" sz="1800" dirty="0">
-              <a:effectLst/>
-              <a:latin typeface="Calibri" panose="020F0502020204030204" pitchFamily="34" charset="0"/>
-              <a:ea typeface="Calibri" panose="020F0502020204030204" pitchFamily="34" charset="0"/>
-              <a:cs typeface="Times New Roman" panose="02020603050405020304" pitchFamily="18" charset="0"/>
-            </a:endParaRPr>
-          </a:p>
-        </p:txBody>
-      </p:sp>
-      <p:sp>
-        <p:nvSpPr>
-          <p:cNvPr id="6" name="Espace réservé du numéro de diapositive 5">
-            <a:extLst>
-              <a:ext uri="{FF2B5EF4-FFF2-40B4-BE49-F238E27FC236}">
-                <a16:creationId xmlns:a16="http://schemas.microsoft.com/office/drawing/2014/main" id="{EDD49CB1-F959-4004-3097-04AE4D0121BD}"/>
-              </a:ext>
-            </a:extLst>
-          </p:cNvPr>
-          <p:cNvSpPr>
-            <a:spLocks noGrp="1"/>
-          </p:cNvSpPr>
-          <p:nvPr>
-            <p:ph type="sldNum" sz="quarter" idx="12"/>
-          </p:nvPr>
-        </p:nvSpPr>
-        <p:spPr>
-          <a:xfrm>
-            <a:off x="8610600" y="6489520"/>
-            <a:ext cx="2743200" cy="365125"/>
-          </a:xfrm>
-        </p:spPr>
-        <p:txBody>
-          <a:bodyPr/>
-          <a:lstStyle/>
-          <a:p>
-            <a:fld id="{DB0B8EAA-8CF6-49F4-8FA8-2BD42B7C9F8B}" type="slidenum">
-              <a:rPr lang="fr-FR" smtClean="0"/>
-              <a:t>25</a:t>
-            </a:fld>
-            <a:endParaRPr lang="fr-FR"/>
-          </a:p>
-        </p:txBody>
-      </p:sp>
-      <p:pic>
-        <p:nvPicPr>
-          <p:cNvPr id="1026" name="Picture 2" descr="Appellation, logo et charte graphique : tout ce qu'il faut savoir | Université  Paris Cité">
-            <a:extLst>
-              <a:ext uri="{FF2B5EF4-FFF2-40B4-BE49-F238E27FC236}">
-                <a16:creationId xmlns:a16="http://schemas.microsoft.com/office/drawing/2014/main" id="{42388675-4549-B077-D592-84080955D58F}"/>
-              </a:ext>
-            </a:extLst>
-          </p:cNvPr>
-          <p:cNvPicPr>
-            <a:picLocks noChangeAspect="1" noChangeArrowheads="1"/>
-          </p:cNvPicPr>
-          <p:nvPr/>
-        </p:nvPicPr>
-        <p:blipFill>
-          <a:blip r:embed="rId6">
-            <a:extLst>
-              <a:ext uri="{28A0092B-C50C-407E-A947-70E740481C1C}">
-                <a14:useLocalDpi xmlns:a14="http://schemas.microsoft.com/office/drawing/2010/main" val="0"/>
-              </a:ext>
-            </a:extLst>
-          </a:blip>
-          <a:srcRect/>
-          <a:stretch>
-            <a:fillRect/>
-          </a:stretch>
-        </p:blipFill>
-        <p:spPr bwMode="auto">
-          <a:xfrm>
-            <a:off x="11363415" y="121082"/>
-            <a:ext cx="692461" cy="688543"/>
-          </a:xfrm>
-          <a:prstGeom prst="rect">
-            <a:avLst/>
-          </a:prstGeom>
-          <a:noFill/>
-          <a:extLst>
-            <a:ext uri="{909E8E84-426E-40DD-AFC4-6F175D3DCCD1}">
-              <a14:hiddenFill xmlns:a14="http://schemas.microsoft.com/office/drawing/2010/main">
-                <a:solidFill>
-                  <a:srgbClr val="FFFFFF"/>
-                </a:solidFill>
-              </a14:hiddenFill>
-            </a:ext>
-          </a:extLst>
-        </p:spPr>
-      </p:pic>
-      <p:cxnSp>
-        <p:nvCxnSpPr>
-          <p:cNvPr id="8" name="Connecteur droit 7">
-            <a:extLst>
-              <a:ext uri="{FF2B5EF4-FFF2-40B4-BE49-F238E27FC236}">
-                <a16:creationId xmlns:a16="http://schemas.microsoft.com/office/drawing/2014/main" id="{58EF74DE-8092-1233-D850-99E4719D068A}"/>
-              </a:ext>
-            </a:extLst>
-          </p:cNvPr>
-          <p:cNvCxnSpPr/>
-          <p:nvPr/>
-        </p:nvCxnSpPr>
-        <p:spPr>
-          <a:xfrm>
-            <a:off x="145740" y="853585"/>
-            <a:ext cx="11910136" cy="0"/>
-          </a:xfrm>
-          <a:prstGeom prst="line">
-            <a:avLst/>
-          </a:prstGeom>
-          <a:ln w="28575">
-            <a:solidFill>
-              <a:srgbClr val="8B1538"/>
-            </a:solidFill>
-          </a:ln>
-        </p:spPr>
-        <p:style>
-          <a:lnRef idx="1">
-            <a:schemeClr val="accent1"/>
-          </a:lnRef>
-          <a:fillRef idx="0">
-            <a:schemeClr val="accent1"/>
-          </a:fillRef>
-          <a:effectRef idx="0">
-            <a:schemeClr val="accent1"/>
-          </a:effectRef>
-          <a:fontRef idx="minor">
-            <a:schemeClr val="tx1"/>
-          </a:fontRef>
-        </p:style>
-      </p:cxnSp>
-      <p:sp>
-        <p:nvSpPr>
-          <p:cNvPr id="7" name="Espace réservé de la date 3">
-            <a:extLst>
-              <a:ext uri="{FF2B5EF4-FFF2-40B4-BE49-F238E27FC236}">
-                <a16:creationId xmlns:a16="http://schemas.microsoft.com/office/drawing/2014/main" id="{76BB1596-A3EC-F339-4D57-5E00BE5468DC}"/>
-              </a:ext>
-            </a:extLst>
-          </p:cNvPr>
-          <p:cNvSpPr>
-            <a:spLocks noGrp="1"/>
-          </p:cNvSpPr>
-          <p:nvPr>
-            <p:ph type="dt" sz="half" idx="10"/>
-          </p:nvPr>
-        </p:nvSpPr>
-        <p:spPr>
-          <a:xfrm>
-            <a:off x="838200" y="6489520"/>
-            <a:ext cx="2743200" cy="365125"/>
-          </a:xfrm>
-        </p:spPr>
-        <p:txBody>
-          <a:bodyPr/>
-          <a:lstStyle/>
-          <a:p>
-            <a:r>
-              <a:rPr lang="fr-FR" dirty="0"/>
-              <a:t>12/10/2022</a:t>
-            </a:r>
-          </a:p>
-        </p:txBody>
-      </p:sp>
-      <p:sp>
-        <p:nvSpPr>
-          <p:cNvPr id="9" name="Espace réservé du pied de page 4">
-            <a:extLst>
-              <a:ext uri="{FF2B5EF4-FFF2-40B4-BE49-F238E27FC236}">
-                <a16:creationId xmlns:a16="http://schemas.microsoft.com/office/drawing/2014/main" id="{CE5FBD6C-6FE4-1FFE-40FE-CDECCB34C023}"/>
-              </a:ext>
-            </a:extLst>
-          </p:cNvPr>
-          <p:cNvSpPr>
-            <a:spLocks noGrp="1"/>
-          </p:cNvSpPr>
-          <p:nvPr>
-            <p:ph type="ftr" sz="quarter" idx="11"/>
-          </p:nvPr>
-        </p:nvSpPr>
-        <p:spPr>
-          <a:xfrm>
-            <a:off x="3810000" y="6492876"/>
-            <a:ext cx="4800600" cy="365124"/>
-          </a:xfrm>
-        </p:spPr>
-        <p:txBody>
-          <a:bodyPr/>
-          <a:lstStyle/>
-          <a:p>
-            <a:pPr algn="l"/>
-            <a:r>
-              <a:rPr lang="en-US" dirty="0"/>
-              <a:t>Delhomme Jean, </a:t>
-            </a:r>
-            <a:r>
-              <a:rPr lang="en-US" dirty="0" err="1"/>
-              <a:t>Lecourieux</a:t>
-            </a:r>
-            <a:r>
-              <a:rPr lang="en-US" dirty="0"/>
-              <a:t> Adriana, Rousseau Baptiste, </a:t>
-            </a:r>
-            <a:r>
-              <a:rPr lang="en-US" dirty="0" err="1"/>
-              <a:t>Graa</a:t>
-            </a:r>
-            <a:r>
-              <a:rPr lang="en-US" dirty="0"/>
-              <a:t> </a:t>
-            </a:r>
-            <a:r>
-              <a:rPr lang="en-US" dirty="0" err="1"/>
-              <a:t>Maha</a:t>
-            </a:r>
-            <a:endParaRPr lang="en-US" dirty="0"/>
-          </a:p>
-        </p:txBody>
-      </p:sp>
-    </p:spTree>
-    <p:extLst>
-      <p:ext uri="{BB962C8B-B14F-4D97-AF65-F5344CB8AC3E}">
-        <p14:creationId xmlns:p14="http://schemas.microsoft.com/office/powerpoint/2010/main" val="3627111302"/>
-      </p:ext>
-    </p:extLst>
-  </p:cSld>
-  <p:clrMapOvr>
-    <a:masterClrMapping/>
-  </p:clrMapOvr>
-</p:sld>
-</file>
-
-<file path=ppt/slides/slide26.xml><?xml version="1.0" encoding="utf-8"?>
-<p:sld xmlns:a="http://schemas.openxmlformats.org/drawingml/2006/main" xmlns:r="http://schemas.openxmlformats.org/officeDocument/2006/relationships" xmlns:p="http://schemas.openxmlformats.org/presentationml/2006/main">
-  <p:cSld>
-    <p:spTree>
-      <p:nvGrpSpPr>
-        <p:cNvPr id="1" name=""/>
-        <p:cNvGrpSpPr/>
-        <p:nvPr/>
-      </p:nvGrpSpPr>
-      <p:grpSpPr>
-        <a:xfrm>
-          <a:off x="0" y="0"/>
-          <a:ext cx="0" cy="0"/>
-          <a:chOff x="0" y="0"/>
-          <a:chExt cx="0" cy="0"/>
-        </a:xfrm>
-      </p:grpSpPr>
-      <p:sp>
-        <p:nvSpPr>
-          <p:cNvPr id="2" name="Titre 1">
-            <a:extLst>
-              <a:ext uri="{FF2B5EF4-FFF2-40B4-BE49-F238E27FC236}">
-                <a16:creationId xmlns:a16="http://schemas.microsoft.com/office/drawing/2014/main" id="{3AC5EA2C-9518-355B-24FA-608C24FE72E3}"/>
-              </a:ext>
-            </a:extLst>
-          </p:cNvPr>
-          <p:cNvSpPr>
-            <a:spLocks noGrp="1"/>
-          </p:cNvSpPr>
-          <p:nvPr>
-            <p:ph type="title"/>
-          </p:nvPr>
-        </p:nvSpPr>
-        <p:spPr>
-          <a:xfrm>
-            <a:off x="145740" y="118307"/>
-            <a:ext cx="11137778" cy="691318"/>
-          </a:xfrm>
-        </p:spPr>
-        <p:txBody>
-          <a:bodyPr>
-            <a:normAutofit/>
-          </a:bodyPr>
-          <a:lstStyle/>
-          <a:p>
-            <a:r>
               <a:rPr lang="fr-FR" sz="3200" b="1" dirty="0">
                 <a:latin typeface="Arial" panose="020B0604020202020204" pitchFamily="34" charset="0"/>
                 <a:cs typeface="Arial" panose="020B0604020202020204" pitchFamily="34" charset="0"/>
@@ -13637,7 +12408,7 @@
           <a:p>
             <a:fld id="{DB0B8EAA-8CF6-49F4-8FA8-2BD42B7C9F8B}" type="slidenum">
               <a:rPr lang="fr-FR" smtClean="0"/>
-              <a:t>26</a:t>
+              <a:t>24</a:t>
             </a:fld>
             <a:endParaRPr lang="fr-FR"/>
           </a:p>

</xml_diff>